<commit_message>
Start false sharing section of presentation
</commit_message>
<xml_diff>
--- a/Optimization/hpc_efficiency_false_sharing.pptx
+++ b/Optimization/hpc_efficiency_false_sharing.pptx
@@ -5,7 +5,7 @@
     <p:sldMasterId id="2147483648" r:id="rId1"/>
   </p:sldMasterIdLst>
   <p:notesMasterIdLst>
-    <p:notesMasterId r:id="rId41"/>
+    <p:notesMasterId r:id="rId43"/>
   </p:notesMasterIdLst>
   <p:sldIdLst>
     <p:sldId id="267" r:id="rId2"/>
@@ -41,12 +41,14 @@
     <p:sldId id="289" r:id="rId32"/>
     <p:sldId id="281" r:id="rId33"/>
     <p:sldId id="298" r:id="rId34"/>
-    <p:sldId id="287" r:id="rId35"/>
-    <p:sldId id="292" r:id="rId36"/>
-    <p:sldId id="286" r:id="rId37"/>
-    <p:sldId id="297" r:id="rId38"/>
-    <p:sldId id="271" r:id="rId39"/>
-    <p:sldId id="283" r:id="rId40"/>
+    <p:sldId id="299" r:id="rId35"/>
+    <p:sldId id="300" r:id="rId36"/>
+    <p:sldId id="287" r:id="rId37"/>
+    <p:sldId id="292" r:id="rId38"/>
+    <p:sldId id="286" r:id="rId39"/>
+    <p:sldId id="297" r:id="rId40"/>
+    <p:sldId id="271" r:id="rId41"/>
+    <p:sldId id="283" r:id="rId42"/>
   </p:sldIdLst>
   <p:sldSz cx="9144000" cy="6858000" type="screen4x3"/>
   <p:notesSz cx="6858000" cy="9144000"/>
@@ -203,6 +205,12 @@
             <p14:sldId id="289"/>
             <p14:sldId id="281"/>
             <p14:sldId id="298"/>
+          </p14:sldIdLst>
+        </p14:section>
+        <p14:section name="false sharing" id="{D4ED262D-72D1-4270-88D0-B864D2A60662}">
+          <p14:sldIdLst>
+            <p14:sldId id="299"/>
+            <p14:sldId id="300"/>
           </p14:sldIdLst>
         </p14:section>
         <p14:section name="conclusion" id="{87FF5A44-6804-4982-9011-9B7F10D2DAE3}">
@@ -8829,7 +8837,7 @@
           <a:graphicData uri="http://schemas.openxmlformats.org/presentationml/2006/ole">
             <mc:AlternateContent xmlns:mc="http://schemas.openxmlformats.org/markup-compatibility/2006">
               <mc:Choice xmlns:v="urn:schemas-microsoft-com:vml" Requires="v">
-                <p:oleObj spid="_x0000_s1172" name="Equation" r:id="rId3" imgW="812520" imgH="393480" progId="Equation.3">
+                <p:oleObj spid="_x0000_s1178" name="Equation" r:id="rId3" imgW="812520" imgH="393480" progId="Equation.3">
                   <p:embed/>
                 </p:oleObj>
               </mc:Choice>
@@ -8886,7 +8894,7 @@
           <a:graphicData uri="http://schemas.openxmlformats.org/presentationml/2006/ole">
             <mc:AlternateContent xmlns:mc="http://schemas.openxmlformats.org/markup-compatibility/2006">
               <mc:Choice xmlns:v="urn:schemas-microsoft-com:vml" Requires="v">
-                <p:oleObj spid="_x0000_s1173" name="Equation" r:id="rId5" imgW="2489040" imgH="431640" progId="Equation.3">
+                <p:oleObj spid="_x0000_s1179" name="Equation" r:id="rId5" imgW="2489040" imgH="431640" progId="Equation.3">
                   <p:embed/>
                 </p:oleObj>
               </mc:Choice>
@@ -19548,7 +19556,7 @@
           <a:graphicData uri="http://schemas.openxmlformats.org/presentationml/2006/ole">
             <mc:AlternateContent xmlns:mc="http://schemas.openxmlformats.org/markup-compatibility/2006">
               <mc:Choice xmlns:v="urn:schemas-microsoft-com:vml" Requires="v">
-                <p:oleObj spid="_x0000_s2163" name="Equation" r:id="rId3" imgW="1091880" imgH="1041120" progId="Equation.3">
+                <p:oleObj spid="_x0000_s2169" name="Equation" r:id="rId3" imgW="1091880" imgH="1041120" progId="Equation.3">
                   <p:embed/>
                 </p:oleObj>
               </mc:Choice>
@@ -20919,7 +20927,7 @@
           <a:graphicData uri="http://schemas.openxmlformats.org/presentationml/2006/ole">
             <mc:AlternateContent xmlns:mc="http://schemas.openxmlformats.org/markup-compatibility/2006">
               <mc:Choice xmlns:v="urn:schemas-microsoft-com:vml" Requires="v">
-                <p:oleObj spid="_x0000_s2164" name="Equation" r:id="rId5" imgW="1091880" imgH="1041120" progId="Equation.3">
+                <p:oleObj spid="_x0000_s2170" name="Equation" r:id="rId5" imgW="1091880" imgH="1041120" progId="Equation.3">
                   <p:embed/>
                 </p:oleObj>
               </mc:Choice>
@@ -27268,7 +27276,7 @@
           <a:graphicData uri="http://schemas.openxmlformats.org/presentationml/2006/ole">
             <mc:AlternateContent xmlns:mc="http://schemas.openxmlformats.org/markup-compatibility/2006">
               <mc:Choice xmlns:v="urn:schemas-microsoft-com:vml" Requires="v">
-                <p:oleObj spid="_x0000_s3094" name="Equation" r:id="rId3" imgW="965160" imgH="228600" progId="Equation.3">
+                <p:oleObj spid="_x0000_s3097" name="Equation" r:id="rId3" imgW="965160" imgH="228600" progId="Equation.3">
                   <p:embed/>
                 </p:oleObj>
               </mc:Choice>
@@ -30043,9 +30051,9 @@
           <a:p>
             <a:r>
               <a:rPr lang="en-US" dirty="0" smtClean="0"/>
-              <a:t>Conclusion</a:t>
-            </a:r>
-            <a:endParaRPr lang="nl-BE" dirty="0"/>
+              <a:t>False sharing</a:t>
+            </a:r>
+            <a:endParaRPr lang="en-US" dirty="0"/>
           </a:p>
         </p:txBody>
       </p:sp>
@@ -30064,7 +30072,7 @@
           <a:bodyPr/>
           <a:lstStyle/>
           <a:p>
-            <a:endParaRPr lang="nl-BE"/>
+            <a:endParaRPr lang="en-US"/>
           </a:p>
         </p:txBody>
       </p:sp>
@@ -30094,7 +30102,7 @@
     </p:spTree>
     <p:extLst>
       <p:ext uri="{BB962C8B-B14F-4D97-AF65-F5344CB8AC3E}">
-        <p14:creationId xmlns:p14="http://schemas.microsoft.com/office/powerpoint/2010/main" val="1387657132"/>
+        <p14:creationId xmlns:p14="http://schemas.microsoft.com/office/powerpoint/2010/main" val="3424948925"/>
       </p:ext>
     </p:extLst>
   </p:cSld>
@@ -30130,7 +30138,7 @@
       </p:grpSpPr>
       <p:sp>
         <p:nvSpPr>
-          <p:cNvPr id="5" name="Title 4"/>
+          <p:cNvPr id="2" name="Title 1"/>
           <p:cNvSpPr>
             <a:spLocks noGrp="1"/>
           </p:cNvSpPr>
@@ -30145,15 +30153,15 @@
           <a:p>
             <a:r>
               <a:rPr lang="en-US" dirty="0" smtClean="0"/>
-              <a:t>Useful references</a:t>
-            </a:r>
-            <a:endParaRPr lang="nl-BE" dirty="0"/>
+              <a:t>Cache lines again</a:t>
+            </a:r>
+            <a:endParaRPr lang="en-US" dirty="0"/>
           </a:p>
         </p:txBody>
       </p:sp>
       <p:sp>
         <p:nvSpPr>
-          <p:cNvPr id="6" name="Content Placeholder 5"/>
+          <p:cNvPr id="3" name="Content Placeholder 2"/>
           <p:cNvSpPr>
             <a:spLocks noGrp="1"/>
           </p:cNvSpPr>
@@ -30163,94 +30171,10 @@
         </p:nvSpPr>
         <p:spPr/>
         <p:txBody>
-          <a:bodyPr>
-            <a:normAutofit lnSpcReduction="10000"/>
-          </a:bodyPr>
+          <a:bodyPr/>
           <a:lstStyle/>
           <a:p>
-            <a:r>
-              <a:rPr lang="en-US" dirty="0" smtClean="0">
-                <a:hlinkClick r:id="rId2"/>
-              </a:rPr>
-              <a:t>Gallery of processor cache effects</a:t>
-            </a:r>
-            <a:endParaRPr lang="en-US" dirty="0" smtClean="0"/>
-          </a:p>
-          <a:p>
-            <a:r>
-              <a:rPr lang="en-US" dirty="0" smtClean="0"/>
-              <a:t>Vectorization</a:t>
-            </a:r>
-          </a:p>
-          <a:p>
-            <a:pPr lvl="1"/>
-            <a:r>
-              <a:rPr lang="en-US" dirty="0" smtClean="0">
-                <a:hlinkClick r:id="rId3"/>
-              </a:rPr>
-              <a:t>A guide to vectorization with Intel C++ compilers</a:t>
-            </a:r>
-            <a:endParaRPr lang="en-US" dirty="0" smtClean="0"/>
-          </a:p>
-          <a:p>
-            <a:pPr lvl="1"/>
-            <a:r>
-              <a:rPr lang="en-US" dirty="0" smtClean="0">
-                <a:hlinkClick r:id="rId4"/>
-              </a:rPr>
-              <a:t>Auto-vectorization with </a:t>
-            </a:r>
-            <a:r>
-              <a:rPr lang="en-US" dirty="0" err="1" smtClean="0">
-                <a:hlinkClick r:id="rId4"/>
-              </a:rPr>
-              <a:t>gcc</a:t>
-            </a:r>
-            <a:r>
-              <a:rPr lang="en-US" dirty="0" smtClean="0">
-                <a:hlinkClick r:id="rId4"/>
-              </a:rPr>
-              <a:t> 4.7</a:t>
-            </a:r>
-            <a:endParaRPr lang="en-US" dirty="0" smtClean="0"/>
-          </a:p>
-          <a:p>
-            <a:r>
-              <a:rPr lang="en-US" dirty="0"/>
-              <a:t>Introduction to High Performance Computing for Scientists and </a:t>
-            </a:r>
-            <a:r>
-              <a:rPr lang="en-US" dirty="0" smtClean="0"/>
-              <a:t>Engineers</a:t>
-            </a:r>
-            <a:r>
-              <a:rPr lang="nl-BE" dirty="0" smtClean="0"/>
-              <a:t/>
-            </a:r>
-            <a:br>
-              <a:rPr lang="nl-BE" dirty="0" smtClean="0"/>
-            </a:br>
-            <a:r>
-              <a:rPr lang="nl-BE" dirty="0" smtClean="0"/>
-              <a:t>Georg Hager &amp; Gerhard Wellein</a:t>
-            </a:r>
-            <a:br>
-              <a:rPr lang="nl-BE" dirty="0" smtClean="0"/>
-            </a:br>
-            <a:r>
-              <a:rPr lang="nl-BE" dirty="0" smtClean="0"/>
-              <a:t>Chapman &amp; Hall, 2010</a:t>
-            </a:r>
-            <a:endParaRPr lang="en-US" b="1" dirty="0"/>
-          </a:p>
-          <a:p>
-            <a:r>
-              <a:rPr lang="en-US" dirty="0" smtClean="0">
-                <a:hlinkClick r:id="rId5"/>
-              </a:rPr>
-              <a:t>Why has CPU frequency ceased to grow?</a:t>
-            </a:r>
-            <a:endParaRPr lang="nl-BE" dirty="0" smtClean="0"/>
+            <a:endParaRPr lang="en-US"/>
           </a:p>
         </p:txBody>
       </p:sp>
@@ -30280,7 +30204,7 @@
     </p:spTree>
     <p:extLst>
       <p:ext uri="{BB962C8B-B14F-4D97-AF65-F5344CB8AC3E}">
-        <p14:creationId xmlns:p14="http://schemas.microsoft.com/office/powerpoint/2010/main" val="2653023660"/>
+        <p14:creationId xmlns:p14="http://schemas.microsoft.com/office/powerpoint/2010/main" val="985196691"/>
       </p:ext>
     </p:extLst>
   </p:cSld>
@@ -30331,7 +30255,7 @@
           <a:p>
             <a:r>
               <a:rPr lang="en-US" dirty="0" smtClean="0"/>
-              <a:t>Appendix</a:t>
+              <a:t>Conclusion</a:t>
             </a:r>
             <a:endParaRPr lang="nl-BE" dirty="0"/>
           </a:p>
@@ -30382,7 +30306,7 @@
     </p:spTree>
     <p:extLst>
       <p:ext uri="{BB962C8B-B14F-4D97-AF65-F5344CB8AC3E}">
-        <p14:creationId xmlns:p14="http://schemas.microsoft.com/office/powerpoint/2010/main" val="3118825235"/>
+        <p14:creationId xmlns:p14="http://schemas.microsoft.com/office/powerpoint/2010/main" val="1387657132"/>
       </p:ext>
     </p:extLst>
   </p:cSld>
@@ -30418,6 +30342,294 @@
       </p:grpSpPr>
       <p:sp>
         <p:nvSpPr>
+          <p:cNvPr id="5" name="Title 4"/>
+          <p:cNvSpPr>
+            <a:spLocks noGrp="1"/>
+          </p:cNvSpPr>
+          <p:nvPr>
+            <p:ph type="title"/>
+          </p:nvPr>
+        </p:nvSpPr>
+        <p:spPr/>
+        <p:txBody>
+          <a:bodyPr/>
+          <a:lstStyle/>
+          <a:p>
+            <a:r>
+              <a:rPr lang="en-US" dirty="0" smtClean="0"/>
+              <a:t>Useful references</a:t>
+            </a:r>
+            <a:endParaRPr lang="nl-BE" dirty="0"/>
+          </a:p>
+        </p:txBody>
+      </p:sp>
+      <p:sp>
+        <p:nvSpPr>
+          <p:cNvPr id="6" name="Content Placeholder 5"/>
+          <p:cNvSpPr>
+            <a:spLocks noGrp="1"/>
+          </p:cNvSpPr>
+          <p:nvPr>
+            <p:ph idx="1"/>
+          </p:nvPr>
+        </p:nvSpPr>
+        <p:spPr/>
+        <p:txBody>
+          <a:bodyPr>
+            <a:normAutofit lnSpcReduction="10000"/>
+          </a:bodyPr>
+          <a:lstStyle/>
+          <a:p>
+            <a:r>
+              <a:rPr lang="en-US" dirty="0" smtClean="0">
+                <a:hlinkClick r:id="rId2"/>
+              </a:rPr>
+              <a:t>Gallery of processor cache effects</a:t>
+            </a:r>
+            <a:endParaRPr lang="en-US" dirty="0" smtClean="0"/>
+          </a:p>
+          <a:p>
+            <a:r>
+              <a:rPr lang="en-US" dirty="0" smtClean="0"/>
+              <a:t>Vectorization</a:t>
+            </a:r>
+          </a:p>
+          <a:p>
+            <a:pPr lvl="1"/>
+            <a:r>
+              <a:rPr lang="en-US" dirty="0" smtClean="0">
+                <a:hlinkClick r:id="rId3"/>
+              </a:rPr>
+              <a:t>A guide to vectorization with Intel C++ compilers</a:t>
+            </a:r>
+            <a:endParaRPr lang="en-US" dirty="0" smtClean="0"/>
+          </a:p>
+          <a:p>
+            <a:pPr lvl="1"/>
+            <a:r>
+              <a:rPr lang="en-US" dirty="0" smtClean="0">
+                <a:hlinkClick r:id="rId4"/>
+              </a:rPr>
+              <a:t>Auto-vectorization with </a:t>
+            </a:r>
+            <a:r>
+              <a:rPr lang="en-US" dirty="0" err="1" smtClean="0">
+                <a:hlinkClick r:id="rId4"/>
+              </a:rPr>
+              <a:t>gcc</a:t>
+            </a:r>
+            <a:r>
+              <a:rPr lang="en-US" dirty="0" smtClean="0">
+                <a:hlinkClick r:id="rId4"/>
+              </a:rPr>
+              <a:t> 4.7</a:t>
+            </a:r>
+            <a:endParaRPr lang="en-US" dirty="0" smtClean="0"/>
+          </a:p>
+          <a:p>
+            <a:r>
+              <a:rPr lang="en-US" dirty="0"/>
+              <a:t>Introduction to High Performance Computing for Scientists and </a:t>
+            </a:r>
+            <a:r>
+              <a:rPr lang="en-US" dirty="0" smtClean="0"/>
+              <a:t>Engineers</a:t>
+            </a:r>
+            <a:r>
+              <a:rPr lang="nl-BE" dirty="0" smtClean="0"/>
+              <a:t/>
+            </a:r>
+            <a:br>
+              <a:rPr lang="nl-BE" dirty="0" smtClean="0"/>
+            </a:br>
+            <a:r>
+              <a:rPr lang="nl-BE" dirty="0" smtClean="0"/>
+              <a:t>Georg Hager &amp; Gerhard Wellein</a:t>
+            </a:r>
+            <a:br>
+              <a:rPr lang="nl-BE" dirty="0" smtClean="0"/>
+            </a:br>
+            <a:r>
+              <a:rPr lang="nl-BE" dirty="0" smtClean="0"/>
+              <a:t>Chapman &amp; Hall, 2010</a:t>
+            </a:r>
+            <a:endParaRPr lang="en-US" b="1" dirty="0"/>
+          </a:p>
+          <a:p>
+            <a:r>
+              <a:rPr lang="en-US" dirty="0" smtClean="0">
+                <a:hlinkClick r:id="rId5"/>
+              </a:rPr>
+              <a:t>Why has CPU frequency ceased to grow?</a:t>
+            </a:r>
+            <a:endParaRPr lang="nl-BE" dirty="0" smtClean="0"/>
+          </a:p>
+        </p:txBody>
+      </p:sp>
+      <p:sp>
+        <p:nvSpPr>
+          <p:cNvPr id="4" name="Slide Number Placeholder 3"/>
+          <p:cNvSpPr>
+            <a:spLocks noGrp="1"/>
+          </p:cNvSpPr>
+          <p:nvPr>
+            <p:ph type="sldNum" sz="quarter" idx="12"/>
+          </p:nvPr>
+        </p:nvSpPr>
+        <p:spPr/>
+        <p:txBody>
+          <a:bodyPr/>
+          <a:lstStyle/>
+          <a:p>
+            <a:fld id="{6597116C-F94B-4B5B-973A-17F07FB5C418}" type="slidenum">
+              <a:rPr lang="nl-BE" smtClean="0"/>
+              <a:t>37</a:t>
+            </a:fld>
+            <a:endParaRPr lang="nl-BE"/>
+          </a:p>
+        </p:txBody>
+      </p:sp>
+    </p:spTree>
+    <p:extLst>
+      <p:ext uri="{BB962C8B-B14F-4D97-AF65-F5344CB8AC3E}">
+        <p14:creationId xmlns:p14="http://schemas.microsoft.com/office/powerpoint/2010/main" val="2653023660"/>
+      </p:ext>
+    </p:extLst>
+  </p:cSld>
+  <p:clrMapOvr>
+    <a:masterClrMapping/>
+  </p:clrMapOvr>
+  <p:timing>
+    <p:tnLst>
+      <p:par>
+        <p:cTn id="1" dur="indefinite" restart="never" nodeType="tmRoot"/>
+      </p:par>
+    </p:tnLst>
+  </p:timing>
+</p:sld>
+</file>
+
+<file path=ppt/slides/slide38.xml><?xml version="1.0" encoding="utf-8"?>
+<p:sld xmlns:a="http://schemas.openxmlformats.org/drawingml/2006/main" xmlns:r="http://schemas.openxmlformats.org/officeDocument/2006/relationships" xmlns:p="http://schemas.openxmlformats.org/presentationml/2006/main">
+  <p:cSld>
+    <p:spTree>
+      <p:nvGrpSpPr>
+        <p:cNvPr id="1" name=""/>
+        <p:cNvGrpSpPr/>
+        <p:nvPr/>
+      </p:nvGrpSpPr>
+      <p:grpSpPr>
+        <a:xfrm>
+          <a:off x="0" y="0"/>
+          <a:ext cx="0" cy="0"/>
+          <a:chOff x="0" y="0"/>
+          <a:chExt cx="0" cy="0"/>
+        </a:xfrm>
+      </p:grpSpPr>
+      <p:sp>
+        <p:nvSpPr>
+          <p:cNvPr id="2" name="Title 1"/>
+          <p:cNvSpPr>
+            <a:spLocks noGrp="1"/>
+          </p:cNvSpPr>
+          <p:nvPr>
+            <p:ph type="title"/>
+          </p:nvPr>
+        </p:nvSpPr>
+        <p:spPr/>
+        <p:txBody>
+          <a:bodyPr/>
+          <a:lstStyle/>
+          <a:p>
+            <a:r>
+              <a:rPr lang="en-US" dirty="0" smtClean="0"/>
+              <a:t>Appendix</a:t>
+            </a:r>
+            <a:endParaRPr lang="nl-BE" dirty="0"/>
+          </a:p>
+        </p:txBody>
+      </p:sp>
+      <p:sp>
+        <p:nvSpPr>
+          <p:cNvPr id="3" name="Text Placeholder 2"/>
+          <p:cNvSpPr>
+            <a:spLocks noGrp="1"/>
+          </p:cNvSpPr>
+          <p:nvPr>
+            <p:ph type="body" idx="1"/>
+          </p:nvPr>
+        </p:nvSpPr>
+        <p:spPr/>
+        <p:txBody>
+          <a:bodyPr/>
+          <a:lstStyle/>
+          <a:p>
+            <a:endParaRPr lang="nl-BE"/>
+          </a:p>
+        </p:txBody>
+      </p:sp>
+      <p:sp>
+        <p:nvSpPr>
+          <p:cNvPr id="4" name="Slide Number Placeholder 3"/>
+          <p:cNvSpPr>
+            <a:spLocks noGrp="1"/>
+          </p:cNvSpPr>
+          <p:nvPr>
+            <p:ph type="sldNum" sz="quarter" idx="12"/>
+          </p:nvPr>
+        </p:nvSpPr>
+        <p:spPr/>
+        <p:txBody>
+          <a:bodyPr/>
+          <a:lstStyle/>
+          <a:p>
+            <a:fld id="{6597116C-F94B-4B5B-973A-17F07FB5C418}" type="slidenum">
+              <a:rPr lang="nl-BE" smtClean="0"/>
+              <a:t>38</a:t>
+            </a:fld>
+            <a:endParaRPr lang="nl-BE"/>
+          </a:p>
+        </p:txBody>
+      </p:sp>
+    </p:spTree>
+    <p:extLst>
+      <p:ext uri="{BB962C8B-B14F-4D97-AF65-F5344CB8AC3E}">
+        <p14:creationId xmlns:p14="http://schemas.microsoft.com/office/powerpoint/2010/main" val="3118825235"/>
+      </p:ext>
+    </p:extLst>
+  </p:cSld>
+  <p:clrMapOvr>
+    <a:masterClrMapping/>
+  </p:clrMapOvr>
+  <p:timing>
+    <p:tnLst>
+      <p:par>
+        <p:cTn id="1" dur="indefinite" restart="never" nodeType="tmRoot"/>
+      </p:par>
+    </p:tnLst>
+  </p:timing>
+</p:sld>
+</file>
+
+<file path=ppt/slides/slide39.xml><?xml version="1.0" encoding="utf-8"?>
+<p:sld xmlns:a="http://schemas.openxmlformats.org/drawingml/2006/main" xmlns:r="http://schemas.openxmlformats.org/officeDocument/2006/relationships" xmlns:p="http://schemas.openxmlformats.org/presentationml/2006/main">
+  <p:cSld>
+    <p:spTree>
+      <p:nvGrpSpPr>
+        <p:cNvPr id="1" name=""/>
+        <p:cNvGrpSpPr/>
+        <p:nvPr/>
+      </p:nvGrpSpPr>
+      <p:grpSpPr>
+        <a:xfrm>
+          <a:off x="0" y="0"/>
+          <a:ext cx="0" cy="0"/>
+          <a:chOff x="0" y="0"/>
+          <a:chExt cx="0" cy="0"/>
+        </a:xfrm>
+      </p:grpSpPr>
+      <p:sp>
+        <p:nvSpPr>
           <p:cNvPr id="2" name="Title 1"/>
           <p:cNvSpPr>
             <a:spLocks noGrp="1"/>
@@ -30563,7 +30775,7 @@
           <a:p>
             <a:fld id="{6597116C-F94B-4B5B-973A-17F07FB5C418}" type="slidenum">
               <a:rPr lang="nl-BE" smtClean="0"/>
-              <a:t>37</a:t>
+              <a:t>39</a:t>
             </a:fld>
             <a:endParaRPr lang="nl-BE"/>
           </a:p>
@@ -31022,7 +31234,720 @@
 </p:sld>
 </file>
 
-<file path=ppt/slides/slide38.xml><?xml version="1.0" encoding="utf-8"?>
+<file path=ppt/slides/slide4.xml><?xml version="1.0" encoding="utf-8"?>
+<p:sld xmlns:a="http://schemas.openxmlformats.org/drawingml/2006/main" xmlns:r="http://schemas.openxmlformats.org/officeDocument/2006/relationships" xmlns:p="http://schemas.openxmlformats.org/presentationml/2006/main">
+  <p:cSld>
+    <p:spTree>
+      <p:nvGrpSpPr>
+        <p:cNvPr id="1" name=""/>
+        <p:cNvGrpSpPr/>
+        <p:nvPr/>
+      </p:nvGrpSpPr>
+      <p:grpSpPr>
+        <a:xfrm>
+          <a:off x="0" y="0"/>
+          <a:ext cx="0" cy="0"/>
+          <a:chOff x="0" y="0"/>
+          <a:chExt cx="0" cy="0"/>
+        </a:xfrm>
+      </p:grpSpPr>
+      <p:sp>
+        <p:nvSpPr>
+          <p:cNvPr id="2" name="Title 1"/>
+          <p:cNvSpPr>
+            <a:spLocks noGrp="1"/>
+          </p:cNvSpPr>
+          <p:nvPr>
+            <p:ph type="title"/>
+          </p:nvPr>
+        </p:nvSpPr>
+        <p:spPr/>
+        <p:txBody>
+          <a:bodyPr/>
+          <a:lstStyle/>
+          <a:p>
+            <a:r>
+              <a:rPr lang="en-US" dirty="0" smtClean="0"/>
+              <a:t>Parallelism</a:t>
+            </a:r>
+            <a:endParaRPr lang="en-US" dirty="0"/>
+          </a:p>
+        </p:txBody>
+      </p:sp>
+      <p:sp>
+        <p:nvSpPr>
+          <p:cNvPr id="3" name="Content Placeholder 2"/>
+          <p:cNvSpPr>
+            <a:spLocks noGrp="1"/>
+          </p:cNvSpPr>
+          <p:nvPr>
+            <p:ph idx="1"/>
+          </p:nvPr>
+        </p:nvSpPr>
+        <p:spPr/>
+        <p:txBody>
+          <a:bodyPr/>
+          <a:lstStyle/>
+          <a:p>
+            <a:r>
+              <a:rPr lang="en-US" dirty="0" smtClean="0"/>
+              <a:t>Levels</a:t>
+            </a:r>
+          </a:p>
+          <a:p>
+            <a:pPr lvl="1"/>
+            <a:r>
+              <a:rPr lang="en-US" dirty="0" smtClean="0"/>
+              <a:t>vectorization</a:t>
+            </a:r>
+          </a:p>
+          <a:p>
+            <a:pPr lvl="2"/>
+            <a:r>
+              <a:rPr lang="en-US" dirty="0" smtClean="0"/>
+              <a:t>compiler flags, programmer can/should help</a:t>
+            </a:r>
+          </a:p>
+          <a:p>
+            <a:pPr lvl="1"/>
+            <a:r>
+              <a:rPr lang="en-US" dirty="0" smtClean="0"/>
+              <a:t>multicore</a:t>
+            </a:r>
+          </a:p>
+          <a:p>
+            <a:pPr lvl="2"/>
+            <a:r>
+              <a:rPr lang="en-US" dirty="0" err="1" smtClean="0"/>
+              <a:t>OpenMP</a:t>
+            </a:r>
+            <a:r>
+              <a:rPr lang="en-US" dirty="0" smtClean="0"/>
+              <a:t>/</a:t>
+            </a:r>
+            <a:r>
+              <a:rPr lang="en-US" dirty="0" err="1" smtClean="0"/>
+              <a:t>pthreads</a:t>
+            </a:r>
+            <a:r>
+              <a:rPr lang="en-US" dirty="0" smtClean="0"/>
+              <a:t>: programmer's job</a:t>
+            </a:r>
+          </a:p>
+          <a:p>
+            <a:pPr lvl="1"/>
+            <a:r>
+              <a:rPr lang="en-US" dirty="0" smtClean="0"/>
+              <a:t>multiple nodes, i.e., distributed</a:t>
+            </a:r>
+          </a:p>
+          <a:p>
+            <a:pPr lvl="2"/>
+            <a:r>
+              <a:rPr lang="en-US" dirty="0" smtClean="0"/>
+              <a:t>MPI/CAF/UPC/Chapel: programmer's job</a:t>
+            </a:r>
+          </a:p>
+          <a:p>
+            <a:pPr lvl="1"/>
+            <a:r>
+              <a:rPr lang="en-US" dirty="0" smtClean="0"/>
+              <a:t>GPGPU</a:t>
+            </a:r>
+          </a:p>
+          <a:p>
+            <a:pPr lvl="2"/>
+            <a:r>
+              <a:rPr lang="en-US" dirty="0" smtClean="0"/>
+              <a:t>CUDA/</a:t>
+            </a:r>
+            <a:r>
+              <a:rPr lang="en-US" dirty="0" err="1" smtClean="0"/>
+              <a:t>OpenACC</a:t>
+            </a:r>
+            <a:r>
+              <a:rPr lang="en-US" dirty="0" smtClean="0"/>
+              <a:t>/OpenCL: programmer's job</a:t>
+            </a:r>
+            <a:endParaRPr lang="en-US" dirty="0"/>
+          </a:p>
+        </p:txBody>
+      </p:sp>
+      <p:sp>
+        <p:nvSpPr>
+          <p:cNvPr id="4" name="Slide Number Placeholder 3"/>
+          <p:cNvSpPr>
+            <a:spLocks noGrp="1"/>
+          </p:cNvSpPr>
+          <p:nvPr>
+            <p:ph type="sldNum" sz="quarter" idx="12"/>
+          </p:nvPr>
+        </p:nvSpPr>
+        <p:spPr/>
+        <p:txBody>
+          <a:bodyPr/>
+          <a:lstStyle/>
+          <a:p>
+            <a:fld id="{6597116C-F94B-4B5B-973A-17F07FB5C418}" type="slidenum">
+              <a:rPr lang="nl-BE" smtClean="0"/>
+              <a:t>4</a:t>
+            </a:fld>
+            <a:endParaRPr lang="nl-BE"/>
+          </a:p>
+        </p:txBody>
+      </p:sp>
+      <p:grpSp>
+        <p:nvGrpSpPr>
+          <p:cNvPr id="7" name="Group 6"/>
+          <p:cNvGrpSpPr/>
+          <p:nvPr/>
+        </p:nvGrpSpPr>
+        <p:grpSpPr>
+          <a:xfrm>
+            <a:off x="6981290" y="3284984"/>
+            <a:ext cx="1479142" cy="1656184"/>
+            <a:chOff x="6553200" y="3284984"/>
+            <a:chExt cx="1479142" cy="1656184"/>
+          </a:xfrm>
+        </p:grpSpPr>
+        <p:sp>
+          <p:nvSpPr>
+            <p:cNvPr id="5" name="Right Brace 4"/>
+            <p:cNvSpPr/>
+            <p:nvPr/>
+          </p:nvSpPr>
+          <p:spPr>
+            <a:xfrm>
+              <a:off x="6553200" y="3284984"/>
+              <a:ext cx="179040" cy="1656184"/>
+            </a:xfrm>
+            <a:prstGeom prst="rightBrace">
+              <a:avLst/>
+            </a:prstGeom>
+            <a:ln>
+              <a:solidFill>
+                <a:schemeClr val="tx1"/>
+              </a:solidFill>
+            </a:ln>
+          </p:spPr>
+          <p:style>
+            <a:lnRef idx="1">
+              <a:schemeClr val="accent1"/>
+            </a:lnRef>
+            <a:fillRef idx="0">
+              <a:schemeClr val="accent1"/>
+            </a:fillRef>
+            <a:effectRef idx="0">
+              <a:schemeClr val="accent1"/>
+            </a:effectRef>
+            <a:fontRef idx="minor">
+              <a:schemeClr val="tx1"/>
+            </a:fontRef>
+          </p:style>
+          <p:txBody>
+            <a:bodyPr rtlCol="0" anchor="ctr"/>
+            <a:lstStyle/>
+            <a:p>
+              <a:pPr algn="ctr"/>
+              <a:endParaRPr lang="en-US"/>
+            </a:p>
+          </p:txBody>
+        </p:sp>
+        <p:sp>
+          <p:nvSpPr>
+            <p:cNvPr id="6" name="TextBox 5"/>
+            <p:cNvSpPr txBox="1"/>
+            <p:nvPr/>
+          </p:nvSpPr>
+          <p:spPr>
+            <a:xfrm>
+              <a:off x="6876256" y="3851466"/>
+              <a:ext cx="1156086" cy="523220"/>
+            </a:xfrm>
+            <a:prstGeom prst="rect">
+              <a:avLst/>
+            </a:prstGeom>
+            <a:noFill/>
+          </p:spPr>
+          <p:txBody>
+            <a:bodyPr wrap="none" rtlCol="0">
+              <a:spAutoFit/>
+            </a:bodyPr>
+            <a:lstStyle/>
+            <a:p>
+              <a:r>
+                <a:rPr lang="en-US" sz="2800" dirty="0" smtClean="0"/>
+                <a:t>Hybrid</a:t>
+              </a:r>
+              <a:endParaRPr lang="en-US" sz="2800" dirty="0"/>
+            </a:p>
+          </p:txBody>
+        </p:sp>
+      </p:grpSp>
+    </p:spTree>
+    <p:extLst>
+      <p:ext uri="{BB962C8B-B14F-4D97-AF65-F5344CB8AC3E}">
+        <p14:creationId xmlns:p14="http://schemas.microsoft.com/office/powerpoint/2010/main" val="1972215598"/>
+      </p:ext>
+    </p:extLst>
+  </p:cSld>
+  <p:clrMapOvr>
+    <a:masterClrMapping/>
+  </p:clrMapOvr>
+  <p:timing>
+    <p:tnLst>
+      <p:par>
+        <p:cTn id="1" dur="indefinite" restart="never" nodeType="tmRoot">
+          <p:childTnLst>
+            <p:seq concurrent="1" nextAc="seek">
+              <p:cTn id="2" dur="indefinite" nodeType="mainSeq">
+                <p:childTnLst>
+                  <p:par>
+                    <p:cTn id="3" fill="hold">
+                      <p:stCondLst>
+                        <p:cond delay="indefinite"/>
+                        <p:cond evt="onBegin" delay="0">
+                          <p:tn val="2"/>
+                        </p:cond>
+                      </p:stCondLst>
+                      <p:childTnLst>
+                        <p:par>
+                          <p:cTn id="4" fill="hold">
+                            <p:stCondLst>
+                              <p:cond delay="0"/>
+                            </p:stCondLst>
+                            <p:childTnLst>
+                              <p:par>
+                                <p:cTn id="5" presetID="1" presetClass="entr" presetSubtype="0" fill="hold" grpId="0" nodeType="withEffect">
+                                  <p:stCondLst>
+                                    <p:cond delay="0"/>
+                                  </p:stCondLst>
+                                  <p:childTnLst>
+                                    <p:set>
+                                      <p:cBhvr>
+                                        <p:cTn id="6" dur="1" fill="hold">
+                                          <p:stCondLst>
+                                            <p:cond delay="0"/>
+                                          </p:stCondLst>
+                                        </p:cTn>
+                                        <p:tgtEl>
+                                          <p:spTgt spid="3">
+                                            <p:txEl>
+                                              <p:pRg st="0" end="0"/>
+                                            </p:txEl>
+                                          </p:spTgt>
+                                        </p:tgtEl>
+                                        <p:attrNameLst>
+                                          <p:attrName>style.visibility</p:attrName>
+                                        </p:attrNameLst>
+                                      </p:cBhvr>
+                                      <p:to>
+                                        <p:strVal val="visible"/>
+                                      </p:to>
+                                    </p:set>
+                                  </p:childTnLst>
+                                </p:cTn>
+                              </p:par>
+                            </p:childTnLst>
+                          </p:cTn>
+                        </p:par>
+                      </p:childTnLst>
+                    </p:cTn>
+                  </p:par>
+                  <p:par>
+                    <p:cTn id="7" fill="hold">
+                      <p:stCondLst>
+                        <p:cond delay="indefinite"/>
+                      </p:stCondLst>
+                      <p:childTnLst>
+                        <p:par>
+                          <p:cTn id="8" fill="hold">
+                            <p:stCondLst>
+                              <p:cond delay="0"/>
+                            </p:stCondLst>
+                            <p:childTnLst>
+                              <p:par>
+                                <p:cTn id="9" presetID="1" presetClass="entr" presetSubtype="0" fill="hold" grpId="0" nodeType="clickEffect">
+                                  <p:stCondLst>
+                                    <p:cond delay="0"/>
+                                  </p:stCondLst>
+                                  <p:childTnLst>
+                                    <p:set>
+                                      <p:cBhvr>
+                                        <p:cTn id="10" dur="1" fill="hold">
+                                          <p:stCondLst>
+                                            <p:cond delay="0"/>
+                                          </p:stCondLst>
+                                        </p:cTn>
+                                        <p:tgtEl>
+                                          <p:spTgt spid="3">
+                                            <p:txEl>
+                                              <p:pRg st="1" end="1"/>
+                                            </p:txEl>
+                                          </p:spTgt>
+                                        </p:tgtEl>
+                                        <p:attrNameLst>
+                                          <p:attrName>style.visibility</p:attrName>
+                                        </p:attrNameLst>
+                                      </p:cBhvr>
+                                      <p:to>
+                                        <p:strVal val="visible"/>
+                                      </p:to>
+                                    </p:set>
+                                  </p:childTnLst>
+                                </p:cTn>
+                              </p:par>
+                              <p:par>
+                                <p:cTn id="11" presetID="1" presetClass="entr" presetSubtype="0" fill="hold" grpId="0" nodeType="withEffect">
+                                  <p:stCondLst>
+                                    <p:cond delay="0"/>
+                                  </p:stCondLst>
+                                  <p:childTnLst>
+                                    <p:set>
+                                      <p:cBhvr>
+                                        <p:cTn id="12" dur="1" fill="hold">
+                                          <p:stCondLst>
+                                            <p:cond delay="0"/>
+                                          </p:stCondLst>
+                                        </p:cTn>
+                                        <p:tgtEl>
+                                          <p:spTgt spid="3">
+                                            <p:txEl>
+                                              <p:pRg st="2" end="2"/>
+                                            </p:txEl>
+                                          </p:spTgt>
+                                        </p:tgtEl>
+                                        <p:attrNameLst>
+                                          <p:attrName>style.visibility</p:attrName>
+                                        </p:attrNameLst>
+                                      </p:cBhvr>
+                                      <p:to>
+                                        <p:strVal val="visible"/>
+                                      </p:to>
+                                    </p:set>
+                                  </p:childTnLst>
+                                </p:cTn>
+                              </p:par>
+                            </p:childTnLst>
+                          </p:cTn>
+                        </p:par>
+                      </p:childTnLst>
+                    </p:cTn>
+                  </p:par>
+                  <p:par>
+                    <p:cTn id="13" fill="hold">
+                      <p:stCondLst>
+                        <p:cond delay="indefinite"/>
+                      </p:stCondLst>
+                      <p:childTnLst>
+                        <p:par>
+                          <p:cTn id="14" fill="hold">
+                            <p:stCondLst>
+                              <p:cond delay="0"/>
+                            </p:stCondLst>
+                            <p:childTnLst>
+                              <p:par>
+                                <p:cTn id="15" presetID="1" presetClass="entr" presetSubtype="0" fill="hold" grpId="0" nodeType="clickEffect">
+                                  <p:stCondLst>
+                                    <p:cond delay="0"/>
+                                  </p:stCondLst>
+                                  <p:childTnLst>
+                                    <p:set>
+                                      <p:cBhvr>
+                                        <p:cTn id="16" dur="1" fill="hold">
+                                          <p:stCondLst>
+                                            <p:cond delay="0"/>
+                                          </p:stCondLst>
+                                        </p:cTn>
+                                        <p:tgtEl>
+                                          <p:spTgt spid="3">
+                                            <p:txEl>
+                                              <p:pRg st="3" end="3"/>
+                                            </p:txEl>
+                                          </p:spTgt>
+                                        </p:tgtEl>
+                                        <p:attrNameLst>
+                                          <p:attrName>style.visibility</p:attrName>
+                                        </p:attrNameLst>
+                                      </p:cBhvr>
+                                      <p:to>
+                                        <p:strVal val="visible"/>
+                                      </p:to>
+                                    </p:set>
+                                  </p:childTnLst>
+                                </p:cTn>
+                              </p:par>
+                              <p:par>
+                                <p:cTn id="17" presetID="1" presetClass="entr" presetSubtype="0" fill="hold" grpId="0" nodeType="withEffect">
+                                  <p:stCondLst>
+                                    <p:cond delay="0"/>
+                                  </p:stCondLst>
+                                  <p:childTnLst>
+                                    <p:set>
+                                      <p:cBhvr>
+                                        <p:cTn id="18" dur="1" fill="hold">
+                                          <p:stCondLst>
+                                            <p:cond delay="0"/>
+                                          </p:stCondLst>
+                                        </p:cTn>
+                                        <p:tgtEl>
+                                          <p:spTgt spid="3">
+                                            <p:txEl>
+                                              <p:pRg st="4" end="4"/>
+                                            </p:txEl>
+                                          </p:spTgt>
+                                        </p:tgtEl>
+                                        <p:attrNameLst>
+                                          <p:attrName>style.visibility</p:attrName>
+                                        </p:attrNameLst>
+                                      </p:cBhvr>
+                                      <p:to>
+                                        <p:strVal val="visible"/>
+                                      </p:to>
+                                    </p:set>
+                                  </p:childTnLst>
+                                </p:cTn>
+                              </p:par>
+                            </p:childTnLst>
+                          </p:cTn>
+                        </p:par>
+                      </p:childTnLst>
+                    </p:cTn>
+                  </p:par>
+                  <p:par>
+                    <p:cTn id="19" fill="hold">
+                      <p:stCondLst>
+                        <p:cond delay="indefinite"/>
+                      </p:stCondLst>
+                      <p:childTnLst>
+                        <p:par>
+                          <p:cTn id="20" fill="hold">
+                            <p:stCondLst>
+                              <p:cond delay="0"/>
+                            </p:stCondLst>
+                            <p:childTnLst>
+                              <p:par>
+                                <p:cTn id="21" presetID="1" presetClass="entr" presetSubtype="0" fill="hold" grpId="0" nodeType="clickEffect">
+                                  <p:stCondLst>
+                                    <p:cond delay="0"/>
+                                  </p:stCondLst>
+                                  <p:childTnLst>
+                                    <p:set>
+                                      <p:cBhvr>
+                                        <p:cTn id="22" dur="1" fill="hold">
+                                          <p:stCondLst>
+                                            <p:cond delay="0"/>
+                                          </p:stCondLst>
+                                        </p:cTn>
+                                        <p:tgtEl>
+                                          <p:spTgt spid="3">
+                                            <p:txEl>
+                                              <p:pRg st="5" end="5"/>
+                                            </p:txEl>
+                                          </p:spTgt>
+                                        </p:tgtEl>
+                                        <p:attrNameLst>
+                                          <p:attrName>style.visibility</p:attrName>
+                                        </p:attrNameLst>
+                                      </p:cBhvr>
+                                      <p:to>
+                                        <p:strVal val="visible"/>
+                                      </p:to>
+                                    </p:set>
+                                  </p:childTnLst>
+                                </p:cTn>
+                              </p:par>
+                              <p:par>
+                                <p:cTn id="23" presetID="1" presetClass="entr" presetSubtype="0" fill="hold" grpId="0" nodeType="withEffect">
+                                  <p:stCondLst>
+                                    <p:cond delay="0"/>
+                                  </p:stCondLst>
+                                  <p:childTnLst>
+                                    <p:set>
+                                      <p:cBhvr>
+                                        <p:cTn id="24" dur="1" fill="hold">
+                                          <p:stCondLst>
+                                            <p:cond delay="0"/>
+                                          </p:stCondLst>
+                                        </p:cTn>
+                                        <p:tgtEl>
+                                          <p:spTgt spid="3">
+                                            <p:txEl>
+                                              <p:pRg st="6" end="6"/>
+                                            </p:txEl>
+                                          </p:spTgt>
+                                        </p:tgtEl>
+                                        <p:attrNameLst>
+                                          <p:attrName>style.visibility</p:attrName>
+                                        </p:attrNameLst>
+                                      </p:cBhvr>
+                                      <p:to>
+                                        <p:strVal val="visible"/>
+                                      </p:to>
+                                    </p:set>
+                                  </p:childTnLst>
+                                </p:cTn>
+                              </p:par>
+                            </p:childTnLst>
+                          </p:cTn>
+                        </p:par>
+                      </p:childTnLst>
+                    </p:cTn>
+                  </p:par>
+                  <p:par>
+                    <p:cTn id="25" fill="hold">
+                      <p:stCondLst>
+                        <p:cond delay="indefinite"/>
+                      </p:stCondLst>
+                      <p:childTnLst>
+                        <p:par>
+                          <p:cTn id="26" fill="hold">
+                            <p:stCondLst>
+                              <p:cond delay="0"/>
+                            </p:stCondLst>
+                            <p:childTnLst>
+                              <p:par>
+                                <p:cTn id="27" presetID="1" presetClass="entr" presetSubtype="0" fill="hold" nodeType="clickEffect">
+                                  <p:stCondLst>
+                                    <p:cond delay="0"/>
+                                  </p:stCondLst>
+                                  <p:childTnLst>
+                                    <p:set>
+                                      <p:cBhvr>
+                                        <p:cTn id="28" dur="1" fill="hold">
+                                          <p:stCondLst>
+                                            <p:cond delay="0"/>
+                                          </p:stCondLst>
+                                        </p:cTn>
+                                        <p:tgtEl>
+                                          <p:spTgt spid="7"/>
+                                        </p:tgtEl>
+                                        <p:attrNameLst>
+                                          <p:attrName>style.visibility</p:attrName>
+                                        </p:attrNameLst>
+                                      </p:cBhvr>
+                                      <p:to>
+                                        <p:strVal val="visible"/>
+                                      </p:to>
+                                    </p:set>
+                                  </p:childTnLst>
+                                </p:cTn>
+                              </p:par>
+                            </p:childTnLst>
+                          </p:cTn>
+                        </p:par>
+                      </p:childTnLst>
+                    </p:cTn>
+                  </p:par>
+                  <p:par>
+                    <p:cTn id="29" fill="hold">
+                      <p:stCondLst>
+                        <p:cond delay="indefinite"/>
+                      </p:stCondLst>
+                      <p:childTnLst>
+                        <p:par>
+                          <p:cTn id="30" fill="hold">
+                            <p:stCondLst>
+                              <p:cond delay="0"/>
+                            </p:stCondLst>
+                            <p:childTnLst>
+                              <p:par>
+                                <p:cTn id="31" presetID="1" presetClass="entr" presetSubtype="0" fill="hold" grpId="0" nodeType="clickEffect">
+                                  <p:stCondLst>
+                                    <p:cond delay="0"/>
+                                  </p:stCondLst>
+                                  <p:childTnLst>
+                                    <p:set>
+                                      <p:cBhvr>
+                                        <p:cTn id="32" dur="1" fill="hold">
+                                          <p:stCondLst>
+                                            <p:cond delay="0"/>
+                                          </p:stCondLst>
+                                        </p:cTn>
+                                        <p:tgtEl>
+                                          <p:spTgt spid="3">
+                                            <p:txEl>
+                                              <p:pRg st="7" end="7"/>
+                                            </p:txEl>
+                                          </p:spTgt>
+                                        </p:tgtEl>
+                                        <p:attrNameLst>
+                                          <p:attrName>style.visibility</p:attrName>
+                                        </p:attrNameLst>
+                                      </p:cBhvr>
+                                      <p:to>
+                                        <p:strVal val="visible"/>
+                                      </p:to>
+                                    </p:set>
+                                  </p:childTnLst>
+                                </p:cTn>
+                              </p:par>
+                              <p:par>
+                                <p:cTn id="33" presetID="1" presetClass="entr" presetSubtype="0" fill="hold" grpId="0" nodeType="withEffect">
+                                  <p:stCondLst>
+                                    <p:cond delay="0"/>
+                                  </p:stCondLst>
+                                  <p:childTnLst>
+                                    <p:set>
+                                      <p:cBhvr>
+                                        <p:cTn id="34" dur="1" fill="hold">
+                                          <p:stCondLst>
+                                            <p:cond delay="0"/>
+                                          </p:stCondLst>
+                                        </p:cTn>
+                                        <p:tgtEl>
+                                          <p:spTgt spid="3">
+                                            <p:txEl>
+                                              <p:pRg st="8" end="8"/>
+                                            </p:txEl>
+                                          </p:spTgt>
+                                        </p:tgtEl>
+                                        <p:attrNameLst>
+                                          <p:attrName>style.visibility</p:attrName>
+                                        </p:attrNameLst>
+                                      </p:cBhvr>
+                                      <p:to>
+                                        <p:strVal val="visible"/>
+                                      </p:to>
+                                    </p:set>
+                                  </p:childTnLst>
+                                </p:cTn>
+                              </p:par>
+                            </p:childTnLst>
+                          </p:cTn>
+                        </p:par>
+                      </p:childTnLst>
+                    </p:cTn>
+                  </p:par>
+                </p:childTnLst>
+              </p:cTn>
+              <p:prevCondLst>
+                <p:cond evt="onPrev" delay="0">
+                  <p:tgtEl>
+                    <p:sldTgt/>
+                  </p:tgtEl>
+                </p:cond>
+              </p:prevCondLst>
+              <p:nextCondLst>
+                <p:cond evt="onNext" delay="0">
+                  <p:tgtEl>
+                    <p:sldTgt/>
+                  </p:tgtEl>
+                </p:cond>
+              </p:nextCondLst>
+            </p:seq>
+          </p:childTnLst>
+        </p:cTn>
+      </p:par>
+    </p:tnLst>
+    <p:bldLst>
+      <p:bldP spid="3" grpId="0" uiExpand="1" build="p" bldLvl="2"/>
+    </p:bldLst>
+  </p:timing>
+</p:sld>
+</file>
+
+<file path=ppt/slides/slide40.xml><?xml version="1.0" encoding="utf-8"?>
 <p:sld xmlns:a="http://schemas.openxmlformats.org/drawingml/2006/main" xmlns:r="http://schemas.openxmlformats.org/officeDocument/2006/relationships" xmlns:p="http://schemas.openxmlformats.org/presentationml/2006/main">
   <p:cSld>
     <p:spTree>
@@ -32806,7 +33731,7 @@
           <a:p>
             <a:fld id="{6597116C-F94B-4B5B-973A-17F07FB5C418}" type="slidenum">
               <a:rPr lang="nl-BE" smtClean="0"/>
-              <a:t>38</a:t>
+              <a:t>40</a:t>
             </a:fld>
             <a:endParaRPr lang="nl-BE"/>
           </a:p>
@@ -32951,7 +33876,7 @@
 </p:sld>
 </file>
 
-<file path=ppt/slides/slide39.xml><?xml version="1.0" encoding="utf-8"?>
+<file path=ppt/slides/slide41.xml><?xml version="1.0" encoding="utf-8"?>
 <p:sld xmlns:a="http://schemas.openxmlformats.org/drawingml/2006/main" xmlns:r="http://schemas.openxmlformats.org/officeDocument/2006/relationships" xmlns:p="http://schemas.openxmlformats.org/presentationml/2006/main">
   <p:cSld>
     <p:spTree>
@@ -33169,7 +34094,7 @@
           <a:p>
             <a:fld id="{6597116C-F94B-4B5B-973A-17F07FB5C418}" type="slidenum">
               <a:rPr lang="nl-BE" smtClean="0"/>
-              <a:t>39</a:t>
+              <a:t>41</a:t>
             </a:fld>
             <a:endParaRPr lang="nl-BE"/>
           </a:p>
@@ -33236,719 +34161,6 @@
         <p:cTn id="1" dur="indefinite" restart="never" nodeType="tmRoot"/>
       </p:par>
     </p:tnLst>
-  </p:timing>
-</p:sld>
-</file>
-
-<file path=ppt/slides/slide4.xml><?xml version="1.0" encoding="utf-8"?>
-<p:sld xmlns:a="http://schemas.openxmlformats.org/drawingml/2006/main" xmlns:r="http://schemas.openxmlformats.org/officeDocument/2006/relationships" xmlns:p="http://schemas.openxmlformats.org/presentationml/2006/main">
-  <p:cSld>
-    <p:spTree>
-      <p:nvGrpSpPr>
-        <p:cNvPr id="1" name=""/>
-        <p:cNvGrpSpPr/>
-        <p:nvPr/>
-      </p:nvGrpSpPr>
-      <p:grpSpPr>
-        <a:xfrm>
-          <a:off x="0" y="0"/>
-          <a:ext cx="0" cy="0"/>
-          <a:chOff x="0" y="0"/>
-          <a:chExt cx="0" cy="0"/>
-        </a:xfrm>
-      </p:grpSpPr>
-      <p:sp>
-        <p:nvSpPr>
-          <p:cNvPr id="2" name="Title 1"/>
-          <p:cNvSpPr>
-            <a:spLocks noGrp="1"/>
-          </p:cNvSpPr>
-          <p:nvPr>
-            <p:ph type="title"/>
-          </p:nvPr>
-        </p:nvSpPr>
-        <p:spPr/>
-        <p:txBody>
-          <a:bodyPr/>
-          <a:lstStyle/>
-          <a:p>
-            <a:r>
-              <a:rPr lang="en-US" dirty="0" smtClean="0"/>
-              <a:t>Parallelism</a:t>
-            </a:r>
-            <a:endParaRPr lang="en-US" dirty="0"/>
-          </a:p>
-        </p:txBody>
-      </p:sp>
-      <p:sp>
-        <p:nvSpPr>
-          <p:cNvPr id="3" name="Content Placeholder 2"/>
-          <p:cNvSpPr>
-            <a:spLocks noGrp="1"/>
-          </p:cNvSpPr>
-          <p:nvPr>
-            <p:ph idx="1"/>
-          </p:nvPr>
-        </p:nvSpPr>
-        <p:spPr/>
-        <p:txBody>
-          <a:bodyPr/>
-          <a:lstStyle/>
-          <a:p>
-            <a:r>
-              <a:rPr lang="en-US" dirty="0" smtClean="0"/>
-              <a:t>Levels</a:t>
-            </a:r>
-          </a:p>
-          <a:p>
-            <a:pPr lvl="1"/>
-            <a:r>
-              <a:rPr lang="en-US" dirty="0" smtClean="0"/>
-              <a:t>vectorization</a:t>
-            </a:r>
-          </a:p>
-          <a:p>
-            <a:pPr lvl="2"/>
-            <a:r>
-              <a:rPr lang="en-US" dirty="0" smtClean="0"/>
-              <a:t>compiler flags, programmer can/should help</a:t>
-            </a:r>
-          </a:p>
-          <a:p>
-            <a:pPr lvl="1"/>
-            <a:r>
-              <a:rPr lang="en-US" dirty="0" smtClean="0"/>
-              <a:t>multicore</a:t>
-            </a:r>
-          </a:p>
-          <a:p>
-            <a:pPr lvl="2"/>
-            <a:r>
-              <a:rPr lang="en-US" dirty="0" err="1" smtClean="0"/>
-              <a:t>OpenMP</a:t>
-            </a:r>
-            <a:r>
-              <a:rPr lang="en-US" dirty="0" smtClean="0"/>
-              <a:t>/</a:t>
-            </a:r>
-            <a:r>
-              <a:rPr lang="en-US" dirty="0" err="1" smtClean="0"/>
-              <a:t>pthreads</a:t>
-            </a:r>
-            <a:r>
-              <a:rPr lang="en-US" dirty="0" smtClean="0"/>
-              <a:t>: programmer's job</a:t>
-            </a:r>
-          </a:p>
-          <a:p>
-            <a:pPr lvl="1"/>
-            <a:r>
-              <a:rPr lang="en-US" dirty="0" smtClean="0"/>
-              <a:t>multiple nodes, i.e., distributed</a:t>
-            </a:r>
-          </a:p>
-          <a:p>
-            <a:pPr lvl="2"/>
-            <a:r>
-              <a:rPr lang="en-US" dirty="0" smtClean="0"/>
-              <a:t>MPI/CAF/UPC/Chapel: programmer's job</a:t>
-            </a:r>
-          </a:p>
-          <a:p>
-            <a:pPr lvl="1"/>
-            <a:r>
-              <a:rPr lang="en-US" dirty="0" smtClean="0"/>
-              <a:t>GPGPU</a:t>
-            </a:r>
-          </a:p>
-          <a:p>
-            <a:pPr lvl="2"/>
-            <a:r>
-              <a:rPr lang="en-US" dirty="0" smtClean="0"/>
-              <a:t>CUDA/</a:t>
-            </a:r>
-            <a:r>
-              <a:rPr lang="en-US" dirty="0" err="1" smtClean="0"/>
-              <a:t>OpenACC</a:t>
-            </a:r>
-            <a:r>
-              <a:rPr lang="en-US" dirty="0" smtClean="0"/>
-              <a:t>/OpenCL: programmer's job</a:t>
-            </a:r>
-            <a:endParaRPr lang="en-US" dirty="0"/>
-          </a:p>
-        </p:txBody>
-      </p:sp>
-      <p:sp>
-        <p:nvSpPr>
-          <p:cNvPr id="4" name="Slide Number Placeholder 3"/>
-          <p:cNvSpPr>
-            <a:spLocks noGrp="1"/>
-          </p:cNvSpPr>
-          <p:nvPr>
-            <p:ph type="sldNum" sz="quarter" idx="12"/>
-          </p:nvPr>
-        </p:nvSpPr>
-        <p:spPr/>
-        <p:txBody>
-          <a:bodyPr/>
-          <a:lstStyle/>
-          <a:p>
-            <a:fld id="{6597116C-F94B-4B5B-973A-17F07FB5C418}" type="slidenum">
-              <a:rPr lang="nl-BE" smtClean="0"/>
-              <a:t>4</a:t>
-            </a:fld>
-            <a:endParaRPr lang="nl-BE"/>
-          </a:p>
-        </p:txBody>
-      </p:sp>
-      <p:grpSp>
-        <p:nvGrpSpPr>
-          <p:cNvPr id="7" name="Group 6"/>
-          <p:cNvGrpSpPr/>
-          <p:nvPr/>
-        </p:nvGrpSpPr>
-        <p:grpSpPr>
-          <a:xfrm>
-            <a:off x="6981290" y="3284984"/>
-            <a:ext cx="1479142" cy="1656184"/>
-            <a:chOff x="6553200" y="3284984"/>
-            <a:chExt cx="1479142" cy="1656184"/>
-          </a:xfrm>
-        </p:grpSpPr>
-        <p:sp>
-          <p:nvSpPr>
-            <p:cNvPr id="5" name="Right Brace 4"/>
-            <p:cNvSpPr/>
-            <p:nvPr/>
-          </p:nvSpPr>
-          <p:spPr>
-            <a:xfrm>
-              <a:off x="6553200" y="3284984"/>
-              <a:ext cx="179040" cy="1656184"/>
-            </a:xfrm>
-            <a:prstGeom prst="rightBrace">
-              <a:avLst/>
-            </a:prstGeom>
-            <a:ln>
-              <a:solidFill>
-                <a:schemeClr val="tx1"/>
-              </a:solidFill>
-            </a:ln>
-          </p:spPr>
-          <p:style>
-            <a:lnRef idx="1">
-              <a:schemeClr val="accent1"/>
-            </a:lnRef>
-            <a:fillRef idx="0">
-              <a:schemeClr val="accent1"/>
-            </a:fillRef>
-            <a:effectRef idx="0">
-              <a:schemeClr val="accent1"/>
-            </a:effectRef>
-            <a:fontRef idx="minor">
-              <a:schemeClr val="tx1"/>
-            </a:fontRef>
-          </p:style>
-          <p:txBody>
-            <a:bodyPr rtlCol="0" anchor="ctr"/>
-            <a:lstStyle/>
-            <a:p>
-              <a:pPr algn="ctr"/>
-              <a:endParaRPr lang="en-US"/>
-            </a:p>
-          </p:txBody>
-        </p:sp>
-        <p:sp>
-          <p:nvSpPr>
-            <p:cNvPr id="6" name="TextBox 5"/>
-            <p:cNvSpPr txBox="1"/>
-            <p:nvPr/>
-          </p:nvSpPr>
-          <p:spPr>
-            <a:xfrm>
-              <a:off x="6876256" y="3851466"/>
-              <a:ext cx="1156086" cy="523220"/>
-            </a:xfrm>
-            <a:prstGeom prst="rect">
-              <a:avLst/>
-            </a:prstGeom>
-            <a:noFill/>
-          </p:spPr>
-          <p:txBody>
-            <a:bodyPr wrap="none" rtlCol="0">
-              <a:spAutoFit/>
-            </a:bodyPr>
-            <a:lstStyle/>
-            <a:p>
-              <a:r>
-                <a:rPr lang="en-US" sz="2800" dirty="0" smtClean="0"/>
-                <a:t>Hybrid</a:t>
-              </a:r>
-              <a:endParaRPr lang="en-US" sz="2800" dirty="0"/>
-            </a:p>
-          </p:txBody>
-        </p:sp>
-      </p:grpSp>
-    </p:spTree>
-    <p:extLst>
-      <p:ext uri="{BB962C8B-B14F-4D97-AF65-F5344CB8AC3E}">
-        <p14:creationId xmlns:p14="http://schemas.microsoft.com/office/powerpoint/2010/main" val="1972215598"/>
-      </p:ext>
-    </p:extLst>
-  </p:cSld>
-  <p:clrMapOvr>
-    <a:masterClrMapping/>
-  </p:clrMapOvr>
-  <p:timing>
-    <p:tnLst>
-      <p:par>
-        <p:cTn id="1" dur="indefinite" restart="never" nodeType="tmRoot">
-          <p:childTnLst>
-            <p:seq concurrent="1" nextAc="seek">
-              <p:cTn id="2" dur="indefinite" nodeType="mainSeq">
-                <p:childTnLst>
-                  <p:par>
-                    <p:cTn id="3" fill="hold">
-                      <p:stCondLst>
-                        <p:cond delay="indefinite"/>
-                        <p:cond evt="onBegin" delay="0">
-                          <p:tn val="2"/>
-                        </p:cond>
-                      </p:stCondLst>
-                      <p:childTnLst>
-                        <p:par>
-                          <p:cTn id="4" fill="hold">
-                            <p:stCondLst>
-                              <p:cond delay="0"/>
-                            </p:stCondLst>
-                            <p:childTnLst>
-                              <p:par>
-                                <p:cTn id="5" presetID="1" presetClass="entr" presetSubtype="0" fill="hold" grpId="0" nodeType="withEffect">
-                                  <p:stCondLst>
-                                    <p:cond delay="0"/>
-                                  </p:stCondLst>
-                                  <p:childTnLst>
-                                    <p:set>
-                                      <p:cBhvr>
-                                        <p:cTn id="6" dur="1" fill="hold">
-                                          <p:stCondLst>
-                                            <p:cond delay="0"/>
-                                          </p:stCondLst>
-                                        </p:cTn>
-                                        <p:tgtEl>
-                                          <p:spTgt spid="3">
-                                            <p:txEl>
-                                              <p:pRg st="0" end="0"/>
-                                            </p:txEl>
-                                          </p:spTgt>
-                                        </p:tgtEl>
-                                        <p:attrNameLst>
-                                          <p:attrName>style.visibility</p:attrName>
-                                        </p:attrNameLst>
-                                      </p:cBhvr>
-                                      <p:to>
-                                        <p:strVal val="visible"/>
-                                      </p:to>
-                                    </p:set>
-                                  </p:childTnLst>
-                                </p:cTn>
-                              </p:par>
-                            </p:childTnLst>
-                          </p:cTn>
-                        </p:par>
-                      </p:childTnLst>
-                    </p:cTn>
-                  </p:par>
-                  <p:par>
-                    <p:cTn id="7" fill="hold">
-                      <p:stCondLst>
-                        <p:cond delay="indefinite"/>
-                      </p:stCondLst>
-                      <p:childTnLst>
-                        <p:par>
-                          <p:cTn id="8" fill="hold">
-                            <p:stCondLst>
-                              <p:cond delay="0"/>
-                            </p:stCondLst>
-                            <p:childTnLst>
-                              <p:par>
-                                <p:cTn id="9" presetID="1" presetClass="entr" presetSubtype="0" fill="hold" grpId="0" nodeType="clickEffect">
-                                  <p:stCondLst>
-                                    <p:cond delay="0"/>
-                                  </p:stCondLst>
-                                  <p:childTnLst>
-                                    <p:set>
-                                      <p:cBhvr>
-                                        <p:cTn id="10" dur="1" fill="hold">
-                                          <p:stCondLst>
-                                            <p:cond delay="0"/>
-                                          </p:stCondLst>
-                                        </p:cTn>
-                                        <p:tgtEl>
-                                          <p:spTgt spid="3">
-                                            <p:txEl>
-                                              <p:pRg st="1" end="1"/>
-                                            </p:txEl>
-                                          </p:spTgt>
-                                        </p:tgtEl>
-                                        <p:attrNameLst>
-                                          <p:attrName>style.visibility</p:attrName>
-                                        </p:attrNameLst>
-                                      </p:cBhvr>
-                                      <p:to>
-                                        <p:strVal val="visible"/>
-                                      </p:to>
-                                    </p:set>
-                                  </p:childTnLst>
-                                </p:cTn>
-                              </p:par>
-                              <p:par>
-                                <p:cTn id="11" presetID="1" presetClass="entr" presetSubtype="0" fill="hold" grpId="0" nodeType="withEffect">
-                                  <p:stCondLst>
-                                    <p:cond delay="0"/>
-                                  </p:stCondLst>
-                                  <p:childTnLst>
-                                    <p:set>
-                                      <p:cBhvr>
-                                        <p:cTn id="12" dur="1" fill="hold">
-                                          <p:stCondLst>
-                                            <p:cond delay="0"/>
-                                          </p:stCondLst>
-                                        </p:cTn>
-                                        <p:tgtEl>
-                                          <p:spTgt spid="3">
-                                            <p:txEl>
-                                              <p:pRg st="2" end="2"/>
-                                            </p:txEl>
-                                          </p:spTgt>
-                                        </p:tgtEl>
-                                        <p:attrNameLst>
-                                          <p:attrName>style.visibility</p:attrName>
-                                        </p:attrNameLst>
-                                      </p:cBhvr>
-                                      <p:to>
-                                        <p:strVal val="visible"/>
-                                      </p:to>
-                                    </p:set>
-                                  </p:childTnLst>
-                                </p:cTn>
-                              </p:par>
-                            </p:childTnLst>
-                          </p:cTn>
-                        </p:par>
-                      </p:childTnLst>
-                    </p:cTn>
-                  </p:par>
-                  <p:par>
-                    <p:cTn id="13" fill="hold">
-                      <p:stCondLst>
-                        <p:cond delay="indefinite"/>
-                      </p:stCondLst>
-                      <p:childTnLst>
-                        <p:par>
-                          <p:cTn id="14" fill="hold">
-                            <p:stCondLst>
-                              <p:cond delay="0"/>
-                            </p:stCondLst>
-                            <p:childTnLst>
-                              <p:par>
-                                <p:cTn id="15" presetID="1" presetClass="entr" presetSubtype="0" fill="hold" grpId="0" nodeType="clickEffect">
-                                  <p:stCondLst>
-                                    <p:cond delay="0"/>
-                                  </p:stCondLst>
-                                  <p:childTnLst>
-                                    <p:set>
-                                      <p:cBhvr>
-                                        <p:cTn id="16" dur="1" fill="hold">
-                                          <p:stCondLst>
-                                            <p:cond delay="0"/>
-                                          </p:stCondLst>
-                                        </p:cTn>
-                                        <p:tgtEl>
-                                          <p:spTgt spid="3">
-                                            <p:txEl>
-                                              <p:pRg st="3" end="3"/>
-                                            </p:txEl>
-                                          </p:spTgt>
-                                        </p:tgtEl>
-                                        <p:attrNameLst>
-                                          <p:attrName>style.visibility</p:attrName>
-                                        </p:attrNameLst>
-                                      </p:cBhvr>
-                                      <p:to>
-                                        <p:strVal val="visible"/>
-                                      </p:to>
-                                    </p:set>
-                                  </p:childTnLst>
-                                </p:cTn>
-                              </p:par>
-                              <p:par>
-                                <p:cTn id="17" presetID="1" presetClass="entr" presetSubtype="0" fill="hold" grpId="0" nodeType="withEffect">
-                                  <p:stCondLst>
-                                    <p:cond delay="0"/>
-                                  </p:stCondLst>
-                                  <p:childTnLst>
-                                    <p:set>
-                                      <p:cBhvr>
-                                        <p:cTn id="18" dur="1" fill="hold">
-                                          <p:stCondLst>
-                                            <p:cond delay="0"/>
-                                          </p:stCondLst>
-                                        </p:cTn>
-                                        <p:tgtEl>
-                                          <p:spTgt spid="3">
-                                            <p:txEl>
-                                              <p:pRg st="4" end="4"/>
-                                            </p:txEl>
-                                          </p:spTgt>
-                                        </p:tgtEl>
-                                        <p:attrNameLst>
-                                          <p:attrName>style.visibility</p:attrName>
-                                        </p:attrNameLst>
-                                      </p:cBhvr>
-                                      <p:to>
-                                        <p:strVal val="visible"/>
-                                      </p:to>
-                                    </p:set>
-                                  </p:childTnLst>
-                                </p:cTn>
-                              </p:par>
-                            </p:childTnLst>
-                          </p:cTn>
-                        </p:par>
-                      </p:childTnLst>
-                    </p:cTn>
-                  </p:par>
-                  <p:par>
-                    <p:cTn id="19" fill="hold">
-                      <p:stCondLst>
-                        <p:cond delay="indefinite"/>
-                      </p:stCondLst>
-                      <p:childTnLst>
-                        <p:par>
-                          <p:cTn id="20" fill="hold">
-                            <p:stCondLst>
-                              <p:cond delay="0"/>
-                            </p:stCondLst>
-                            <p:childTnLst>
-                              <p:par>
-                                <p:cTn id="21" presetID="1" presetClass="entr" presetSubtype="0" fill="hold" grpId="0" nodeType="clickEffect">
-                                  <p:stCondLst>
-                                    <p:cond delay="0"/>
-                                  </p:stCondLst>
-                                  <p:childTnLst>
-                                    <p:set>
-                                      <p:cBhvr>
-                                        <p:cTn id="22" dur="1" fill="hold">
-                                          <p:stCondLst>
-                                            <p:cond delay="0"/>
-                                          </p:stCondLst>
-                                        </p:cTn>
-                                        <p:tgtEl>
-                                          <p:spTgt spid="3">
-                                            <p:txEl>
-                                              <p:pRg st="5" end="5"/>
-                                            </p:txEl>
-                                          </p:spTgt>
-                                        </p:tgtEl>
-                                        <p:attrNameLst>
-                                          <p:attrName>style.visibility</p:attrName>
-                                        </p:attrNameLst>
-                                      </p:cBhvr>
-                                      <p:to>
-                                        <p:strVal val="visible"/>
-                                      </p:to>
-                                    </p:set>
-                                  </p:childTnLst>
-                                </p:cTn>
-                              </p:par>
-                              <p:par>
-                                <p:cTn id="23" presetID="1" presetClass="entr" presetSubtype="0" fill="hold" grpId="0" nodeType="withEffect">
-                                  <p:stCondLst>
-                                    <p:cond delay="0"/>
-                                  </p:stCondLst>
-                                  <p:childTnLst>
-                                    <p:set>
-                                      <p:cBhvr>
-                                        <p:cTn id="24" dur="1" fill="hold">
-                                          <p:stCondLst>
-                                            <p:cond delay="0"/>
-                                          </p:stCondLst>
-                                        </p:cTn>
-                                        <p:tgtEl>
-                                          <p:spTgt spid="3">
-                                            <p:txEl>
-                                              <p:pRg st="6" end="6"/>
-                                            </p:txEl>
-                                          </p:spTgt>
-                                        </p:tgtEl>
-                                        <p:attrNameLst>
-                                          <p:attrName>style.visibility</p:attrName>
-                                        </p:attrNameLst>
-                                      </p:cBhvr>
-                                      <p:to>
-                                        <p:strVal val="visible"/>
-                                      </p:to>
-                                    </p:set>
-                                  </p:childTnLst>
-                                </p:cTn>
-                              </p:par>
-                            </p:childTnLst>
-                          </p:cTn>
-                        </p:par>
-                      </p:childTnLst>
-                    </p:cTn>
-                  </p:par>
-                  <p:par>
-                    <p:cTn id="25" fill="hold">
-                      <p:stCondLst>
-                        <p:cond delay="indefinite"/>
-                      </p:stCondLst>
-                      <p:childTnLst>
-                        <p:par>
-                          <p:cTn id="26" fill="hold">
-                            <p:stCondLst>
-                              <p:cond delay="0"/>
-                            </p:stCondLst>
-                            <p:childTnLst>
-                              <p:par>
-                                <p:cTn id="27" presetID="1" presetClass="entr" presetSubtype="0" fill="hold" nodeType="clickEffect">
-                                  <p:stCondLst>
-                                    <p:cond delay="0"/>
-                                  </p:stCondLst>
-                                  <p:childTnLst>
-                                    <p:set>
-                                      <p:cBhvr>
-                                        <p:cTn id="28" dur="1" fill="hold">
-                                          <p:stCondLst>
-                                            <p:cond delay="0"/>
-                                          </p:stCondLst>
-                                        </p:cTn>
-                                        <p:tgtEl>
-                                          <p:spTgt spid="7"/>
-                                        </p:tgtEl>
-                                        <p:attrNameLst>
-                                          <p:attrName>style.visibility</p:attrName>
-                                        </p:attrNameLst>
-                                      </p:cBhvr>
-                                      <p:to>
-                                        <p:strVal val="visible"/>
-                                      </p:to>
-                                    </p:set>
-                                  </p:childTnLst>
-                                </p:cTn>
-                              </p:par>
-                            </p:childTnLst>
-                          </p:cTn>
-                        </p:par>
-                      </p:childTnLst>
-                    </p:cTn>
-                  </p:par>
-                  <p:par>
-                    <p:cTn id="29" fill="hold">
-                      <p:stCondLst>
-                        <p:cond delay="indefinite"/>
-                      </p:stCondLst>
-                      <p:childTnLst>
-                        <p:par>
-                          <p:cTn id="30" fill="hold">
-                            <p:stCondLst>
-                              <p:cond delay="0"/>
-                            </p:stCondLst>
-                            <p:childTnLst>
-                              <p:par>
-                                <p:cTn id="31" presetID="1" presetClass="entr" presetSubtype="0" fill="hold" grpId="0" nodeType="clickEffect">
-                                  <p:stCondLst>
-                                    <p:cond delay="0"/>
-                                  </p:stCondLst>
-                                  <p:childTnLst>
-                                    <p:set>
-                                      <p:cBhvr>
-                                        <p:cTn id="32" dur="1" fill="hold">
-                                          <p:stCondLst>
-                                            <p:cond delay="0"/>
-                                          </p:stCondLst>
-                                        </p:cTn>
-                                        <p:tgtEl>
-                                          <p:spTgt spid="3">
-                                            <p:txEl>
-                                              <p:pRg st="7" end="7"/>
-                                            </p:txEl>
-                                          </p:spTgt>
-                                        </p:tgtEl>
-                                        <p:attrNameLst>
-                                          <p:attrName>style.visibility</p:attrName>
-                                        </p:attrNameLst>
-                                      </p:cBhvr>
-                                      <p:to>
-                                        <p:strVal val="visible"/>
-                                      </p:to>
-                                    </p:set>
-                                  </p:childTnLst>
-                                </p:cTn>
-                              </p:par>
-                              <p:par>
-                                <p:cTn id="33" presetID="1" presetClass="entr" presetSubtype="0" fill="hold" grpId="0" nodeType="withEffect">
-                                  <p:stCondLst>
-                                    <p:cond delay="0"/>
-                                  </p:stCondLst>
-                                  <p:childTnLst>
-                                    <p:set>
-                                      <p:cBhvr>
-                                        <p:cTn id="34" dur="1" fill="hold">
-                                          <p:stCondLst>
-                                            <p:cond delay="0"/>
-                                          </p:stCondLst>
-                                        </p:cTn>
-                                        <p:tgtEl>
-                                          <p:spTgt spid="3">
-                                            <p:txEl>
-                                              <p:pRg st="8" end="8"/>
-                                            </p:txEl>
-                                          </p:spTgt>
-                                        </p:tgtEl>
-                                        <p:attrNameLst>
-                                          <p:attrName>style.visibility</p:attrName>
-                                        </p:attrNameLst>
-                                      </p:cBhvr>
-                                      <p:to>
-                                        <p:strVal val="visible"/>
-                                      </p:to>
-                                    </p:set>
-                                  </p:childTnLst>
-                                </p:cTn>
-                              </p:par>
-                            </p:childTnLst>
-                          </p:cTn>
-                        </p:par>
-                      </p:childTnLst>
-                    </p:cTn>
-                  </p:par>
-                </p:childTnLst>
-              </p:cTn>
-              <p:prevCondLst>
-                <p:cond evt="onPrev" delay="0">
-                  <p:tgtEl>
-                    <p:sldTgt/>
-                  </p:tgtEl>
-                </p:cond>
-              </p:prevCondLst>
-              <p:nextCondLst>
-                <p:cond evt="onNext" delay="0">
-                  <p:tgtEl>
-                    <p:sldTgt/>
-                  </p:tgtEl>
-                </p:cond>
-              </p:nextCondLst>
-            </p:seq>
-          </p:childTnLst>
-        </p:cTn>
-      </p:par>
-    </p:tnLst>
-    <p:bldLst>
-      <p:bldP spid="3" grpId="0" uiExpand="1" build="p" bldLvl="2"/>
-    </p:bldLst>
   </p:timing>
 </p:sld>
 </file>

</xml_diff>

<commit_message>
Add discussion of false sharing
</commit_message>
<xml_diff>
--- a/Optimization/hpc_efficiency_false_sharing.pptx
+++ b/Optimization/hpc_efficiency_false_sharing.pptx
@@ -5,7 +5,7 @@
     <p:sldMasterId id="2147483648" r:id="rId1"/>
   </p:sldMasterIdLst>
   <p:notesMasterIdLst>
-    <p:notesMasterId r:id="rId43"/>
+    <p:notesMasterId r:id="rId45"/>
   </p:notesMasterIdLst>
   <p:sldIdLst>
     <p:sldId id="267" r:id="rId2"/>
@@ -43,12 +43,14 @@
     <p:sldId id="298" r:id="rId34"/>
     <p:sldId id="299" r:id="rId35"/>
     <p:sldId id="300" r:id="rId36"/>
-    <p:sldId id="287" r:id="rId37"/>
-    <p:sldId id="292" r:id="rId38"/>
-    <p:sldId id="286" r:id="rId39"/>
-    <p:sldId id="297" r:id="rId40"/>
-    <p:sldId id="271" r:id="rId41"/>
-    <p:sldId id="283" r:id="rId42"/>
+    <p:sldId id="301" r:id="rId37"/>
+    <p:sldId id="302" r:id="rId38"/>
+    <p:sldId id="287" r:id="rId39"/>
+    <p:sldId id="292" r:id="rId40"/>
+    <p:sldId id="286" r:id="rId41"/>
+    <p:sldId id="297" r:id="rId42"/>
+    <p:sldId id="271" r:id="rId43"/>
+    <p:sldId id="283" r:id="rId44"/>
   </p:sldIdLst>
   <p:sldSz cx="9144000" cy="6858000" type="screen4x3"/>
   <p:notesSz cx="6858000" cy="9144000"/>
@@ -211,6 +213,8 @@
           <p14:sldIdLst>
             <p14:sldId id="299"/>
             <p14:sldId id="300"/>
+            <p14:sldId id="301"/>
+            <p14:sldId id="302"/>
           </p14:sldIdLst>
         </p14:section>
         <p14:section name="conclusion" id="{87FF5A44-6804-4982-9011-9B7F10D2DAE3}">
@@ -8837,7 +8841,7 @@
           <a:graphicData uri="http://schemas.openxmlformats.org/presentationml/2006/ole">
             <mc:AlternateContent xmlns:mc="http://schemas.openxmlformats.org/markup-compatibility/2006">
               <mc:Choice xmlns:v="urn:schemas-microsoft-com:vml" Requires="v">
-                <p:oleObj spid="_x0000_s1188" name="Equation" r:id="rId3" imgW="812520" imgH="393480" progId="Equation.3">
+                <p:oleObj spid="_x0000_s1196" name="Equation" r:id="rId3" imgW="812520" imgH="393480" progId="Equation.3">
                   <p:embed/>
                 </p:oleObj>
               </mc:Choice>
@@ -8894,7 +8898,7 @@
           <a:graphicData uri="http://schemas.openxmlformats.org/presentationml/2006/ole">
             <mc:AlternateContent xmlns:mc="http://schemas.openxmlformats.org/markup-compatibility/2006">
               <mc:Choice xmlns:v="urn:schemas-microsoft-com:vml" Requires="v">
-                <p:oleObj spid="_x0000_s1189" name="Equation" r:id="rId5" imgW="2489040" imgH="431640" progId="Equation.3">
+                <p:oleObj spid="_x0000_s1197" name="Equation" r:id="rId5" imgW="2489040" imgH="431640" progId="Equation.3">
                   <p:embed/>
                 </p:oleObj>
               </mc:Choice>
@@ -19556,7 +19560,7 @@
           <a:graphicData uri="http://schemas.openxmlformats.org/presentationml/2006/ole">
             <mc:AlternateContent xmlns:mc="http://schemas.openxmlformats.org/markup-compatibility/2006">
               <mc:Choice xmlns:v="urn:schemas-microsoft-com:vml" Requires="v">
-                <p:oleObj spid="_x0000_s2179" name="Equation" r:id="rId3" imgW="1091880" imgH="1041120" progId="Equation.3">
+                <p:oleObj spid="_x0000_s2187" name="Equation" r:id="rId3" imgW="1091880" imgH="1041120" progId="Equation.3">
                   <p:embed/>
                 </p:oleObj>
               </mc:Choice>
@@ -20927,7 +20931,7 @@
           <a:graphicData uri="http://schemas.openxmlformats.org/presentationml/2006/ole">
             <mc:AlternateContent xmlns:mc="http://schemas.openxmlformats.org/markup-compatibility/2006">
               <mc:Choice xmlns:v="urn:schemas-microsoft-com:vml" Requires="v">
-                <p:oleObj spid="_x0000_s2180" name="Equation" r:id="rId5" imgW="1091880" imgH="1041120" progId="Equation.3">
+                <p:oleObj spid="_x0000_s2188" name="Equation" r:id="rId5" imgW="1091880" imgH="1041120" progId="Equation.3">
                   <p:embed/>
                 </p:oleObj>
               </mc:Choice>
@@ -27276,7 +27280,7 @@
           <a:graphicData uri="http://schemas.openxmlformats.org/presentationml/2006/ole">
             <mc:AlternateContent xmlns:mc="http://schemas.openxmlformats.org/markup-compatibility/2006">
               <mc:Choice xmlns:v="urn:schemas-microsoft-com:vml" Requires="v">
-                <p:oleObj spid="_x0000_s3102" name="Equation" r:id="rId3" imgW="965160" imgH="228600" progId="Equation.3">
+                <p:oleObj spid="_x0000_s3106" name="Equation" r:id="rId3" imgW="965160" imgH="228600" progId="Equation.3">
                   <p:embed/>
                 </p:oleObj>
               </mc:Choice>
@@ -34893,28 +34897,97 @@
           <a:p>
             <a:r>
               <a:rPr lang="en-US" dirty="0" smtClean="0"/>
-              <a:t>Conclusion</a:t>
-            </a:r>
-            <a:endParaRPr lang="nl-BE" dirty="0"/>
+              <a:t>The bad and the good</a:t>
+            </a:r>
+            <a:endParaRPr lang="en-US" dirty="0"/>
           </a:p>
         </p:txBody>
       </p:sp>
       <p:sp>
         <p:nvSpPr>
-          <p:cNvPr id="3" name="Text Placeholder 2"/>
+          <p:cNvPr id="3" name="Content Placeholder 2"/>
           <p:cNvSpPr>
             <a:spLocks noGrp="1"/>
           </p:cNvSpPr>
           <p:nvPr>
-            <p:ph type="body" idx="1"/>
+            <p:ph idx="1"/>
           </p:nvPr>
         </p:nvSpPr>
         <p:spPr/>
         <p:txBody>
-          <a:bodyPr/>
+          <a:bodyPr>
+            <a:normAutofit lnSpcReduction="10000"/>
+          </a:bodyPr>
           <a:lstStyle/>
           <a:p>
-            <a:endParaRPr lang="nl-BE"/>
+            <a:r>
+              <a:rPr lang="en-US" dirty="0" smtClean="0"/>
+              <a:t>The bad: performance</a:t>
+            </a:r>
+          </a:p>
+          <a:p>
+            <a:pPr lvl="1"/>
+            <a:r>
+              <a:rPr lang="en-US" dirty="0" smtClean="0"/>
+              <a:t>degraded by 1.5</a:t>
+            </a:r>
+          </a:p>
+          <a:p>
+            <a:pPr lvl="1"/>
+            <a:r>
+              <a:rPr lang="en-US" dirty="0" smtClean="0"/>
+              <a:t>can be hard to spot, e.g., global variables close in memory</a:t>
+            </a:r>
+          </a:p>
+          <a:p>
+            <a:r>
+              <a:rPr lang="en-US" dirty="0" smtClean="0"/>
+              <a:t>The good: compilers</a:t>
+            </a:r>
+          </a:p>
+          <a:p>
+            <a:pPr lvl="1"/>
+            <a:r>
+              <a:rPr lang="en-US" dirty="0" smtClean="0"/>
+              <a:t>compilers detect many cases, make variables implicitly thread-private</a:t>
+            </a:r>
+          </a:p>
+          <a:p>
+            <a:pPr lvl="1"/>
+            <a:r>
+              <a:rPr lang="en-US" dirty="0" smtClean="0"/>
+              <a:t>GCC: </a:t>
+            </a:r>
+            <a:r>
+              <a:rPr lang="en-US" dirty="0" smtClean="0">
+                <a:latin typeface="Courier New" panose="02070309020205020404" pitchFamily="49" charset="0"/>
+                <a:cs typeface="Courier New" panose="02070309020205020404" pitchFamily="49" charset="0"/>
+              </a:rPr>
+              <a:t>-O2</a:t>
+            </a:r>
+            <a:r>
+              <a:rPr lang="en-US" dirty="0" smtClean="0"/>
+              <a:t> or more</a:t>
+            </a:r>
+          </a:p>
+          <a:p>
+            <a:pPr lvl="1"/>
+            <a:r>
+              <a:rPr lang="en-US" dirty="0" smtClean="0"/>
+              <a:t>Intel: </a:t>
+            </a:r>
+            <a:r>
+              <a:rPr lang="en-US" dirty="0" smtClean="0">
+                <a:latin typeface="Courier New" panose="02070309020205020404" pitchFamily="49" charset="0"/>
+                <a:cs typeface="Courier New" panose="02070309020205020404" pitchFamily="49" charset="0"/>
+              </a:rPr>
+              <a:t>-O1</a:t>
+            </a:r>
+            <a:r>
+              <a:rPr lang="en-US" dirty="0" smtClean="0"/>
+              <a:t> or more</a:t>
+            </a:r>
+            <a:endParaRPr lang="en-US" dirty="0"/>
           </a:p>
         </p:txBody>
       </p:sp>
@@ -34941,494 +35014,16 @@
           </a:p>
         </p:txBody>
       </p:sp>
-    </p:spTree>
-    <p:extLst>
-      <p:ext uri="{BB962C8B-B14F-4D97-AF65-F5344CB8AC3E}">
-        <p14:creationId xmlns:p14="http://schemas.microsoft.com/office/powerpoint/2010/main" val="1387657132"/>
-      </p:ext>
-    </p:extLst>
-  </p:cSld>
-  <p:clrMapOvr>
-    <a:masterClrMapping/>
-  </p:clrMapOvr>
-  <p:timing>
-    <p:tnLst>
-      <p:par>
-        <p:cTn id="1" dur="indefinite" restart="never" nodeType="tmRoot"/>
-      </p:par>
-    </p:tnLst>
-  </p:timing>
-</p:sld>
-</file>
-
-<file path=ppt/slides/slide37.xml><?xml version="1.0" encoding="utf-8"?>
-<p:sld xmlns:a="http://schemas.openxmlformats.org/drawingml/2006/main" xmlns:r="http://schemas.openxmlformats.org/officeDocument/2006/relationships" xmlns:p="http://schemas.openxmlformats.org/presentationml/2006/main">
-  <p:cSld>
-    <p:spTree>
-      <p:nvGrpSpPr>
-        <p:cNvPr id="1" name=""/>
-        <p:cNvGrpSpPr/>
-        <p:nvPr/>
-      </p:nvGrpSpPr>
-      <p:grpSpPr>
-        <a:xfrm>
-          <a:off x="0" y="0"/>
-          <a:ext cx="0" cy="0"/>
-          <a:chOff x="0" y="0"/>
-          <a:chExt cx="0" cy="0"/>
-        </a:xfrm>
-      </p:grpSpPr>
       <p:sp>
         <p:nvSpPr>
-          <p:cNvPr id="5" name="Title 4"/>
-          <p:cNvSpPr>
-            <a:spLocks noGrp="1"/>
-          </p:cNvSpPr>
-          <p:nvPr>
-            <p:ph type="title"/>
-          </p:nvPr>
-        </p:nvSpPr>
-        <p:spPr/>
-        <p:txBody>
-          <a:bodyPr/>
-          <a:lstStyle/>
-          <a:p>
-            <a:r>
-              <a:rPr lang="en-US" dirty="0" smtClean="0"/>
-              <a:t>Useful references</a:t>
-            </a:r>
-            <a:endParaRPr lang="nl-BE" dirty="0"/>
-          </a:p>
-        </p:txBody>
-      </p:sp>
-      <p:sp>
-        <p:nvSpPr>
-          <p:cNvPr id="6" name="Content Placeholder 5"/>
-          <p:cNvSpPr>
-            <a:spLocks noGrp="1"/>
-          </p:cNvSpPr>
-          <p:nvPr>
-            <p:ph idx="1"/>
-          </p:nvPr>
-        </p:nvSpPr>
-        <p:spPr/>
-        <p:txBody>
-          <a:bodyPr>
-            <a:normAutofit lnSpcReduction="10000"/>
-          </a:bodyPr>
-          <a:lstStyle/>
-          <a:p>
-            <a:r>
-              <a:rPr lang="en-US" dirty="0" smtClean="0">
-                <a:hlinkClick r:id="rId2"/>
-              </a:rPr>
-              <a:t>Gallery of processor cache effects</a:t>
-            </a:r>
-            <a:endParaRPr lang="en-US" dirty="0" smtClean="0"/>
-          </a:p>
-          <a:p>
-            <a:r>
-              <a:rPr lang="en-US" dirty="0" smtClean="0"/>
-              <a:t>Vectorization</a:t>
-            </a:r>
-          </a:p>
-          <a:p>
-            <a:pPr lvl="1"/>
-            <a:r>
-              <a:rPr lang="en-US" dirty="0" smtClean="0">
-                <a:hlinkClick r:id="rId3"/>
-              </a:rPr>
-              <a:t>A guide to vectorization with Intel C++ compilers</a:t>
-            </a:r>
-            <a:endParaRPr lang="en-US" dirty="0" smtClean="0"/>
-          </a:p>
-          <a:p>
-            <a:pPr lvl="1"/>
-            <a:r>
-              <a:rPr lang="en-US" dirty="0" smtClean="0">
-                <a:hlinkClick r:id="rId4"/>
-              </a:rPr>
-              <a:t>Auto-vectorization with </a:t>
-            </a:r>
-            <a:r>
-              <a:rPr lang="en-US" dirty="0" err="1" smtClean="0">
-                <a:hlinkClick r:id="rId4"/>
-              </a:rPr>
-              <a:t>gcc</a:t>
-            </a:r>
-            <a:r>
-              <a:rPr lang="en-US" dirty="0" smtClean="0">
-                <a:hlinkClick r:id="rId4"/>
-              </a:rPr>
-              <a:t> 4.7</a:t>
-            </a:r>
-            <a:endParaRPr lang="en-US" dirty="0" smtClean="0"/>
-          </a:p>
-          <a:p>
-            <a:r>
-              <a:rPr lang="en-US" dirty="0"/>
-              <a:t>Introduction to High Performance Computing for Scientists and </a:t>
-            </a:r>
-            <a:r>
-              <a:rPr lang="en-US" dirty="0" smtClean="0"/>
-              <a:t>Engineers</a:t>
-            </a:r>
-            <a:r>
-              <a:rPr lang="nl-BE" dirty="0" smtClean="0"/>
-              <a:t/>
-            </a:r>
-            <a:br>
-              <a:rPr lang="nl-BE" dirty="0" smtClean="0"/>
-            </a:br>
-            <a:r>
-              <a:rPr lang="nl-BE" dirty="0" smtClean="0"/>
-              <a:t>Georg Hager &amp; Gerhard Wellein</a:t>
-            </a:r>
-            <a:br>
-              <a:rPr lang="nl-BE" dirty="0" smtClean="0"/>
-            </a:br>
-            <a:r>
-              <a:rPr lang="nl-BE" dirty="0" smtClean="0"/>
-              <a:t>Chapman &amp; Hall, 2010</a:t>
-            </a:r>
-            <a:endParaRPr lang="en-US" b="1" dirty="0"/>
-          </a:p>
-          <a:p>
-            <a:r>
-              <a:rPr lang="en-US" dirty="0" smtClean="0">
-                <a:hlinkClick r:id="rId5"/>
-              </a:rPr>
-              <a:t>Why has CPU frequency ceased to grow?</a:t>
-            </a:r>
-            <a:endParaRPr lang="nl-BE" dirty="0" smtClean="0"/>
-          </a:p>
-        </p:txBody>
-      </p:sp>
-      <p:sp>
-        <p:nvSpPr>
-          <p:cNvPr id="4" name="Slide Number Placeholder 3"/>
-          <p:cNvSpPr>
-            <a:spLocks noGrp="1"/>
-          </p:cNvSpPr>
-          <p:nvPr>
-            <p:ph type="sldNum" sz="quarter" idx="12"/>
-          </p:nvPr>
-        </p:nvSpPr>
-        <p:spPr/>
-        <p:txBody>
-          <a:bodyPr/>
-          <a:lstStyle/>
-          <a:p>
-            <a:fld id="{6597116C-F94B-4B5B-973A-17F07FB5C418}" type="slidenum">
-              <a:rPr lang="nl-BE" smtClean="0"/>
-              <a:t>37</a:t>
-            </a:fld>
-            <a:endParaRPr lang="nl-BE"/>
-          </a:p>
-        </p:txBody>
-      </p:sp>
-    </p:spTree>
-    <p:extLst>
-      <p:ext uri="{BB962C8B-B14F-4D97-AF65-F5344CB8AC3E}">
-        <p14:creationId xmlns:p14="http://schemas.microsoft.com/office/powerpoint/2010/main" val="2653023660"/>
-      </p:ext>
-    </p:extLst>
-  </p:cSld>
-  <p:clrMapOvr>
-    <a:masterClrMapping/>
-  </p:clrMapOvr>
-  <p:timing>
-    <p:tnLst>
-      <p:par>
-        <p:cTn id="1" dur="indefinite" restart="never" nodeType="tmRoot"/>
-      </p:par>
-    </p:tnLst>
-  </p:timing>
-</p:sld>
-</file>
-
-<file path=ppt/slides/slide38.xml><?xml version="1.0" encoding="utf-8"?>
-<p:sld xmlns:a="http://schemas.openxmlformats.org/drawingml/2006/main" xmlns:r="http://schemas.openxmlformats.org/officeDocument/2006/relationships" xmlns:p="http://schemas.openxmlformats.org/presentationml/2006/main">
-  <p:cSld>
-    <p:spTree>
-      <p:nvGrpSpPr>
-        <p:cNvPr id="1" name=""/>
-        <p:cNvGrpSpPr/>
-        <p:nvPr/>
-      </p:nvGrpSpPr>
-      <p:grpSpPr>
-        <a:xfrm>
-          <a:off x="0" y="0"/>
-          <a:ext cx="0" cy="0"/>
-          <a:chOff x="0" y="0"/>
-          <a:chExt cx="0" cy="0"/>
-        </a:xfrm>
-      </p:grpSpPr>
-      <p:sp>
-        <p:nvSpPr>
-          <p:cNvPr id="2" name="Title 1"/>
-          <p:cNvSpPr>
-            <a:spLocks noGrp="1"/>
-          </p:cNvSpPr>
-          <p:nvPr>
-            <p:ph type="title"/>
-          </p:nvPr>
-        </p:nvSpPr>
-        <p:spPr/>
-        <p:txBody>
-          <a:bodyPr/>
-          <a:lstStyle/>
-          <a:p>
-            <a:r>
-              <a:rPr lang="en-US" dirty="0" smtClean="0"/>
-              <a:t>Appendix</a:t>
-            </a:r>
-            <a:endParaRPr lang="nl-BE" dirty="0"/>
-          </a:p>
-        </p:txBody>
-      </p:sp>
-      <p:sp>
-        <p:nvSpPr>
-          <p:cNvPr id="3" name="Text Placeholder 2"/>
-          <p:cNvSpPr>
-            <a:spLocks noGrp="1"/>
-          </p:cNvSpPr>
-          <p:nvPr>
-            <p:ph type="body" idx="1"/>
-          </p:nvPr>
-        </p:nvSpPr>
-        <p:spPr/>
-        <p:txBody>
-          <a:bodyPr/>
-          <a:lstStyle/>
-          <a:p>
-            <a:endParaRPr lang="nl-BE"/>
-          </a:p>
-        </p:txBody>
-      </p:sp>
-      <p:sp>
-        <p:nvSpPr>
-          <p:cNvPr id="4" name="Slide Number Placeholder 3"/>
-          <p:cNvSpPr>
-            <a:spLocks noGrp="1"/>
-          </p:cNvSpPr>
-          <p:nvPr>
-            <p:ph type="sldNum" sz="quarter" idx="12"/>
-          </p:nvPr>
-        </p:nvSpPr>
-        <p:spPr/>
-        <p:txBody>
-          <a:bodyPr/>
-          <a:lstStyle/>
-          <a:p>
-            <a:fld id="{6597116C-F94B-4B5B-973A-17F07FB5C418}" type="slidenum">
-              <a:rPr lang="nl-BE" smtClean="0"/>
-              <a:t>38</a:t>
-            </a:fld>
-            <a:endParaRPr lang="nl-BE"/>
-          </a:p>
-        </p:txBody>
-      </p:sp>
-    </p:spTree>
-    <p:extLst>
-      <p:ext uri="{BB962C8B-B14F-4D97-AF65-F5344CB8AC3E}">
-        <p14:creationId xmlns:p14="http://schemas.microsoft.com/office/powerpoint/2010/main" val="3118825235"/>
-      </p:ext>
-    </p:extLst>
-  </p:cSld>
-  <p:clrMapOvr>
-    <a:masterClrMapping/>
-  </p:clrMapOvr>
-  <p:timing>
-    <p:tnLst>
-      <p:par>
-        <p:cTn id="1" dur="indefinite" restart="never" nodeType="tmRoot"/>
-      </p:par>
-    </p:tnLst>
-  </p:timing>
-</p:sld>
-</file>
-
-<file path=ppt/slides/slide39.xml><?xml version="1.0" encoding="utf-8"?>
-<p:sld xmlns:a="http://schemas.openxmlformats.org/drawingml/2006/main" xmlns:r="http://schemas.openxmlformats.org/officeDocument/2006/relationships" xmlns:p="http://schemas.openxmlformats.org/presentationml/2006/main">
-  <p:cSld>
-    <p:spTree>
-      <p:nvGrpSpPr>
-        <p:cNvPr id="1" name=""/>
-        <p:cNvGrpSpPr/>
-        <p:nvPr/>
-      </p:nvGrpSpPr>
-      <p:grpSpPr>
-        <a:xfrm>
-          <a:off x="0" y="0"/>
-          <a:ext cx="0" cy="0"/>
-          <a:chOff x="0" y="0"/>
-          <a:chExt cx="0" cy="0"/>
-        </a:xfrm>
-      </p:grpSpPr>
-      <p:sp>
-        <p:nvSpPr>
-          <p:cNvPr id="2" name="Title 1"/>
-          <p:cNvSpPr>
-            <a:spLocks noGrp="1"/>
-          </p:cNvSpPr>
-          <p:nvPr>
-            <p:ph type="title"/>
-          </p:nvPr>
-        </p:nvSpPr>
-        <p:spPr/>
-        <p:txBody>
-          <a:bodyPr/>
-          <a:lstStyle/>
-          <a:p>
-            <a:r>
-              <a:rPr lang="en-US" dirty="0" smtClean="0"/>
-              <a:t>Tools</a:t>
-            </a:r>
-            <a:endParaRPr lang="en-US" dirty="0"/>
-          </a:p>
-        </p:txBody>
-      </p:sp>
-      <p:sp>
-        <p:nvSpPr>
-          <p:cNvPr id="3" name="Content Placeholder 2"/>
-          <p:cNvSpPr>
-            <a:spLocks noGrp="1"/>
-          </p:cNvSpPr>
-          <p:nvPr>
-            <p:ph idx="1"/>
-          </p:nvPr>
-        </p:nvSpPr>
-        <p:spPr/>
-        <p:txBody>
-          <a:bodyPr>
-            <a:normAutofit fontScale="92500" lnSpcReduction="10000"/>
-          </a:bodyPr>
-          <a:lstStyle/>
-          <a:p>
-            <a:r>
-              <a:rPr lang="en-US" dirty="0" smtClean="0"/>
-              <a:t>Profilers</a:t>
-            </a:r>
-          </a:p>
-          <a:p>
-            <a:pPr lvl="1"/>
-            <a:r>
-              <a:rPr lang="en-US" dirty="0" err="1" smtClean="0"/>
-              <a:t>gprof</a:t>
-            </a:r>
-            <a:endParaRPr lang="en-US" dirty="0" smtClean="0"/>
-          </a:p>
-          <a:p>
-            <a:pPr lvl="1"/>
-            <a:r>
-              <a:rPr lang="en-US" dirty="0" err="1" smtClean="0"/>
-              <a:t>Scalasca</a:t>
-            </a:r>
-            <a:endParaRPr lang="en-US" dirty="0" smtClean="0"/>
-          </a:p>
-          <a:p>
-            <a:pPr lvl="1"/>
-            <a:r>
-              <a:rPr lang="en-US" dirty="0" err="1" smtClean="0"/>
-              <a:t>AllineaForge</a:t>
-            </a:r>
-            <a:r>
-              <a:rPr lang="en-US" dirty="0" smtClean="0"/>
-              <a:t> MAP</a:t>
-            </a:r>
-          </a:p>
-          <a:p>
-            <a:pPr lvl="1"/>
-            <a:r>
-              <a:rPr lang="en-US" dirty="0" smtClean="0"/>
-              <a:t>Intel </a:t>
-            </a:r>
-            <a:r>
-              <a:rPr lang="en-US" dirty="0" err="1" smtClean="0"/>
-              <a:t>vTune</a:t>
-            </a:r>
-            <a:endParaRPr lang="en-US" dirty="0" smtClean="0"/>
-          </a:p>
-          <a:p>
-            <a:r>
-              <a:rPr lang="en-US" dirty="0" smtClean="0"/>
-              <a:t>Hardware information</a:t>
-            </a:r>
-          </a:p>
-          <a:p>
-            <a:pPr lvl="1"/>
-            <a:r>
-              <a:rPr lang="en-US" dirty="0" err="1" smtClean="0"/>
-              <a:t>lscpu</a:t>
-            </a:r>
-            <a:r>
-              <a:rPr lang="en-US" dirty="0" smtClean="0"/>
-              <a:t>: CPU information, including cache size and NUMA configuration</a:t>
-            </a:r>
-          </a:p>
-          <a:p>
-            <a:pPr lvl="1"/>
-            <a:r>
-              <a:rPr lang="en-US" dirty="0" err="1" smtClean="0"/>
-              <a:t>lstopo</a:t>
-            </a:r>
-            <a:r>
-              <a:rPr lang="en-US" dirty="0" smtClean="0"/>
-              <a:t>-no-graphics: more detailed cache topology</a:t>
-            </a:r>
-          </a:p>
-          <a:p>
-            <a:pPr lvl="1"/>
-            <a:r>
-              <a:rPr lang="en-US" dirty="0" smtClean="0"/>
-              <a:t>Intel </a:t>
-            </a:r>
-            <a:r>
-              <a:rPr lang="en-US" dirty="0" err="1" smtClean="0"/>
-              <a:t>mlc</a:t>
-            </a:r>
-            <a:r>
-              <a:rPr lang="en-US" dirty="0" smtClean="0"/>
-              <a:t>: provides memory bandwidth &amp; latency info</a:t>
-            </a:r>
-            <a:endParaRPr lang="en-US" dirty="0"/>
-          </a:p>
-        </p:txBody>
-      </p:sp>
-      <p:sp>
-        <p:nvSpPr>
-          <p:cNvPr id="4" name="Slide Number Placeholder 3"/>
-          <p:cNvSpPr>
-            <a:spLocks noGrp="1"/>
-          </p:cNvSpPr>
-          <p:nvPr>
-            <p:ph type="sldNum" sz="quarter" idx="12"/>
-          </p:nvPr>
-        </p:nvSpPr>
-        <p:spPr/>
-        <p:txBody>
-          <a:bodyPr/>
-          <a:lstStyle/>
-          <a:p>
-            <a:fld id="{6597116C-F94B-4B5B-973A-17F07FB5C418}" type="slidenum">
-              <a:rPr lang="nl-BE" smtClean="0"/>
-              <a:t>39</a:t>
-            </a:fld>
-            <a:endParaRPr lang="nl-BE"/>
-          </a:p>
-        </p:txBody>
-      </p:sp>
-      <p:sp>
-        <p:nvSpPr>
-          <p:cNvPr id="5" name="TextBox 4"/>
+          <p:cNvPr id="6" name="TextBox 5"/>
           <p:cNvSpPr txBox="1"/>
           <p:nvPr/>
         </p:nvSpPr>
         <p:spPr>
           <a:xfrm>
-            <a:off x="5148064" y="2420888"/>
-            <a:ext cx="2201500" cy="954107"/>
+            <a:off x="1906206" y="5838363"/>
+            <a:ext cx="5285614" cy="830997"/>
           </a:xfrm>
           <a:prstGeom prst="rect">
             <a:avLst/>
@@ -35446,26 +35041,25 @@
           </a:bodyPr>
           <a:lstStyle/>
           <a:p>
+            <a:r>
+              <a:rPr lang="en-US" sz="2400" dirty="0" smtClean="0"/>
+              <a:t>However, compiler won't always remedy,</a:t>
+            </a:r>
+          </a:p>
+          <a:p>
             <a:pPr algn="ctr"/>
             <a:r>
-              <a:rPr lang="en-US" sz="2800" dirty="0" smtClean="0"/>
-              <a:t>Use a profiler,</a:t>
-            </a:r>
-            <a:br>
-              <a:rPr lang="en-US" sz="2800" dirty="0" smtClean="0"/>
-            </a:br>
-            <a:r>
-              <a:rPr lang="en-US" sz="2800" dirty="0" smtClean="0"/>
-              <a:t>it is the law!</a:t>
-            </a:r>
-            <a:endParaRPr lang="en-US" sz="2800" dirty="0"/>
+              <a:rPr lang="en-US" sz="2400" dirty="0" smtClean="0"/>
+              <a:t>so avoid false sharing!</a:t>
+            </a:r>
+            <a:endParaRPr lang="en-US" sz="2400" dirty="0"/>
           </a:p>
         </p:txBody>
       </p:sp>
     </p:spTree>
     <p:extLst>
       <p:ext uri="{BB962C8B-B14F-4D97-AF65-F5344CB8AC3E}">
-        <p14:creationId xmlns:p14="http://schemas.microsoft.com/office/powerpoint/2010/main" val="1031716690"/>
+        <p14:creationId xmlns:p14="http://schemas.microsoft.com/office/powerpoint/2010/main" val="1244630990"/>
       </p:ext>
     </p:extLst>
   </p:cSld>
@@ -35526,15 +35120,33 @@
                                   </p:childTnLst>
                                 </p:cTn>
                               </p:par>
+                            </p:childTnLst>
+                          </p:cTn>
+                        </p:par>
+                      </p:childTnLst>
+                    </p:cTn>
+                  </p:par>
+                  <p:par>
+                    <p:cTn id="7" fill="hold">
+                      <p:stCondLst>
+                        <p:cond delay="indefinite"/>
+                      </p:stCondLst>
+                      <p:childTnLst>
+                        <p:par>
+                          <p:cTn id="8" fill="hold">
+                            <p:stCondLst>
+                              <p:cond delay="0"/>
+                            </p:stCondLst>
+                            <p:childTnLst>
                               <p:par>
-                                <p:cTn id="7" presetID="1" presetClass="entr" presetSubtype="0" fill="hold" grpId="0" nodeType="withEffect">
+                                <p:cTn id="9" presetID="1" presetClass="entr" presetSubtype="0" fill="hold" grpId="0" nodeType="clickEffect">
                                   <p:stCondLst>
                                     <p:cond delay="0"/>
                                   </p:stCondLst>
                                   <p:childTnLst>
                                     <p:set>
                                       <p:cBhvr>
-                                        <p:cTn id="8" dur="1" fill="hold">
+                                        <p:cTn id="10" dur="1" fill="hold">
                                           <p:stCondLst>
                                             <p:cond delay="0"/>
                                           </p:stCondLst>
@@ -35557,70 +35169,26 @@
                                   </p:childTnLst>
                                 </p:cTn>
                               </p:par>
+                            </p:childTnLst>
+                          </p:cTn>
+                        </p:par>
+                      </p:childTnLst>
+                    </p:cTn>
+                  </p:par>
+                  <p:par>
+                    <p:cTn id="11" fill="hold">
+                      <p:stCondLst>
+                        <p:cond delay="indefinite"/>
+                      </p:stCondLst>
+                      <p:childTnLst>
+                        <p:par>
+                          <p:cTn id="12" fill="hold">
+                            <p:stCondLst>
+                              <p:cond delay="0"/>
+                            </p:stCondLst>
+                            <p:childTnLst>
                               <p:par>
-                                <p:cTn id="9" presetID="1" presetClass="entr" presetSubtype="0" fill="hold" grpId="0" nodeType="withEffect">
-                                  <p:stCondLst>
-                                    <p:cond delay="0"/>
-                                  </p:stCondLst>
-                                  <p:childTnLst>
-                                    <p:set>
-                                      <p:cBhvr>
-                                        <p:cTn id="10" dur="1" fill="hold">
-                                          <p:stCondLst>
-                                            <p:cond delay="0"/>
-                                          </p:stCondLst>
-                                        </p:cTn>
-                                        <p:tgtEl>
-                                          <p:spTgt spid="3">
-                                            <p:txEl>
-                                              <p:pRg st="2" end="2"/>
-                                            </p:txEl>
-                                          </p:spTgt>
-                                        </p:tgtEl>
-                                        <p:attrNameLst>
-                                          <p:attrName>style.visibility</p:attrName>
-                                        </p:attrNameLst>
-                                      </p:cBhvr>
-                                      <p:to>
-                                        <p:strVal val="visible"/>
-                                      </p:to>
-                                    </p:set>
-                                  </p:childTnLst>
-                                </p:cTn>
-                              </p:par>
-                              <p:par>
-                                <p:cTn id="11" presetID="1" presetClass="entr" presetSubtype="0" fill="hold" grpId="0" nodeType="withEffect">
-                                  <p:stCondLst>
-                                    <p:cond delay="0"/>
-                                  </p:stCondLst>
-                                  <p:childTnLst>
-                                    <p:set>
-                                      <p:cBhvr>
-                                        <p:cTn id="12" dur="1" fill="hold">
-                                          <p:stCondLst>
-                                            <p:cond delay="0"/>
-                                          </p:stCondLst>
-                                        </p:cTn>
-                                        <p:tgtEl>
-                                          <p:spTgt spid="3">
-                                            <p:txEl>
-                                              <p:pRg st="3" end="3"/>
-                                            </p:txEl>
-                                          </p:spTgt>
-                                        </p:tgtEl>
-                                        <p:attrNameLst>
-                                          <p:attrName>style.visibility</p:attrName>
-                                        </p:attrNameLst>
-                                      </p:cBhvr>
-                                      <p:to>
-                                        <p:strVal val="visible"/>
-                                      </p:to>
-                                    </p:set>
-                                  </p:childTnLst>
-                                </p:cTn>
-                              </p:par>
-                              <p:par>
-                                <p:cTn id="13" presetID="1" presetClass="entr" presetSubtype="0" fill="hold" grpId="0" nodeType="withEffect">
+                                <p:cTn id="13" presetID="1" presetClass="entr" presetSubtype="0" fill="hold" grpId="0" nodeType="clickEffect">
                                   <p:stCondLst>
                                     <p:cond delay="0"/>
                                   </p:stCondLst>
@@ -35635,7 +35203,7 @@
                                         <p:tgtEl>
                                           <p:spTgt spid="3">
                                             <p:txEl>
-                                              <p:pRg st="4" end="4"/>
+                                              <p:pRg st="2" end="2"/>
                                             </p:txEl>
                                           </p:spTgt>
                                         </p:tgtEl>
@@ -35682,7 +35250,42 @@
                                           </p:stCondLst>
                                         </p:cTn>
                                         <p:tgtEl>
-                                          <p:spTgt spid="5"/>
+                                          <p:spTgt spid="3">
+                                            <p:txEl>
+                                              <p:pRg st="3" end="3"/>
+                                            </p:txEl>
+                                          </p:spTgt>
+                                        </p:tgtEl>
+                                        <p:attrNameLst>
+                                          <p:attrName>style.visibility</p:attrName>
+                                        </p:attrNameLst>
+                                      </p:cBhvr>
+                                      <p:to>
+                                        <p:strVal val="visible"/>
+                                      </p:to>
+                                    </p:set>
+                                  </p:childTnLst>
+                                </p:cTn>
+                              </p:par>
+                              <p:par>
+                                <p:cTn id="19" presetID="1" presetClass="entr" presetSubtype="0" fill="hold" grpId="0" nodeType="withEffect">
+                                  <p:stCondLst>
+                                    <p:cond delay="0"/>
+                                  </p:stCondLst>
+                                  <p:childTnLst>
+                                    <p:set>
+                                      <p:cBhvr>
+                                        <p:cTn id="20" dur="1" fill="hold">
+                                          <p:stCondLst>
+                                            <p:cond delay="0"/>
+                                          </p:stCondLst>
+                                        </p:cTn>
+                                        <p:tgtEl>
+                                          <p:spTgt spid="3">
+                                            <p:txEl>
+                                              <p:pRg st="4" end="4"/>
+                                            </p:txEl>
+                                          </p:spTgt>
                                         </p:tgtEl>
                                         <p:attrNameLst>
                                           <p:attrName>style.visibility</p:attrName>
@@ -35702,26 +35305,26 @@
                     </p:cTn>
                   </p:par>
                   <p:par>
-                    <p:cTn id="19" fill="hold">
+                    <p:cTn id="21" fill="hold">
                       <p:stCondLst>
                         <p:cond delay="indefinite"/>
                       </p:stCondLst>
                       <p:childTnLst>
                         <p:par>
-                          <p:cTn id="20" fill="hold">
+                          <p:cTn id="22" fill="hold">
                             <p:stCondLst>
                               <p:cond delay="0"/>
                             </p:stCondLst>
                             <p:childTnLst>
                               <p:par>
-                                <p:cTn id="21" presetID="1" presetClass="entr" presetSubtype="0" fill="hold" grpId="0" nodeType="clickEffect">
+                                <p:cTn id="23" presetID="1" presetClass="entr" presetSubtype="0" fill="hold" grpId="0" nodeType="clickEffect">
                                   <p:stCondLst>
                                     <p:cond delay="0"/>
                                   </p:stCondLst>
                                   <p:childTnLst>
                                     <p:set>
                                       <p:cBhvr>
-                                        <p:cTn id="22" dur="1" fill="hold">
+                                        <p:cTn id="24" dur="1" fill="hold">
                                           <p:stCondLst>
                                             <p:cond delay="0"/>
                                           </p:stCondLst>
@@ -35744,15 +35347,33 @@
                                   </p:childTnLst>
                                 </p:cTn>
                               </p:par>
+                            </p:childTnLst>
+                          </p:cTn>
+                        </p:par>
+                      </p:childTnLst>
+                    </p:cTn>
+                  </p:par>
+                  <p:par>
+                    <p:cTn id="25" fill="hold">
+                      <p:stCondLst>
+                        <p:cond delay="indefinite"/>
+                      </p:stCondLst>
+                      <p:childTnLst>
+                        <p:par>
+                          <p:cTn id="26" fill="hold">
+                            <p:stCondLst>
+                              <p:cond delay="0"/>
+                            </p:stCondLst>
+                            <p:childTnLst>
                               <p:par>
-                                <p:cTn id="23" presetID="1" presetClass="entr" presetSubtype="0" fill="hold" grpId="0" nodeType="withEffect">
+                                <p:cTn id="27" presetID="1" presetClass="entr" presetSubtype="0" fill="hold" grpId="0" nodeType="clickEffect">
                                   <p:stCondLst>
                                     <p:cond delay="0"/>
                                   </p:stCondLst>
                                   <p:childTnLst>
                                     <p:set>
                                       <p:cBhvr>
-                                        <p:cTn id="24" dur="1" fill="hold">
+                                        <p:cTn id="28" dur="1" fill="hold">
                                           <p:stCondLst>
                                             <p:cond delay="0"/>
                                           </p:stCondLst>
@@ -35775,15 +35396,380 @@
                                   </p:childTnLst>
                                 </p:cTn>
                               </p:par>
+                            </p:childTnLst>
+                          </p:cTn>
+                        </p:par>
+                      </p:childTnLst>
+                    </p:cTn>
+                  </p:par>
+                  <p:par>
+                    <p:cTn id="29" fill="hold">
+                      <p:stCondLst>
+                        <p:cond delay="indefinite"/>
+                      </p:stCondLst>
+                      <p:childTnLst>
+                        <p:par>
+                          <p:cTn id="30" fill="hold">
+                            <p:stCondLst>
+                              <p:cond delay="0"/>
+                            </p:stCondLst>
+                            <p:childTnLst>
                               <p:par>
-                                <p:cTn id="25" presetID="1" presetClass="entr" presetSubtype="0" fill="hold" grpId="0" nodeType="withEffect">
+                                <p:cTn id="31" presetID="1" presetClass="entr" presetSubtype="0" fill="hold" grpId="0" nodeType="clickEffect">
                                   <p:stCondLst>
                                     <p:cond delay="0"/>
                                   </p:stCondLst>
                                   <p:childTnLst>
                                     <p:set>
                                       <p:cBhvr>
-                                        <p:cTn id="26" dur="1" fill="hold">
+                                        <p:cTn id="32" dur="1" fill="hold">
+                                          <p:stCondLst>
+                                            <p:cond delay="0"/>
+                                          </p:stCondLst>
+                                        </p:cTn>
+                                        <p:tgtEl>
+                                          <p:spTgt spid="6"/>
+                                        </p:tgtEl>
+                                        <p:attrNameLst>
+                                          <p:attrName>style.visibility</p:attrName>
+                                        </p:attrNameLst>
+                                      </p:cBhvr>
+                                      <p:to>
+                                        <p:strVal val="visible"/>
+                                      </p:to>
+                                    </p:set>
+                                  </p:childTnLst>
+                                </p:cTn>
+                              </p:par>
+                            </p:childTnLst>
+                          </p:cTn>
+                        </p:par>
+                      </p:childTnLst>
+                    </p:cTn>
+                  </p:par>
+                </p:childTnLst>
+              </p:cTn>
+              <p:prevCondLst>
+                <p:cond evt="onPrev" delay="0">
+                  <p:tgtEl>
+                    <p:sldTgt/>
+                  </p:tgtEl>
+                </p:cond>
+              </p:prevCondLst>
+              <p:nextCondLst>
+                <p:cond evt="onNext" delay="0">
+                  <p:tgtEl>
+                    <p:sldTgt/>
+                  </p:tgtEl>
+                </p:cond>
+              </p:nextCondLst>
+            </p:seq>
+          </p:childTnLst>
+        </p:cTn>
+      </p:par>
+    </p:tnLst>
+    <p:bldLst>
+      <p:bldP spid="3" grpId="0" uiExpand="1" build="p" bldLvl="2"/>
+      <p:bldP spid="6" grpId="0" animBg="1"/>
+    </p:bldLst>
+  </p:timing>
+</p:sld>
+</file>
+
+<file path=ppt/slides/slide37.xml><?xml version="1.0" encoding="utf-8"?>
+<p:sld xmlns:a="http://schemas.openxmlformats.org/drawingml/2006/main" xmlns:r="http://schemas.openxmlformats.org/officeDocument/2006/relationships" xmlns:p="http://schemas.openxmlformats.org/presentationml/2006/main">
+  <p:cSld>
+    <p:spTree>
+      <p:nvGrpSpPr>
+        <p:cNvPr id="1" name=""/>
+        <p:cNvGrpSpPr/>
+        <p:nvPr/>
+      </p:nvGrpSpPr>
+      <p:grpSpPr>
+        <a:xfrm>
+          <a:off x="0" y="0"/>
+          <a:ext cx="0" cy="0"/>
+          <a:chOff x="0" y="0"/>
+          <a:chExt cx="0" cy="0"/>
+        </a:xfrm>
+      </p:grpSpPr>
+      <p:sp>
+        <p:nvSpPr>
+          <p:cNvPr id="2" name="Title 1"/>
+          <p:cNvSpPr>
+            <a:spLocks noGrp="1"/>
+          </p:cNvSpPr>
+          <p:nvPr>
+            <p:ph type="title"/>
+          </p:nvPr>
+        </p:nvSpPr>
+        <p:spPr/>
+        <p:txBody>
+          <a:bodyPr/>
+          <a:lstStyle/>
+          <a:p>
+            <a:r>
+              <a:rPr lang="en-US" dirty="0" smtClean="0"/>
+              <a:t>How to avoid?</a:t>
+            </a:r>
+            <a:endParaRPr lang="en-US" dirty="0"/>
+          </a:p>
+        </p:txBody>
+      </p:sp>
+      <p:sp>
+        <p:nvSpPr>
+          <p:cNvPr id="3" name="Content Placeholder 2"/>
+          <p:cNvSpPr>
+            <a:spLocks noGrp="1"/>
+          </p:cNvSpPr>
+          <p:nvPr>
+            <p:ph idx="1"/>
+          </p:nvPr>
+        </p:nvSpPr>
+        <p:spPr/>
+        <p:txBody>
+          <a:bodyPr>
+            <a:normAutofit fontScale="92500" lnSpcReduction="10000"/>
+          </a:bodyPr>
+          <a:lstStyle/>
+          <a:p>
+            <a:r>
+              <a:rPr lang="en-US" dirty="0" smtClean="0"/>
+              <a:t>Use thread-local variables/copies when possible</a:t>
+            </a:r>
+          </a:p>
+          <a:p>
+            <a:r>
+              <a:rPr lang="en-US" dirty="0" smtClean="0"/>
+              <a:t>Align global variables at cache boundaries, e.g.,</a:t>
+            </a:r>
+            <a:br>
+              <a:rPr lang="en-US" dirty="0" smtClean="0"/>
+            </a:br>
+            <a:r>
+              <a:rPr lang="en-US" sz="2200" dirty="0" err="1" smtClean="0">
+                <a:latin typeface="Courier New" panose="02070309020205020404" pitchFamily="49" charset="0"/>
+                <a:cs typeface="Courier New" panose="02070309020205020404" pitchFamily="49" charset="0"/>
+              </a:rPr>
+              <a:t>int</a:t>
+            </a:r>
+            <a:r>
+              <a:rPr lang="en-US" sz="2200" dirty="0" smtClean="0">
+                <a:latin typeface="Courier New" panose="02070309020205020404" pitchFamily="49" charset="0"/>
+                <a:cs typeface="Courier New" panose="02070309020205020404" pitchFamily="49" charset="0"/>
+              </a:rPr>
+              <a:t> counter_t0 __attribute((align(64)));</a:t>
+            </a:r>
+            <a:br>
+              <a:rPr lang="en-US" sz="2200" dirty="0" smtClean="0">
+                <a:latin typeface="Courier New" panose="02070309020205020404" pitchFamily="49" charset="0"/>
+                <a:cs typeface="Courier New" panose="02070309020205020404" pitchFamily="49" charset="0"/>
+              </a:rPr>
+            </a:br>
+            <a:r>
+              <a:rPr lang="en-US" sz="2200" dirty="0" err="1" smtClean="0">
+                <a:latin typeface="Courier New" panose="02070309020205020404" pitchFamily="49" charset="0"/>
+                <a:cs typeface="Courier New" panose="02070309020205020404" pitchFamily="49" charset="0"/>
+              </a:rPr>
+              <a:t>int</a:t>
+            </a:r>
+            <a:r>
+              <a:rPr lang="en-US" sz="2200" dirty="0" smtClean="0">
+                <a:latin typeface="Courier New" panose="02070309020205020404" pitchFamily="49" charset="0"/>
+                <a:cs typeface="Courier New" panose="02070309020205020404" pitchFamily="49" charset="0"/>
+              </a:rPr>
+              <a:t> counter_t1</a:t>
+            </a:r>
+            <a:r>
+              <a:rPr lang="en-US" sz="2200" dirty="0">
+                <a:latin typeface="Courier New" panose="02070309020205020404" pitchFamily="49" charset="0"/>
+                <a:cs typeface="Courier New" panose="02070309020205020404" pitchFamily="49" charset="0"/>
+              </a:rPr>
+              <a:t> __attribute((align(64)))</a:t>
+            </a:r>
+            <a:r>
+              <a:rPr lang="en-US" sz="2200" dirty="0" smtClean="0">
+                <a:latin typeface="Courier New" panose="02070309020205020404" pitchFamily="49" charset="0"/>
+                <a:cs typeface="Courier New" panose="02070309020205020404" pitchFamily="49" charset="0"/>
+              </a:rPr>
+              <a:t>;</a:t>
+            </a:r>
+            <a:endParaRPr lang="en-US" dirty="0">
+              <a:latin typeface="Courier New" panose="02070309020205020404" pitchFamily="49" charset="0"/>
+              <a:cs typeface="Courier New" panose="02070309020205020404" pitchFamily="49" charset="0"/>
+            </a:endParaRPr>
+          </a:p>
+          <a:p>
+            <a:r>
+              <a:rPr lang="en-US" dirty="0" smtClean="0"/>
+              <a:t>Pad structures to multiples of cache line length, e.g.,</a:t>
+            </a:r>
+            <a:br>
+              <a:rPr lang="en-US" dirty="0" smtClean="0"/>
+            </a:br>
+            <a:r>
+              <a:rPr lang="en-US" sz="2200" dirty="0" err="1" smtClean="0">
+                <a:latin typeface="Courier New" panose="02070309020205020404" pitchFamily="49" charset="0"/>
+                <a:cs typeface="Courier New" panose="02070309020205020404" pitchFamily="49" charset="0"/>
+              </a:rPr>
+              <a:t>struct</a:t>
+            </a:r>
+            <a:r>
+              <a:rPr lang="en-US" sz="2200" dirty="0" smtClean="0">
+                <a:latin typeface="Courier New" panose="02070309020205020404" pitchFamily="49" charset="0"/>
+                <a:cs typeface="Courier New" panose="02070309020205020404" pitchFamily="49" charset="0"/>
+              </a:rPr>
+              <a:t> data {</a:t>
+            </a:r>
+            <a:br>
+              <a:rPr lang="en-US" sz="2200" dirty="0" smtClean="0">
+                <a:latin typeface="Courier New" panose="02070309020205020404" pitchFamily="49" charset="0"/>
+                <a:cs typeface="Courier New" panose="02070309020205020404" pitchFamily="49" charset="0"/>
+              </a:rPr>
+            </a:br>
+            <a:r>
+              <a:rPr lang="en-US" sz="2200" dirty="0" smtClean="0">
+                <a:latin typeface="Courier New" panose="02070309020205020404" pitchFamily="49" charset="0"/>
+                <a:cs typeface="Courier New" panose="02070309020205020404" pitchFamily="49" charset="0"/>
+              </a:rPr>
+              <a:t>    double x, y, z;</a:t>
+            </a:r>
+            <a:br>
+              <a:rPr lang="en-US" sz="2200" dirty="0" smtClean="0">
+                <a:latin typeface="Courier New" panose="02070309020205020404" pitchFamily="49" charset="0"/>
+                <a:cs typeface="Courier New" panose="02070309020205020404" pitchFamily="49" charset="0"/>
+              </a:rPr>
+            </a:br>
+            <a:r>
+              <a:rPr lang="en-US" sz="2200" dirty="0" smtClean="0">
+                <a:latin typeface="Courier New" panose="02070309020205020404" pitchFamily="49" charset="0"/>
+                <a:cs typeface="Courier New" panose="02070309020205020404" pitchFamily="49" charset="0"/>
+              </a:rPr>
+              <a:t>    double padding[5];</a:t>
+            </a:r>
+            <a:br>
+              <a:rPr lang="en-US" sz="2200" dirty="0" smtClean="0">
+                <a:latin typeface="Courier New" panose="02070309020205020404" pitchFamily="49" charset="0"/>
+                <a:cs typeface="Courier New" panose="02070309020205020404" pitchFamily="49" charset="0"/>
+              </a:rPr>
+            </a:br>
+            <a:r>
+              <a:rPr lang="en-US" sz="2200" dirty="0" smtClean="0">
+                <a:latin typeface="Courier New" panose="02070309020205020404" pitchFamily="49" charset="0"/>
+                <a:cs typeface="Courier New" panose="02070309020205020404" pitchFamily="49" charset="0"/>
+              </a:rPr>
+              <a:t>};</a:t>
+            </a:r>
+            <a:br>
+              <a:rPr lang="en-US" sz="2200" dirty="0" smtClean="0">
+                <a:latin typeface="Courier New" panose="02070309020205020404" pitchFamily="49" charset="0"/>
+                <a:cs typeface="Courier New" panose="02070309020205020404" pitchFamily="49" charset="0"/>
+              </a:rPr>
+            </a:br>
+            <a:r>
+              <a:rPr lang="en-US" sz="2200" dirty="0" err="1" smtClean="0">
+                <a:latin typeface="Courier New" panose="02070309020205020404" pitchFamily="49" charset="0"/>
+                <a:cs typeface="Courier New" panose="02070309020205020404" pitchFamily="49" charset="0"/>
+              </a:rPr>
+              <a:t>struct</a:t>
+            </a:r>
+            <a:r>
+              <a:rPr lang="en-US" sz="2200" dirty="0" smtClean="0">
+                <a:latin typeface="Courier New" panose="02070309020205020404" pitchFamily="49" charset="0"/>
+                <a:cs typeface="Courier New" panose="02070309020205020404" pitchFamily="49" charset="0"/>
+              </a:rPr>
+              <a:t> data points[20]</a:t>
+            </a:r>
+            <a:r>
+              <a:rPr lang="en-US" sz="2200" dirty="0">
+                <a:latin typeface="Courier New" panose="02070309020205020404" pitchFamily="49" charset="0"/>
+                <a:cs typeface="Courier New" panose="02070309020205020404" pitchFamily="49" charset="0"/>
+              </a:rPr>
+              <a:t> __attribute((align(64)))</a:t>
+            </a:r>
+            <a:r>
+              <a:rPr lang="en-US" sz="2200" dirty="0" smtClean="0">
+                <a:latin typeface="Courier New" panose="02070309020205020404" pitchFamily="49" charset="0"/>
+                <a:cs typeface="Courier New" panose="02070309020205020404" pitchFamily="49" charset="0"/>
+              </a:rPr>
+              <a:t>;</a:t>
+            </a:r>
+            <a:r>
+              <a:rPr lang="en-US" dirty="0" smtClean="0"/>
+              <a:t/>
+            </a:r>
+            <a:br>
+              <a:rPr lang="en-US" dirty="0" smtClean="0"/>
+            </a:br>
+            <a:endParaRPr lang="en-US" dirty="0"/>
+          </a:p>
+        </p:txBody>
+      </p:sp>
+      <p:sp>
+        <p:nvSpPr>
+          <p:cNvPr id="4" name="Slide Number Placeholder 3"/>
+          <p:cNvSpPr>
+            <a:spLocks noGrp="1"/>
+          </p:cNvSpPr>
+          <p:nvPr>
+            <p:ph type="sldNum" sz="quarter" idx="12"/>
+          </p:nvPr>
+        </p:nvSpPr>
+        <p:spPr/>
+        <p:txBody>
+          <a:bodyPr/>
+          <a:lstStyle/>
+          <a:p>
+            <a:fld id="{6597116C-F94B-4B5B-973A-17F07FB5C418}" type="slidenum">
+              <a:rPr lang="nl-BE" smtClean="0"/>
+              <a:t>37</a:t>
+            </a:fld>
+            <a:endParaRPr lang="nl-BE"/>
+          </a:p>
+        </p:txBody>
+      </p:sp>
+    </p:spTree>
+    <p:extLst>
+      <p:ext uri="{BB962C8B-B14F-4D97-AF65-F5344CB8AC3E}">
+        <p14:creationId xmlns:p14="http://schemas.microsoft.com/office/powerpoint/2010/main" val="1875071509"/>
+      </p:ext>
+    </p:extLst>
+  </p:cSld>
+  <p:clrMapOvr>
+    <a:masterClrMapping/>
+  </p:clrMapOvr>
+  <p:timing>
+    <p:tnLst>
+      <p:par>
+        <p:cTn id="1" dur="indefinite" restart="never" nodeType="tmRoot">
+          <p:childTnLst>
+            <p:seq concurrent="1" nextAc="seek">
+              <p:cTn id="2" dur="indefinite" nodeType="mainSeq">
+                <p:childTnLst>
+                  <p:par>
+                    <p:cTn id="3" fill="hold">
+                      <p:stCondLst>
+                        <p:cond delay="indefinite"/>
+                        <p:cond evt="onBegin" delay="0">
+                          <p:tn val="2"/>
+                        </p:cond>
+                      </p:stCondLst>
+                      <p:childTnLst>
+                        <p:par>
+                          <p:cTn id="4" fill="hold">
+                            <p:stCondLst>
+                              <p:cond delay="0"/>
+                            </p:stCondLst>
+                            <p:childTnLst>
+                              <p:par>
+                                <p:cTn id="5" presetID="1" presetClass="entr" presetSubtype="0" fill="hold" grpId="0" nodeType="withEffect">
+                                  <p:stCondLst>
+                                    <p:cond delay="0"/>
+                                  </p:stCondLst>
+                                  <p:childTnLst>
+                                    <p:set>
+                                      <p:cBhvr>
+                                        <p:cTn id="6" dur="1" fill="hold">
                                           <p:stCondLst>
                                             <p:cond delay="0"/>
                                           </p:stCondLst>
@@ -35791,7 +35777,7 @@
                                         <p:tgtEl>
                                           <p:spTgt spid="3">
                                             <p:txEl>
-                                              <p:pRg st="7" end="7"/>
+                                              <p:pRg st="0" end="0"/>
                                             </p:txEl>
                                           </p:spTgt>
                                         </p:tgtEl>
@@ -35806,15 +35792,33 @@
                                   </p:childTnLst>
                                 </p:cTn>
                               </p:par>
+                            </p:childTnLst>
+                          </p:cTn>
+                        </p:par>
+                      </p:childTnLst>
+                    </p:cTn>
+                  </p:par>
+                  <p:par>
+                    <p:cTn id="7" fill="hold">
+                      <p:stCondLst>
+                        <p:cond delay="indefinite"/>
+                      </p:stCondLst>
+                      <p:childTnLst>
+                        <p:par>
+                          <p:cTn id="8" fill="hold">
+                            <p:stCondLst>
+                              <p:cond delay="0"/>
+                            </p:stCondLst>
+                            <p:childTnLst>
                               <p:par>
-                                <p:cTn id="27" presetID="1" presetClass="entr" presetSubtype="0" fill="hold" grpId="0" nodeType="withEffect">
+                                <p:cTn id="9" presetID="1" presetClass="entr" presetSubtype="0" fill="hold" grpId="0" nodeType="clickEffect">
                                   <p:stCondLst>
                                     <p:cond delay="0"/>
                                   </p:stCondLst>
                                   <p:childTnLst>
                                     <p:set>
                                       <p:cBhvr>
-                                        <p:cTn id="28" dur="1" fill="hold">
+                                        <p:cTn id="10" dur="1" fill="hold">
                                           <p:stCondLst>
                                             <p:cond delay="0"/>
                                           </p:stCondLst>
@@ -35822,7 +35826,56 @@
                                         <p:tgtEl>
                                           <p:spTgt spid="3">
                                             <p:txEl>
-                                              <p:pRg st="8" end="8"/>
+                                              <p:pRg st="1" end="1"/>
+                                            </p:txEl>
+                                          </p:spTgt>
+                                        </p:tgtEl>
+                                        <p:attrNameLst>
+                                          <p:attrName>style.visibility</p:attrName>
+                                        </p:attrNameLst>
+                                      </p:cBhvr>
+                                      <p:to>
+                                        <p:strVal val="visible"/>
+                                      </p:to>
+                                    </p:set>
+                                  </p:childTnLst>
+                                </p:cTn>
+                              </p:par>
+                            </p:childTnLst>
+                          </p:cTn>
+                        </p:par>
+                      </p:childTnLst>
+                    </p:cTn>
+                  </p:par>
+                  <p:par>
+                    <p:cTn id="11" fill="hold">
+                      <p:stCondLst>
+                        <p:cond delay="indefinite"/>
+                      </p:stCondLst>
+                      <p:childTnLst>
+                        <p:par>
+                          <p:cTn id="12" fill="hold">
+                            <p:stCondLst>
+                              <p:cond delay="0"/>
+                            </p:stCondLst>
+                            <p:childTnLst>
+                              <p:par>
+                                <p:cTn id="13" presetID="1" presetClass="entr" presetSubtype="0" fill="hold" grpId="0" nodeType="clickEffect">
+                                  <p:stCondLst>
+                                    <p:cond delay="0"/>
+                                  </p:stCondLst>
+                                  <p:childTnLst>
+                                    <p:set>
+                                      <p:cBhvr>
+                                        <p:cTn id="14" dur="1" fill="hold">
+                                          <p:stCondLst>
+                                            <p:cond delay="0"/>
+                                          </p:stCondLst>
+                                        </p:cTn>
+                                        <p:tgtEl>
+                                          <p:spTgt spid="3">
+                                            <p:txEl>
+                                              <p:pRg st="2" end="2"/>
                                             </p:txEl>
                                           </p:spTgt>
                                         </p:tgtEl>
@@ -35866,8 +35919,295 @@
     </p:tnLst>
     <p:bldLst>
       <p:bldP spid="3" grpId="0" uiExpand="1" build="p"/>
-      <p:bldP spid="5" grpId="0" animBg="1"/>
     </p:bldLst>
+  </p:timing>
+</p:sld>
+</file>
+
+<file path=ppt/slides/slide38.xml><?xml version="1.0" encoding="utf-8"?>
+<p:sld xmlns:a="http://schemas.openxmlformats.org/drawingml/2006/main" xmlns:r="http://schemas.openxmlformats.org/officeDocument/2006/relationships" xmlns:p="http://schemas.openxmlformats.org/presentationml/2006/main">
+  <p:cSld>
+    <p:spTree>
+      <p:nvGrpSpPr>
+        <p:cNvPr id="1" name=""/>
+        <p:cNvGrpSpPr/>
+        <p:nvPr/>
+      </p:nvGrpSpPr>
+      <p:grpSpPr>
+        <a:xfrm>
+          <a:off x="0" y="0"/>
+          <a:ext cx="0" cy="0"/>
+          <a:chOff x="0" y="0"/>
+          <a:chExt cx="0" cy="0"/>
+        </a:xfrm>
+      </p:grpSpPr>
+      <p:sp>
+        <p:nvSpPr>
+          <p:cNvPr id="2" name="Title 1"/>
+          <p:cNvSpPr>
+            <a:spLocks noGrp="1"/>
+          </p:cNvSpPr>
+          <p:nvPr>
+            <p:ph type="title"/>
+          </p:nvPr>
+        </p:nvSpPr>
+        <p:spPr/>
+        <p:txBody>
+          <a:bodyPr/>
+          <a:lstStyle/>
+          <a:p>
+            <a:r>
+              <a:rPr lang="en-US" dirty="0" smtClean="0"/>
+              <a:t>Conclusion</a:t>
+            </a:r>
+            <a:endParaRPr lang="nl-BE" dirty="0"/>
+          </a:p>
+        </p:txBody>
+      </p:sp>
+      <p:sp>
+        <p:nvSpPr>
+          <p:cNvPr id="3" name="Text Placeholder 2"/>
+          <p:cNvSpPr>
+            <a:spLocks noGrp="1"/>
+          </p:cNvSpPr>
+          <p:nvPr>
+            <p:ph type="body" idx="1"/>
+          </p:nvPr>
+        </p:nvSpPr>
+        <p:spPr/>
+        <p:txBody>
+          <a:bodyPr/>
+          <a:lstStyle/>
+          <a:p>
+            <a:endParaRPr lang="nl-BE"/>
+          </a:p>
+        </p:txBody>
+      </p:sp>
+      <p:sp>
+        <p:nvSpPr>
+          <p:cNvPr id="4" name="Slide Number Placeholder 3"/>
+          <p:cNvSpPr>
+            <a:spLocks noGrp="1"/>
+          </p:cNvSpPr>
+          <p:nvPr>
+            <p:ph type="sldNum" sz="quarter" idx="12"/>
+          </p:nvPr>
+        </p:nvSpPr>
+        <p:spPr/>
+        <p:txBody>
+          <a:bodyPr/>
+          <a:lstStyle/>
+          <a:p>
+            <a:fld id="{6597116C-F94B-4B5B-973A-17F07FB5C418}" type="slidenum">
+              <a:rPr lang="nl-BE" smtClean="0"/>
+              <a:t>38</a:t>
+            </a:fld>
+            <a:endParaRPr lang="nl-BE"/>
+          </a:p>
+        </p:txBody>
+      </p:sp>
+    </p:spTree>
+    <p:extLst>
+      <p:ext uri="{BB962C8B-B14F-4D97-AF65-F5344CB8AC3E}">
+        <p14:creationId xmlns:p14="http://schemas.microsoft.com/office/powerpoint/2010/main" val="1387657132"/>
+      </p:ext>
+    </p:extLst>
+  </p:cSld>
+  <p:clrMapOvr>
+    <a:masterClrMapping/>
+  </p:clrMapOvr>
+  <p:timing>
+    <p:tnLst>
+      <p:par>
+        <p:cTn id="1" dur="indefinite" restart="never" nodeType="tmRoot"/>
+      </p:par>
+    </p:tnLst>
+  </p:timing>
+</p:sld>
+</file>
+
+<file path=ppt/slides/slide39.xml><?xml version="1.0" encoding="utf-8"?>
+<p:sld xmlns:a="http://schemas.openxmlformats.org/drawingml/2006/main" xmlns:r="http://schemas.openxmlformats.org/officeDocument/2006/relationships" xmlns:p="http://schemas.openxmlformats.org/presentationml/2006/main">
+  <p:cSld>
+    <p:spTree>
+      <p:nvGrpSpPr>
+        <p:cNvPr id="1" name=""/>
+        <p:cNvGrpSpPr/>
+        <p:nvPr/>
+      </p:nvGrpSpPr>
+      <p:grpSpPr>
+        <a:xfrm>
+          <a:off x="0" y="0"/>
+          <a:ext cx="0" cy="0"/>
+          <a:chOff x="0" y="0"/>
+          <a:chExt cx="0" cy="0"/>
+        </a:xfrm>
+      </p:grpSpPr>
+      <p:sp>
+        <p:nvSpPr>
+          <p:cNvPr id="5" name="Title 4"/>
+          <p:cNvSpPr>
+            <a:spLocks noGrp="1"/>
+          </p:cNvSpPr>
+          <p:nvPr>
+            <p:ph type="title"/>
+          </p:nvPr>
+        </p:nvSpPr>
+        <p:spPr/>
+        <p:txBody>
+          <a:bodyPr/>
+          <a:lstStyle/>
+          <a:p>
+            <a:r>
+              <a:rPr lang="en-US" dirty="0" smtClean="0"/>
+              <a:t>Useful references</a:t>
+            </a:r>
+            <a:endParaRPr lang="nl-BE" dirty="0"/>
+          </a:p>
+        </p:txBody>
+      </p:sp>
+      <p:sp>
+        <p:nvSpPr>
+          <p:cNvPr id="6" name="Content Placeholder 5"/>
+          <p:cNvSpPr>
+            <a:spLocks noGrp="1"/>
+          </p:cNvSpPr>
+          <p:nvPr>
+            <p:ph idx="1"/>
+          </p:nvPr>
+        </p:nvSpPr>
+        <p:spPr/>
+        <p:txBody>
+          <a:bodyPr>
+            <a:normAutofit lnSpcReduction="10000"/>
+          </a:bodyPr>
+          <a:lstStyle/>
+          <a:p>
+            <a:r>
+              <a:rPr lang="en-US" dirty="0" smtClean="0">
+                <a:hlinkClick r:id="rId2"/>
+              </a:rPr>
+              <a:t>Gallery of processor cache effects</a:t>
+            </a:r>
+            <a:endParaRPr lang="en-US" dirty="0" smtClean="0"/>
+          </a:p>
+          <a:p>
+            <a:r>
+              <a:rPr lang="en-US" dirty="0" smtClean="0"/>
+              <a:t>Vectorization</a:t>
+            </a:r>
+          </a:p>
+          <a:p>
+            <a:pPr lvl="1"/>
+            <a:r>
+              <a:rPr lang="en-US" dirty="0" smtClean="0">
+                <a:hlinkClick r:id="rId3"/>
+              </a:rPr>
+              <a:t>A guide to vectorization with Intel C++ compilers</a:t>
+            </a:r>
+            <a:endParaRPr lang="en-US" dirty="0" smtClean="0"/>
+          </a:p>
+          <a:p>
+            <a:pPr lvl="1"/>
+            <a:r>
+              <a:rPr lang="en-US" dirty="0" smtClean="0">
+                <a:hlinkClick r:id="rId4"/>
+              </a:rPr>
+              <a:t>Auto-vectorization with </a:t>
+            </a:r>
+            <a:r>
+              <a:rPr lang="en-US" dirty="0" err="1" smtClean="0">
+                <a:hlinkClick r:id="rId4"/>
+              </a:rPr>
+              <a:t>gcc</a:t>
+            </a:r>
+            <a:r>
+              <a:rPr lang="en-US" dirty="0" smtClean="0">
+                <a:hlinkClick r:id="rId4"/>
+              </a:rPr>
+              <a:t> 4.7</a:t>
+            </a:r>
+            <a:endParaRPr lang="en-US" dirty="0" smtClean="0"/>
+          </a:p>
+          <a:p>
+            <a:r>
+              <a:rPr lang="en-US" dirty="0"/>
+              <a:t>Introduction to High Performance Computing for Scientists and </a:t>
+            </a:r>
+            <a:r>
+              <a:rPr lang="en-US" dirty="0" smtClean="0"/>
+              <a:t>Engineers</a:t>
+            </a:r>
+            <a:r>
+              <a:rPr lang="nl-BE" dirty="0" smtClean="0"/>
+              <a:t/>
+            </a:r>
+            <a:br>
+              <a:rPr lang="nl-BE" dirty="0" smtClean="0"/>
+            </a:br>
+            <a:r>
+              <a:rPr lang="nl-BE" dirty="0" smtClean="0"/>
+              <a:t>Georg Hager &amp; Gerhard Wellein</a:t>
+            </a:r>
+            <a:br>
+              <a:rPr lang="nl-BE" dirty="0" smtClean="0"/>
+            </a:br>
+            <a:r>
+              <a:rPr lang="nl-BE" dirty="0" smtClean="0"/>
+              <a:t>Chapman &amp; Hall, 2010</a:t>
+            </a:r>
+            <a:endParaRPr lang="en-US" b="1" dirty="0"/>
+          </a:p>
+          <a:p>
+            <a:r>
+              <a:rPr lang="en-US" dirty="0" smtClean="0">
+                <a:hlinkClick r:id="rId5"/>
+              </a:rPr>
+              <a:t>Why has CPU frequency ceased to grow?</a:t>
+            </a:r>
+            <a:endParaRPr lang="nl-BE" dirty="0" smtClean="0"/>
+          </a:p>
+        </p:txBody>
+      </p:sp>
+      <p:sp>
+        <p:nvSpPr>
+          <p:cNvPr id="4" name="Slide Number Placeholder 3"/>
+          <p:cNvSpPr>
+            <a:spLocks noGrp="1"/>
+          </p:cNvSpPr>
+          <p:nvPr>
+            <p:ph type="sldNum" sz="quarter" idx="12"/>
+          </p:nvPr>
+        </p:nvSpPr>
+        <p:spPr/>
+        <p:txBody>
+          <a:bodyPr/>
+          <a:lstStyle/>
+          <a:p>
+            <a:fld id="{6597116C-F94B-4B5B-973A-17F07FB5C418}" type="slidenum">
+              <a:rPr lang="nl-BE" smtClean="0"/>
+              <a:t>39</a:t>
+            </a:fld>
+            <a:endParaRPr lang="nl-BE"/>
+          </a:p>
+        </p:txBody>
+      </p:sp>
+    </p:spTree>
+    <p:extLst>
+      <p:ext uri="{BB962C8B-B14F-4D97-AF65-F5344CB8AC3E}">
+        <p14:creationId xmlns:p14="http://schemas.microsoft.com/office/powerpoint/2010/main" val="2653023660"/>
+      </p:ext>
+    </p:extLst>
+  </p:cSld>
+  <p:clrMapOvr>
+    <a:masterClrMapping/>
+  </p:clrMapOvr>
+  <p:timing>
+    <p:tnLst>
+      <p:par>
+        <p:cTn id="1" dur="indefinite" restart="never" nodeType="tmRoot"/>
+      </p:par>
+    </p:tnLst>
   </p:timing>
 </p:sld>
 </file>
@@ -36586,6 +36926,731 @@
 </file>
 
 <file path=ppt/slides/slide40.xml><?xml version="1.0" encoding="utf-8"?>
+<p:sld xmlns:a="http://schemas.openxmlformats.org/drawingml/2006/main" xmlns:r="http://schemas.openxmlformats.org/officeDocument/2006/relationships" xmlns:p="http://schemas.openxmlformats.org/presentationml/2006/main">
+  <p:cSld>
+    <p:spTree>
+      <p:nvGrpSpPr>
+        <p:cNvPr id="1" name=""/>
+        <p:cNvGrpSpPr/>
+        <p:nvPr/>
+      </p:nvGrpSpPr>
+      <p:grpSpPr>
+        <a:xfrm>
+          <a:off x="0" y="0"/>
+          <a:ext cx="0" cy="0"/>
+          <a:chOff x="0" y="0"/>
+          <a:chExt cx="0" cy="0"/>
+        </a:xfrm>
+      </p:grpSpPr>
+      <p:sp>
+        <p:nvSpPr>
+          <p:cNvPr id="2" name="Title 1"/>
+          <p:cNvSpPr>
+            <a:spLocks noGrp="1"/>
+          </p:cNvSpPr>
+          <p:nvPr>
+            <p:ph type="title"/>
+          </p:nvPr>
+        </p:nvSpPr>
+        <p:spPr/>
+        <p:txBody>
+          <a:bodyPr/>
+          <a:lstStyle/>
+          <a:p>
+            <a:r>
+              <a:rPr lang="en-US" dirty="0" smtClean="0"/>
+              <a:t>Appendix</a:t>
+            </a:r>
+            <a:endParaRPr lang="nl-BE" dirty="0"/>
+          </a:p>
+        </p:txBody>
+      </p:sp>
+      <p:sp>
+        <p:nvSpPr>
+          <p:cNvPr id="3" name="Text Placeholder 2"/>
+          <p:cNvSpPr>
+            <a:spLocks noGrp="1"/>
+          </p:cNvSpPr>
+          <p:nvPr>
+            <p:ph type="body" idx="1"/>
+          </p:nvPr>
+        </p:nvSpPr>
+        <p:spPr/>
+        <p:txBody>
+          <a:bodyPr/>
+          <a:lstStyle/>
+          <a:p>
+            <a:endParaRPr lang="nl-BE"/>
+          </a:p>
+        </p:txBody>
+      </p:sp>
+      <p:sp>
+        <p:nvSpPr>
+          <p:cNvPr id="4" name="Slide Number Placeholder 3"/>
+          <p:cNvSpPr>
+            <a:spLocks noGrp="1"/>
+          </p:cNvSpPr>
+          <p:nvPr>
+            <p:ph type="sldNum" sz="quarter" idx="12"/>
+          </p:nvPr>
+        </p:nvSpPr>
+        <p:spPr/>
+        <p:txBody>
+          <a:bodyPr/>
+          <a:lstStyle/>
+          <a:p>
+            <a:fld id="{6597116C-F94B-4B5B-973A-17F07FB5C418}" type="slidenum">
+              <a:rPr lang="nl-BE" smtClean="0"/>
+              <a:t>40</a:t>
+            </a:fld>
+            <a:endParaRPr lang="nl-BE"/>
+          </a:p>
+        </p:txBody>
+      </p:sp>
+    </p:spTree>
+    <p:extLst>
+      <p:ext uri="{BB962C8B-B14F-4D97-AF65-F5344CB8AC3E}">
+        <p14:creationId xmlns:p14="http://schemas.microsoft.com/office/powerpoint/2010/main" val="3118825235"/>
+      </p:ext>
+    </p:extLst>
+  </p:cSld>
+  <p:clrMapOvr>
+    <a:masterClrMapping/>
+  </p:clrMapOvr>
+  <p:timing>
+    <p:tnLst>
+      <p:par>
+        <p:cTn id="1" dur="indefinite" restart="never" nodeType="tmRoot"/>
+      </p:par>
+    </p:tnLst>
+  </p:timing>
+</p:sld>
+</file>
+
+<file path=ppt/slides/slide41.xml><?xml version="1.0" encoding="utf-8"?>
+<p:sld xmlns:a="http://schemas.openxmlformats.org/drawingml/2006/main" xmlns:r="http://schemas.openxmlformats.org/officeDocument/2006/relationships" xmlns:p="http://schemas.openxmlformats.org/presentationml/2006/main">
+  <p:cSld>
+    <p:spTree>
+      <p:nvGrpSpPr>
+        <p:cNvPr id="1" name=""/>
+        <p:cNvGrpSpPr/>
+        <p:nvPr/>
+      </p:nvGrpSpPr>
+      <p:grpSpPr>
+        <a:xfrm>
+          <a:off x="0" y="0"/>
+          <a:ext cx="0" cy="0"/>
+          <a:chOff x="0" y="0"/>
+          <a:chExt cx="0" cy="0"/>
+        </a:xfrm>
+      </p:grpSpPr>
+      <p:sp>
+        <p:nvSpPr>
+          <p:cNvPr id="2" name="Title 1"/>
+          <p:cNvSpPr>
+            <a:spLocks noGrp="1"/>
+          </p:cNvSpPr>
+          <p:nvPr>
+            <p:ph type="title"/>
+          </p:nvPr>
+        </p:nvSpPr>
+        <p:spPr/>
+        <p:txBody>
+          <a:bodyPr/>
+          <a:lstStyle/>
+          <a:p>
+            <a:r>
+              <a:rPr lang="en-US" dirty="0" smtClean="0"/>
+              <a:t>Tools</a:t>
+            </a:r>
+            <a:endParaRPr lang="en-US" dirty="0"/>
+          </a:p>
+        </p:txBody>
+      </p:sp>
+      <p:sp>
+        <p:nvSpPr>
+          <p:cNvPr id="3" name="Content Placeholder 2"/>
+          <p:cNvSpPr>
+            <a:spLocks noGrp="1"/>
+          </p:cNvSpPr>
+          <p:nvPr>
+            <p:ph idx="1"/>
+          </p:nvPr>
+        </p:nvSpPr>
+        <p:spPr/>
+        <p:txBody>
+          <a:bodyPr>
+            <a:normAutofit fontScale="92500" lnSpcReduction="10000"/>
+          </a:bodyPr>
+          <a:lstStyle/>
+          <a:p>
+            <a:r>
+              <a:rPr lang="en-US" dirty="0" smtClean="0"/>
+              <a:t>Profilers</a:t>
+            </a:r>
+          </a:p>
+          <a:p>
+            <a:pPr lvl="1"/>
+            <a:r>
+              <a:rPr lang="en-US" dirty="0" err="1" smtClean="0"/>
+              <a:t>gprof</a:t>
+            </a:r>
+            <a:endParaRPr lang="en-US" dirty="0" smtClean="0"/>
+          </a:p>
+          <a:p>
+            <a:pPr lvl="1"/>
+            <a:r>
+              <a:rPr lang="en-US" dirty="0" err="1" smtClean="0"/>
+              <a:t>Scalasca</a:t>
+            </a:r>
+            <a:endParaRPr lang="en-US" dirty="0" smtClean="0"/>
+          </a:p>
+          <a:p>
+            <a:pPr lvl="1"/>
+            <a:r>
+              <a:rPr lang="en-US" dirty="0" err="1" smtClean="0"/>
+              <a:t>AllineaForge</a:t>
+            </a:r>
+            <a:r>
+              <a:rPr lang="en-US" dirty="0" smtClean="0"/>
+              <a:t> MAP</a:t>
+            </a:r>
+          </a:p>
+          <a:p>
+            <a:pPr lvl="1"/>
+            <a:r>
+              <a:rPr lang="en-US" dirty="0" smtClean="0"/>
+              <a:t>Intel </a:t>
+            </a:r>
+            <a:r>
+              <a:rPr lang="en-US" dirty="0" err="1" smtClean="0"/>
+              <a:t>vTune</a:t>
+            </a:r>
+            <a:endParaRPr lang="en-US" dirty="0" smtClean="0"/>
+          </a:p>
+          <a:p>
+            <a:r>
+              <a:rPr lang="en-US" dirty="0" smtClean="0"/>
+              <a:t>Hardware information</a:t>
+            </a:r>
+          </a:p>
+          <a:p>
+            <a:pPr lvl="1"/>
+            <a:r>
+              <a:rPr lang="en-US" dirty="0" err="1" smtClean="0"/>
+              <a:t>lscpu</a:t>
+            </a:r>
+            <a:r>
+              <a:rPr lang="en-US" dirty="0" smtClean="0"/>
+              <a:t>: CPU information, including cache size and NUMA configuration</a:t>
+            </a:r>
+          </a:p>
+          <a:p>
+            <a:pPr lvl="1"/>
+            <a:r>
+              <a:rPr lang="en-US" dirty="0" err="1" smtClean="0"/>
+              <a:t>lstopo</a:t>
+            </a:r>
+            <a:r>
+              <a:rPr lang="en-US" dirty="0" smtClean="0"/>
+              <a:t>-no-graphics: more detailed cache topology</a:t>
+            </a:r>
+          </a:p>
+          <a:p>
+            <a:pPr lvl="1"/>
+            <a:r>
+              <a:rPr lang="en-US" dirty="0" smtClean="0"/>
+              <a:t>Intel </a:t>
+            </a:r>
+            <a:r>
+              <a:rPr lang="en-US" dirty="0" err="1" smtClean="0"/>
+              <a:t>mlc</a:t>
+            </a:r>
+            <a:r>
+              <a:rPr lang="en-US" dirty="0" smtClean="0"/>
+              <a:t>: provides memory bandwidth &amp; latency info</a:t>
+            </a:r>
+            <a:endParaRPr lang="en-US" dirty="0"/>
+          </a:p>
+        </p:txBody>
+      </p:sp>
+      <p:sp>
+        <p:nvSpPr>
+          <p:cNvPr id="4" name="Slide Number Placeholder 3"/>
+          <p:cNvSpPr>
+            <a:spLocks noGrp="1"/>
+          </p:cNvSpPr>
+          <p:nvPr>
+            <p:ph type="sldNum" sz="quarter" idx="12"/>
+          </p:nvPr>
+        </p:nvSpPr>
+        <p:spPr/>
+        <p:txBody>
+          <a:bodyPr/>
+          <a:lstStyle/>
+          <a:p>
+            <a:fld id="{6597116C-F94B-4B5B-973A-17F07FB5C418}" type="slidenum">
+              <a:rPr lang="nl-BE" smtClean="0"/>
+              <a:t>41</a:t>
+            </a:fld>
+            <a:endParaRPr lang="nl-BE"/>
+          </a:p>
+        </p:txBody>
+      </p:sp>
+      <p:sp>
+        <p:nvSpPr>
+          <p:cNvPr id="5" name="TextBox 4"/>
+          <p:cNvSpPr txBox="1"/>
+          <p:nvPr/>
+        </p:nvSpPr>
+        <p:spPr>
+          <a:xfrm>
+            <a:off x="5148064" y="2420888"/>
+            <a:ext cx="2201500" cy="954107"/>
+          </a:xfrm>
+          <a:prstGeom prst="rect">
+            <a:avLst/>
+          </a:prstGeom>
+          <a:noFill/>
+          <a:ln>
+            <a:solidFill>
+              <a:schemeClr val="tx1"/>
+            </a:solidFill>
+          </a:ln>
+        </p:spPr>
+        <p:txBody>
+          <a:bodyPr wrap="none" rtlCol="0">
+            <a:spAutoFit/>
+          </a:bodyPr>
+          <a:lstStyle/>
+          <a:p>
+            <a:pPr algn="ctr"/>
+            <a:r>
+              <a:rPr lang="en-US" sz="2800" dirty="0" smtClean="0"/>
+              <a:t>Use a profiler,</a:t>
+            </a:r>
+            <a:br>
+              <a:rPr lang="en-US" sz="2800" dirty="0" smtClean="0"/>
+            </a:br>
+            <a:r>
+              <a:rPr lang="en-US" sz="2800" dirty="0" smtClean="0"/>
+              <a:t>it is the law!</a:t>
+            </a:r>
+            <a:endParaRPr lang="en-US" sz="2800" dirty="0"/>
+          </a:p>
+        </p:txBody>
+      </p:sp>
+    </p:spTree>
+    <p:extLst>
+      <p:ext uri="{BB962C8B-B14F-4D97-AF65-F5344CB8AC3E}">
+        <p14:creationId xmlns:p14="http://schemas.microsoft.com/office/powerpoint/2010/main" val="1031716690"/>
+      </p:ext>
+    </p:extLst>
+  </p:cSld>
+  <p:clrMapOvr>
+    <a:masterClrMapping/>
+  </p:clrMapOvr>
+  <p:timing>
+    <p:tnLst>
+      <p:par>
+        <p:cTn id="1" dur="indefinite" restart="never" nodeType="tmRoot">
+          <p:childTnLst>
+            <p:seq concurrent="1" nextAc="seek">
+              <p:cTn id="2" dur="indefinite" nodeType="mainSeq">
+                <p:childTnLst>
+                  <p:par>
+                    <p:cTn id="3" fill="hold">
+                      <p:stCondLst>
+                        <p:cond delay="indefinite"/>
+                        <p:cond evt="onBegin" delay="0">
+                          <p:tn val="2"/>
+                        </p:cond>
+                      </p:stCondLst>
+                      <p:childTnLst>
+                        <p:par>
+                          <p:cTn id="4" fill="hold">
+                            <p:stCondLst>
+                              <p:cond delay="0"/>
+                            </p:stCondLst>
+                            <p:childTnLst>
+                              <p:par>
+                                <p:cTn id="5" presetID="1" presetClass="entr" presetSubtype="0" fill="hold" grpId="0" nodeType="withEffect">
+                                  <p:stCondLst>
+                                    <p:cond delay="0"/>
+                                  </p:stCondLst>
+                                  <p:childTnLst>
+                                    <p:set>
+                                      <p:cBhvr>
+                                        <p:cTn id="6" dur="1" fill="hold">
+                                          <p:stCondLst>
+                                            <p:cond delay="0"/>
+                                          </p:stCondLst>
+                                        </p:cTn>
+                                        <p:tgtEl>
+                                          <p:spTgt spid="3">
+                                            <p:txEl>
+                                              <p:pRg st="0" end="0"/>
+                                            </p:txEl>
+                                          </p:spTgt>
+                                        </p:tgtEl>
+                                        <p:attrNameLst>
+                                          <p:attrName>style.visibility</p:attrName>
+                                        </p:attrNameLst>
+                                      </p:cBhvr>
+                                      <p:to>
+                                        <p:strVal val="visible"/>
+                                      </p:to>
+                                    </p:set>
+                                  </p:childTnLst>
+                                </p:cTn>
+                              </p:par>
+                              <p:par>
+                                <p:cTn id="7" presetID="1" presetClass="entr" presetSubtype="0" fill="hold" grpId="0" nodeType="withEffect">
+                                  <p:stCondLst>
+                                    <p:cond delay="0"/>
+                                  </p:stCondLst>
+                                  <p:childTnLst>
+                                    <p:set>
+                                      <p:cBhvr>
+                                        <p:cTn id="8" dur="1" fill="hold">
+                                          <p:stCondLst>
+                                            <p:cond delay="0"/>
+                                          </p:stCondLst>
+                                        </p:cTn>
+                                        <p:tgtEl>
+                                          <p:spTgt spid="3">
+                                            <p:txEl>
+                                              <p:pRg st="1" end="1"/>
+                                            </p:txEl>
+                                          </p:spTgt>
+                                        </p:tgtEl>
+                                        <p:attrNameLst>
+                                          <p:attrName>style.visibility</p:attrName>
+                                        </p:attrNameLst>
+                                      </p:cBhvr>
+                                      <p:to>
+                                        <p:strVal val="visible"/>
+                                      </p:to>
+                                    </p:set>
+                                  </p:childTnLst>
+                                </p:cTn>
+                              </p:par>
+                              <p:par>
+                                <p:cTn id="9" presetID="1" presetClass="entr" presetSubtype="0" fill="hold" grpId="0" nodeType="withEffect">
+                                  <p:stCondLst>
+                                    <p:cond delay="0"/>
+                                  </p:stCondLst>
+                                  <p:childTnLst>
+                                    <p:set>
+                                      <p:cBhvr>
+                                        <p:cTn id="10" dur="1" fill="hold">
+                                          <p:stCondLst>
+                                            <p:cond delay="0"/>
+                                          </p:stCondLst>
+                                        </p:cTn>
+                                        <p:tgtEl>
+                                          <p:spTgt spid="3">
+                                            <p:txEl>
+                                              <p:pRg st="2" end="2"/>
+                                            </p:txEl>
+                                          </p:spTgt>
+                                        </p:tgtEl>
+                                        <p:attrNameLst>
+                                          <p:attrName>style.visibility</p:attrName>
+                                        </p:attrNameLst>
+                                      </p:cBhvr>
+                                      <p:to>
+                                        <p:strVal val="visible"/>
+                                      </p:to>
+                                    </p:set>
+                                  </p:childTnLst>
+                                </p:cTn>
+                              </p:par>
+                              <p:par>
+                                <p:cTn id="11" presetID="1" presetClass="entr" presetSubtype="0" fill="hold" grpId="0" nodeType="withEffect">
+                                  <p:stCondLst>
+                                    <p:cond delay="0"/>
+                                  </p:stCondLst>
+                                  <p:childTnLst>
+                                    <p:set>
+                                      <p:cBhvr>
+                                        <p:cTn id="12" dur="1" fill="hold">
+                                          <p:stCondLst>
+                                            <p:cond delay="0"/>
+                                          </p:stCondLst>
+                                        </p:cTn>
+                                        <p:tgtEl>
+                                          <p:spTgt spid="3">
+                                            <p:txEl>
+                                              <p:pRg st="3" end="3"/>
+                                            </p:txEl>
+                                          </p:spTgt>
+                                        </p:tgtEl>
+                                        <p:attrNameLst>
+                                          <p:attrName>style.visibility</p:attrName>
+                                        </p:attrNameLst>
+                                      </p:cBhvr>
+                                      <p:to>
+                                        <p:strVal val="visible"/>
+                                      </p:to>
+                                    </p:set>
+                                  </p:childTnLst>
+                                </p:cTn>
+                              </p:par>
+                              <p:par>
+                                <p:cTn id="13" presetID="1" presetClass="entr" presetSubtype="0" fill="hold" grpId="0" nodeType="withEffect">
+                                  <p:stCondLst>
+                                    <p:cond delay="0"/>
+                                  </p:stCondLst>
+                                  <p:childTnLst>
+                                    <p:set>
+                                      <p:cBhvr>
+                                        <p:cTn id="14" dur="1" fill="hold">
+                                          <p:stCondLst>
+                                            <p:cond delay="0"/>
+                                          </p:stCondLst>
+                                        </p:cTn>
+                                        <p:tgtEl>
+                                          <p:spTgt spid="3">
+                                            <p:txEl>
+                                              <p:pRg st="4" end="4"/>
+                                            </p:txEl>
+                                          </p:spTgt>
+                                        </p:tgtEl>
+                                        <p:attrNameLst>
+                                          <p:attrName>style.visibility</p:attrName>
+                                        </p:attrNameLst>
+                                      </p:cBhvr>
+                                      <p:to>
+                                        <p:strVal val="visible"/>
+                                      </p:to>
+                                    </p:set>
+                                  </p:childTnLst>
+                                </p:cTn>
+                              </p:par>
+                            </p:childTnLst>
+                          </p:cTn>
+                        </p:par>
+                      </p:childTnLst>
+                    </p:cTn>
+                  </p:par>
+                  <p:par>
+                    <p:cTn id="15" fill="hold">
+                      <p:stCondLst>
+                        <p:cond delay="indefinite"/>
+                      </p:stCondLst>
+                      <p:childTnLst>
+                        <p:par>
+                          <p:cTn id="16" fill="hold">
+                            <p:stCondLst>
+                              <p:cond delay="0"/>
+                            </p:stCondLst>
+                            <p:childTnLst>
+                              <p:par>
+                                <p:cTn id="17" presetID="1" presetClass="entr" presetSubtype="0" fill="hold" grpId="0" nodeType="clickEffect">
+                                  <p:stCondLst>
+                                    <p:cond delay="0"/>
+                                  </p:stCondLst>
+                                  <p:childTnLst>
+                                    <p:set>
+                                      <p:cBhvr>
+                                        <p:cTn id="18" dur="1" fill="hold">
+                                          <p:stCondLst>
+                                            <p:cond delay="0"/>
+                                          </p:stCondLst>
+                                        </p:cTn>
+                                        <p:tgtEl>
+                                          <p:spTgt spid="5"/>
+                                        </p:tgtEl>
+                                        <p:attrNameLst>
+                                          <p:attrName>style.visibility</p:attrName>
+                                        </p:attrNameLst>
+                                      </p:cBhvr>
+                                      <p:to>
+                                        <p:strVal val="visible"/>
+                                      </p:to>
+                                    </p:set>
+                                  </p:childTnLst>
+                                </p:cTn>
+                              </p:par>
+                            </p:childTnLst>
+                          </p:cTn>
+                        </p:par>
+                      </p:childTnLst>
+                    </p:cTn>
+                  </p:par>
+                  <p:par>
+                    <p:cTn id="19" fill="hold">
+                      <p:stCondLst>
+                        <p:cond delay="indefinite"/>
+                      </p:stCondLst>
+                      <p:childTnLst>
+                        <p:par>
+                          <p:cTn id="20" fill="hold">
+                            <p:stCondLst>
+                              <p:cond delay="0"/>
+                            </p:stCondLst>
+                            <p:childTnLst>
+                              <p:par>
+                                <p:cTn id="21" presetID="1" presetClass="entr" presetSubtype="0" fill="hold" grpId="0" nodeType="clickEffect">
+                                  <p:stCondLst>
+                                    <p:cond delay="0"/>
+                                  </p:stCondLst>
+                                  <p:childTnLst>
+                                    <p:set>
+                                      <p:cBhvr>
+                                        <p:cTn id="22" dur="1" fill="hold">
+                                          <p:stCondLst>
+                                            <p:cond delay="0"/>
+                                          </p:stCondLst>
+                                        </p:cTn>
+                                        <p:tgtEl>
+                                          <p:spTgt spid="3">
+                                            <p:txEl>
+                                              <p:pRg st="5" end="5"/>
+                                            </p:txEl>
+                                          </p:spTgt>
+                                        </p:tgtEl>
+                                        <p:attrNameLst>
+                                          <p:attrName>style.visibility</p:attrName>
+                                        </p:attrNameLst>
+                                      </p:cBhvr>
+                                      <p:to>
+                                        <p:strVal val="visible"/>
+                                      </p:to>
+                                    </p:set>
+                                  </p:childTnLst>
+                                </p:cTn>
+                              </p:par>
+                              <p:par>
+                                <p:cTn id="23" presetID="1" presetClass="entr" presetSubtype="0" fill="hold" grpId="0" nodeType="withEffect">
+                                  <p:stCondLst>
+                                    <p:cond delay="0"/>
+                                  </p:stCondLst>
+                                  <p:childTnLst>
+                                    <p:set>
+                                      <p:cBhvr>
+                                        <p:cTn id="24" dur="1" fill="hold">
+                                          <p:stCondLst>
+                                            <p:cond delay="0"/>
+                                          </p:stCondLst>
+                                        </p:cTn>
+                                        <p:tgtEl>
+                                          <p:spTgt spid="3">
+                                            <p:txEl>
+                                              <p:pRg st="6" end="6"/>
+                                            </p:txEl>
+                                          </p:spTgt>
+                                        </p:tgtEl>
+                                        <p:attrNameLst>
+                                          <p:attrName>style.visibility</p:attrName>
+                                        </p:attrNameLst>
+                                      </p:cBhvr>
+                                      <p:to>
+                                        <p:strVal val="visible"/>
+                                      </p:to>
+                                    </p:set>
+                                  </p:childTnLst>
+                                </p:cTn>
+                              </p:par>
+                              <p:par>
+                                <p:cTn id="25" presetID="1" presetClass="entr" presetSubtype="0" fill="hold" grpId="0" nodeType="withEffect">
+                                  <p:stCondLst>
+                                    <p:cond delay="0"/>
+                                  </p:stCondLst>
+                                  <p:childTnLst>
+                                    <p:set>
+                                      <p:cBhvr>
+                                        <p:cTn id="26" dur="1" fill="hold">
+                                          <p:stCondLst>
+                                            <p:cond delay="0"/>
+                                          </p:stCondLst>
+                                        </p:cTn>
+                                        <p:tgtEl>
+                                          <p:spTgt spid="3">
+                                            <p:txEl>
+                                              <p:pRg st="7" end="7"/>
+                                            </p:txEl>
+                                          </p:spTgt>
+                                        </p:tgtEl>
+                                        <p:attrNameLst>
+                                          <p:attrName>style.visibility</p:attrName>
+                                        </p:attrNameLst>
+                                      </p:cBhvr>
+                                      <p:to>
+                                        <p:strVal val="visible"/>
+                                      </p:to>
+                                    </p:set>
+                                  </p:childTnLst>
+                                </p:cTn>
+                              </p:par>
+                              <p:par>
+                                <p:cTn id="27" presetID="1" presetClass="entr" presetSubtype="0" fill="hold" grpId="0" nodeType="withEffect">
+                                  <p:stCondLst>
+                                    <p:cond delay="0"/>
+                                  </p:stCondLst>
+                                  <p:childTnLst>
+                                    <p:set>
+                                      <p:cBhvr>
+                                        <p:cTn id="28" dur="1" fill="hold">
+                                          <p:stCondLst>
+                                            <p:cond delay="0"/>
+                                          </p:stCondLst>
+                                        </p:cTn>
+                                        <p:tgtEl>
+                                          <p:spTgt spid="3">
+                                            <p:txEl>
+                                              <p:pRg st="8" end="8"/>
+                                            </p:txEl>
+                                          </p:spTgt>
+                                        </p:tgtEl>
+                                        <p:attrNameLst>
+                                          <p:attrName>style.visibility</p:attrName>
+                                        </p:attrNameLst>
+                                      </p:cBhvr>
+                                      <p:to>
+                                        <p:strVal val="visible"/>
+                                      </p:to>
+                                    </p:set>
+                                  </p:childTnLst>
+                                </p:cTn>
+                              </p:par>
+                            </p:childTnLst>
+                          </p:cTn>
+                        </p:par>
+                      </p:childTnLst>
+                    </p:cTn>
+                  </p:par>
+                </p:childTnLst>
+              </p:cTn>
+              <p:prevCondLst>
+                <p:cond evt="onPrev" delay="0">
+                  <p:tgtEl>
+                    <p:sldTgt/>
+                  </p:tgtEl>
+                </p:cond>
+              </p:prevCondLst>
+              <p:nextCondLst>
+                <p:cond evt="onNext" delay="0">
+                  <p:tgtEl>
+                    <p:sldTgt/>
+                  </p:tgtEl>
+                </p:cond>
+              </p:nextCondLst>
+            </p:seq>
+          </p:childTnLst>
+        </p:cTn>
+      </p:par>
+    </p:tnLst>
+    <p:bldLst>
+      <p:bldP spid="3" grpId="0" uiExpand="1" build="p"/>
+      <p:bldP spid="5" grpId="0" animBg="1"/>
+    </p:bldLst>
+  </p:timing>
+</p:sld>
+</file>
+
+<file path=ppt/slides/slide42.xml><?xml version="1.0" encoding="utf-8"?>
 <p:sld xmlns:a="http://schemas.openxmlformats.org/drawingml/2006/main" xmlns:r="http://schemas.openxmlformats.org/officeDocument/2006/relationships" xmlns:p="http://schemas.openxmlformats.org/presentationml/2006/main">
   <p:cSld>
     <p:spTree>
@@ -38369,7 +39434,7 @@
           <a:p>
             <a:fld id="{6597116C-F94B-4B5B-973A-17F07FB5C418}" type="slidenum">
               <a:rPr lang="nl-BE" smtClean="0"/>
-              <a:t>40</a:t>
+              <a:t>42</a:t>
             </a:fld>
             <a:endParaRPr lang="nl-BE"/>
           </a:p>
@@ -38514,7 +39579,7 @@
 </p:sld>
 </file>
 
-<file path=ppt/slides/slide41.xml><?xml version="1.0" encoding="utf-8"?>
+<file path=ppt/slides/slide43.xml><?xml version="1.0" encoding="utf-8"?>
 <p:sld xmlns:a="http://schemas.openxmlformats.org/drawingml/2006/main" xmlns:r="http://schemas.openxmlformats.org/officeDocument/2006/relationships" xmlns:p="http://schemas.openxmlformats.org/presentationml/2006/main">
   <p:cSld>
     <p:spTree>
@@ -38732,7 +39797,7 @@
           <a:p>
             <a:fld id="{6597116C-F94B-4B5B-973A-17F07FB5C418}" type="slidenum">
               <a:rPr lang="nl-BE" smtClean="0"/>
-              <a:t>41</a:t>
+              <a:t>43</a:t>
             </a:fld>
             <a:endParaRPr lang="nl-BE"/>
           </a:p>

</xml_diff>

<commit_message>
Add slide on how to avoid false sharing
</commit_message>
<xml_diff>
--- a/Optimization/hpc_efficiency_false_sharing.pptx
+++ b/Optimization/hpc_efficiency_false_sharing.pptx
@@ -357,11 +357,11 @@
           <c:showPercent val="0"/>
           <c:showBubbleSize val="0"/>
         </c:dLbls>
-        <c:axId val="16383080"/>
-        <c:axId val="16378376"/>
+        <c:axId val="332600408"/>
+        <c:axId val="332597272"/>
       </c:scatterChart>
       <c:valAx>
-        <c:axId val="16383080"/>
+        <c:axId val="332600408"/>
         <c:scaling>
           <c:logBase val="2"/>
           <c:orientation val="minMax"/>
@@ -373,14 +373,14 @@
         <c:majorTickMark val="out"/>
         <c:minorTickMark val="none"/>
         <c:tickLblPos val="nextTo"/>
-        <c:crossAx val="16378376"/>
+        <c:crossAx val="332597272"/>
         <c:crosses val="autoZero"/>
         <c:crossBetween val="midCat"/>
         <c:majorUnit val="4"/>
         <c:minorUnit val="4"/>
       </c:valAx>
       <c:valAx>
-        <c:axId val="16378376"/>
+        <c:axId val="332597272"/>
         <c:scaling>
           <c:logBase val="2"/>
           <c:orientation val="minMax"/>
@@ -393,7 +393,7 @@
         <c:majorTickMark val="out"/>
         <c:minorTickMark val="none"/>
         <c:tickLblPos val="nextTo"/>
-        <c:crossAx val="16383080"/>
+        <c:crossAx val="332600408"/>
         <c:crosses val="autoZero"/>
         <c:crossBetween val="midCat"/>
         <c:majorUnit val="4"/>
@@ -766,11 +766,11 @@
           <c:showPercent val="0"/>
           <c:showBubbleSize val="0"/>
         </c:dLbls>
-        <c:axId val="16383472"/>
-        <c:axId val="16379160"/>
+        <c:axId val="335830656"/>
+        <c:axId val="335826344"/>
       </c:scatterChart>
       <c:valAx>
-        <c:axId val="16383472"/>
+        <c:axId val="335830656"/>
         <c:scaling>
           <c:logBase val="2"/>
           <c:orientation val="minMax"/>
@@ -783,14 +783,14 @@
         <c:majorTickMark val="out"/>
         <c:minorTickMark val="none"/>
         <c:tickLblPos val="nextTo"/>
-        <c:crossAx val="16379160"/>
+        <c:crossAx val="335826344"/>
         <c:crosses val="autoZero"/>
         <c:crossBetween val="midCat"/>
         <c:majorUnit val="4"/>
         <c:minorUnit val="4"/>
       </c:valAx>
       <c:valAx>
-        <c:axId val="16379160"/>
+        <c:axId val="335826344"/>
         <c:scaling>
           <c:logBase val="2"/>
           <c:orientation val="minMax"/>
@@ -804,7 +804,7 @@
         <c:majorTickMark val="out"/>
         <c:minorTickMark val="none"/>
         <c:tickLblPos val="nextTo"/>
-        <c:crossAx val="16383472"/>
+        <c:crossAx val="335830656"/>
         <c:crosses val="autoZero"/>
         <c:crossBetween val="midCat"/>
         <c:majorUnit val="4"/>
@@ -1017,11 +1017,11 @@
           <c:showPercent val="0"/>
           <c:showBubbleSize val="0"/>
         </c:dLbls>
-        <c:axId val="16380728"/>
-        <c:axId val="16382688"/>
+        <c:axId val="335828696"/>
+        <c:axId val="335828304"/>
       </c:scatterChart>
       <c:valAx>
-        <c:axId val="16380728"/>
+        <c:axId val="335828696"/>
         <c:scaling>
           <c:logBase val="2"/>
           <c:orientation val="minMax"/>
@@ -1034,13 +1034,13 @@
         <c:majorTickMark val="out"/>
         <c:minorTickMark val="none"/>
         <c:tickLblPos val="nextTo"/>
-        <c:crossAx val="16382688"/>
+        <c:crossAx val="335828304"/>
         <c:crosses val="autoZero"/>
         <c:crossBetween val="midCat"/>
         <c:minorUnit val="4"/>
       </c:valAx>
       <c:valAx>
-        <c:axId val="16382688"/>
+        <c:axId val="335828304"/>
         <c:scaling>
           <c:logBase val="2"/>
           <c:orientation val="minMax"/>
@@ -1054,7 +1054,7 @@
         <c:majorTickMark val="out"/>
         <c:minorTickMark val="none"/>
         <c:tickLblPos val="nextTo"/>
-        <c:crossAx val="16380728"/>
+        <c:crossAx val="335828696"/>
         <c:crosses val="autoZero"/>
         <c:crossBetween val="midCat"/>
         <c:majorUnit val="2"/>
@@ -1185,11 +1185,11 @@
           <c:showPercent val="0"/>
           <c:showBubbleSize val="0"/>
         </c:dLbls>
-        <c:axId val="16381120"/>
-        <c:axId val="16383864"/>
+        <c:axId val="335827912"/>
+        <c:axId val="335823992"/>
       </c:scatterChart>
       <c:valAx>
-        <c:axId val="16381120"/>
+        <c:axId val="335827912"/>
         <c:scaling>
           <c:logBase val="2"/>
           <c:orientation val="minMax"/>
@@ -1202,13 +1202,13 @@
         <c:majorTickMark val="out"/>
         <c:minorTickMark val="none"/>
         <c:tickLblPos val="nextTo"/>
-        <c:crossAx val="16383864"/>
+        <c:crossAx val="335823992"/>
         <c:crosses val="autoZero"/>
         <c:crossBetween val="midCat"/>
         <c:majorUnit val="4"/>
       </c:valAx>
       <c:valAx>
-        <c:axId val="16383864"/>
+        <c:axId val="335823992"/>
         <c:scaling>
           <c:logBase val="2"/>
           <c:orientation val="minMax"/>
@@ -1221,7 +1221,7 @@
         <c:majorTickMark val="out"/>
         <c:minorTickMark val="none"/>
         <c:tickLblPos val="nextTo"/>
-        <c:crossAx val="16381120"/>
+        <c:crossAx val="335827912"/>
         <c:crosses val="autoZero"/>
         <c:crossBetween val="midCat"/>
         <c:majorUnit val="2"/>
@@ -1347,11 +1347,11 @@
           <c:showPercent val="0"/>
           <c:showBubbleSize val="0"/>
         </c:dLbls>
-        <c:axId val="16385432"/>
-        <c:axId val="16384648"/>
+        <c:axId val="335829088"/>
+        <c:axId val="335830264"/>
       </c:scatterChart>
       <c:valAx>
-        <c:axId val="16385432"/>
+        <c:axId val="335829088"/>
         <c:scaling>
           <c:logBase val="2"/>
           <c:orientation val="minMax"/>
@@ -1364,14 +1364,14 @@
         <c:majorTickMark val="out"/>
         <c:minorTickMark val="none"/>
         <c:tickLblPos val="nextTo"/>
-        <c:crossAx val="16384648"/>
+        <c:crossAx val="335830264"/>
         <c:crosses val="autoZero"/>
         <c:crossBetween val="midCat"/>
         <c:majorUnit val="4"/>
         <c:minorUnit val="4"/>
       </c:valAx>
       <c:valAx>
-        <c:axId val="16384648"/>
+        <c:axId val="335830264"/>
         <c:scaling>
           <c:orientation val="minMax"/>
           <c:max val="1"/>
@@ -1383,7 +1383,7 @@
         <c:majorTickMark val="out"/>
         <c:minorTickMark val="none"/>
         <c:tickLblPos val="nextTo"/>
-        <c:crossAx val="16385432"/>
+        <c:crossAx val="335829088"/>
         <c:crosses val="autoZero"/>
         <c:crossBetween val="midCat"/>
       </c:valAx>
@@ -1480,7 +1480,7 @@
           <a:p>
             <a:fld id="{2E6AAE95-D4FC-4D00-935A-EAE928727A56}" type="datetimeFigureOut">
               <a:rPr lang="en-US" smtClean="0"/>
-              <a:t>2017-08-18</a:t>
+              <a:t>2017-08-21</a:t>
             </a:fld>
             <a:endParaRPr lang="en-US"/>
           </a:p>
@@ -2013,7 +2013,7 @@
           <a:p>
             <a:fld id="{1CFF3F78-F57F-4409-A41B-5EC46D4F404B}" type="datetime1">
               <a:rPr lang="nl-BE" smtClean="0"/>
-              <a:t>18/08/2017</a:t>
+              <a:t>21/08/2017</a:t>
             </a:fld>
             <a:endParaRPr lang="nl-BE"/>
           </a:p>
@@ -2183,7 +2183,7 @@
           <a:p>
             <a:fld id="{7D029E61-52E3-412C-82EB-2F81B17C0AF1}" type="datetime1">
               <a:rPr lang="nl-BE" smtClean="0"/>
-              <a:t>18/08/2017</a:t>
+              <a:t>21/08/2017</a:t>
             </a:fld>
             <a:endParaRPr lang="nl-BE"/>
           </a:p>
@@ -2363,7 +2363,7 @@
           <a:p>
             <a:fld id="{A83F1CEF-A38E-4001-89C6-F3FC7784F299}" type="datetime1">
               <a:rPr lang="nl-BE" smtClean="0"/>
-              <a:t>18/08/2017</a:t>
+              <a:t>21/08/2017</a:t>
             </a:fld>
             <a:endParaRPr lang="nl-BE"/>
           </a:p>
@@ -2489,7 +2489,7 @@
           <a:p>
             <a:fld id="{1FDE84DB-AADA-4C3F-BF46-CA664A504479}" type="datetime1">
               <a:rPr lang="nl-BE" smtClean="0"/>
-              <a:t>18/08/2017</a:t>
+              <a:t>21/08/2017</a:t>
             </a:fld>
             <a:endParaRPr lang="nl-BE" dirty="0"/>
           </a:p>
@@ -2733,7 +2733,7 @@
           <a:p>
             <a:fld id="{8CD53A43-C15C-4F05-9AD7-DB9DE837084D}" type="datetime1">
               <a:rPr lang="nl-BE" smtClean="0"/>
-              <a:t>18/08/2017</a:t>
+              <a:t>21/08/2017</a:t>
             </a:fld>
             <a:endParaRPr lang="nl-BE"/>
           </a:p>
@@ -2979,7 +2979,7 @@
           <a:p>
             <a:fld id="{8994D238-D949-4AEF-9753-A8B6EFA964A0}" type="datetime1">
               <a:rPr lang="nl-BE" smtClean="0"/>
-              <a:t>18/08/2017</a:t>
+              <a:t>21/08/2017</a:t>
             </a:fld>
             <a:endParaRPr lang="nl-BE"/>
           </a:p>
@@ -3267,7 +3267,7 @@
           <a:p>
             <a:fld id="{4D234023-BF99-4AD0-835E-8125DA2B6664}" type="datetime1">
               <a:rPr lang="nl-BE" smtClean="0"/>
-              <a:t>18/08/2017</a:t>
+              <a:t>21/08/2017</a:t>
             </a:fld>
             <a:endParaRPr lang="nl-BE"/>
           </a:p>
@@ -3689,7 +3689,7 @@
           <a:p>
             <a:fld id="{DB075A73-5C1D-406E-9444-3C5C58580E8E}" type="datetime1">
               <a:rPr lang="nl-BE" smtClean="0"/>
-              <a:t>18/08/2017</a:t>
+              <a:t>21/08/2017</a:t>
             </a:fld>
             <a:endParaRPr lang="nl-BE"/>
           </a:p>
@@ -3807,7 +3807,7 @@
           <a:p>
             <a:fld id="{E111FB2D-2E17-4D8F-A64A-4EB0C3D12494}" type="datetime1">
               <a:rPr lang="nl-BE" smtClean="0"/>
-              <a:t>18/08/2017</a:t>
+              <a:t>21/08/2017</a:t>
             </a:fld>
             <a:endParaRPr lang="nl-BE"/>
           </a:p>
@@ -3902,7 +3902,7 @@
           <a:p>
             <a:fld id="{5BE27D71-2267-4E44-9F33-05B60E5C7D9D}" type="datetime1">
               <a:rPr lang="nl-BE" smtClean="0"/>
-              <a:t>18/08/2017</a:t>
+              <a:t>21/08/2017</a:t>
             </a:fld>
             <a:endParaRPr lang="nl-BE"/>
           </a:p>
@@ -4179,7 +4179,7 @@
           <a:p>
             <a:fld id="{182F587C-96C8-4813-A767-3084061A3229}" type="datetime1">
               <a:rPr lang="nl-BE" smtClean="0"/>
-              <a:t>18/08/2017</a:t>
+              <a:t>21/08/2017</a:t>
             </a:fld>
             <a:endParaRPr lang="nl-BE"/>
           </a:p>
@@ -4432,7 +4432,7 @@
           <a:p>
             <a:fld id="{8B021CF8-BBBB-4DFA-8713-49842AA07274}" type="datetime1">
               <a:rPr lang="nl-BE" smtClean="0"/>
-              <a:t>18/08/2017</a:t>
+              <a:t>21/08/2017</a:t>
             </a:fld>
             <a:endParaRPr lang="nl-BE"/>
           </a:p>
@@ -4645,7 +4645,7 @@
           <a:p>
             <a:fld id="{CDBFABB5-0AB3-4CB6-A705-6887DEB1F9F2}" type="datetime1">
               <a:rPr lang="nl-BE" smtClean="0"/>
-              <a:t>18/08/2017</a:t>
+              <a:t>21/08/2017</a:t>
             </a:fld>
             <a:endParaRPr lang="nl-BE"/>
           </a:p>
@@ -8841,7 +8841,7 @@
           <a:graphicData uri="http://schemas.openxmlformats.org/presentationml/2006/ole">
             <mc:AlternateContent xmlns:mc="http://schemas.openxmlformats.org/markup-compatibility/2006">
               <mc:Choice xmlns:v="urn:schemas-microsoft-com:vml" Requires="v">
-                <p:oleObj spid="_x0000_s1196" name="Equation" r:id="rId3" imgW="812520" imgH="393480" progId="Equation.3">
+                <p:oleObj spid="_x0000_s1206" name="Equation" r:id="rId3" imgW="812520" imgH="393480" progId="Equation.3">
                   <p:embed/>
                 </p:oleObj>
               </mc:Choice>
@@ -8898,7 +8898,7 @@
           <a:graphicData uri="http://schemas.openxmlformats.org/presentationml/2006/ole">
             <mc:AlternateContent xmlns:mc="http://schemas.openxmlformats.org/markup-compatibility/2006">
               <mc:Choice xmlns:v="urn:schemas-microsoft-com:vml" Requires="v">
-                <p:oleObj spid="_x0000_s1197" name="Equation" r:id="rId5" imgW="2489040" imgH="431640" progId="Equation.3">
+                <p:oleObj spid="_x0000_s1207" name="Equation" r:id="rId5" imgW="2489040" imgH="431640" progId="Equation.3">
                   <p:embed/>
                 </p:oleObj>
               </mc:Choice>
@@ -19560,7 +19560,7 @@
           <a:graphicData uri="http://schemas.openxmlformats.org/presentationml/2006/ole">
             <mc:AlternateContent xmlns:mc="http://schemas.openxmlformats.org/markup-compatibility/2006">
               <mc:Choice xmlns:v="urn:schemas-microsoft-com:vml" Requires="v">
-                <p:oleObj spid="_x0000_s2187" name="Equation" r:id="rId3" imgW="1091880" imgH="1041120" progId="Equation.3">
+                <p:oleObj spid="_x0000_s2197" name="Equation" r:id="rId3" imgW="1091880" imgH="1041120" progId="Equation.3">
                   <p:embed/>
                 </p:oleObj>
               </mc:Choice>
@@ -20931,7 +20931,7 @@
           <a:graphicData uri="http://schemas.openxmlformats.org/presentationml/2006/ole">
             <mc:AlternateContent xmlns:mc="http://schemas.openxmlformats.org/markup-compatibility/2006">
               <mc:Choice xmlns:v="urn:schemas-microsoft-com:vml" Requires="v">
-                <p:oleObj spid="_x0000_s2188" name="Equation" r:id="rId5" imgW="1091880" imgH="1041120" progId="Equation.3">
+                <p:oleObj spid="_x0000_s2198" name="Equation" r:id="rId5" imgW="1091880" imgH="1041120" progId="Equation.3">
                   <p:embed/>
                 </p:oleObj>
               </mc:Choice>
@@ -27280,7 +27280,7 @@
           <a:graphicData uri="http://schemas.openxmlformats.org/presentationml/2006/ole">
             <mc:AlternateContent xmlns:mc="http://schemas.openxmlformats.org/markup-compatibility/2006">
               <mc:Choice xmlns:v="urn:schemas-microsoft-com:vml" Requires="v">
-                <p:oleObj spid="_x0000_s3106" name="Equation" r:id="rId3" imgW="965160" imgH="228600" progId="Equation.3">
+                <p:oleObj spid="_x0000_s3111" name="Equation" r:id="rId3" imgW="965160" imgH="228600" progId="Equation.3">
                   <p:embed/>
                 </p:oleObj>
               </mc:Choice>
@@ -30055,7 +30055,11 @@
           <a:p>
             <a:r>
               <a:rPr lang="en-US" dirty="0" smtClean="0"/>
-              <a:t>False sharing</a:t>
+              <a:t>Multithreading: false </a:t>
+            </a:r>
+            <a:r>
+              <a:rPr lang="en-US" dirty="0" smtClean="0"/>
+              <a:t>sharing</a:t>
             </a:r>
             <a:endParaRPr lang="en-US" dirty="0"/>
           </a:p>
@@ -30157,15 +30161,7 @@
           <a:p>
             <a:r>
               <a:rPr lang="en-US" dirty="0" smtClean="0"/>
-              <a:t>Cache </a:t>
-            </a:r>
-            <a:r>
-              <a:rPr lang="en-US" dirty="0" smtClean="0"/>
-              <a:t>lines, </a:t>
-            </a:r>
-            <a:r>
-              <a:rPr lang="en-US" dirty="0" smtClean="0"/>
-              <a:t>again</a:t>
+              <a:t>Cache lines, again</a:t>
             </a:r>
             <a:endParaRPr lang="en-US" dirty="0"/>
           </a:p>
@@ -34897,7 +34893,19 @@
           <a:p>
             <a:r>
               <a:rPr lang="en-US" dirty="0" smtClean="0"/>
-              <a:t>The bad and the good</a:t>
+              <a:t>B</a:t>
+            </a:r>
+            <a:r>
+              <a:rPr lang="en-US" dirty="0" smtClean="0"/>
+              <a:t>ad news </a:t>
+            </a:r>
+            <a:r>
+              <a:rPr lang="en-US" dirty="0" smtClean="0"/>
+              <a:t>and </a:t>
+            </a:r>
+            <a:r>
+              <a:rPr lang="en-US" dirty="0" smtClean="0"/>
+              <a:t>good news</a:t>
             </a:r>
             <a:endParaRPr lang="en-US" dirty="0"/>
           </a:p>
@@ -34922,15 +34930,24 @@
           <a:p>
             <a:r>
               <a:rPr lang="en-US" dirty="0" smtClean="0"/>
-              <a:t>The bad: performance</a:t>
+              <a:t>Bad news: </a:t>
+            </a:r>
+            <a:r>
+              <a:rPr lang="en-US" dirty="0" smtClean="0"/>
+              <a:t>performance</a:t>
             </a:r>
           </a:p>
           <a:p>
             <a:pPr lvl="1"/>
             <a:r>
               <a:rPr lang="en-US" dirty="0" smtClean="0"/>
-              <a:t>degraded by 1.5</a:t>
-            </a:r>
+              <a:t>degraded by </a:t>
+            </a:r>
+            <a:r>
+              <a:rPr lang="en-US" dirty="0" smtClean="0"/>
+              <a:t>1.5 to 4</a:t>
+            </a:r>
+            <a:endParaRPr lang="en-US" dirty="0" smtClean="0"/>
           </a:p>
           <a:p>
             <a:pPr lvl="1"/>
@@ -34942,7 +34959,15 @@
           <a:p>
             <a:r>
               <a:rPr lang="en-US" dirty="0" smtClean="0"/>
-              <a:t>The good: compilers</a:t>
+              <a:t>G</a:t>
+            </a:r>
+            <a:r>
+              <a:rPr lang="en-US" dirty="0" smtClean="0"/>
+              <a:t>ood news: </a:t>
+            </a:r>
+            <a:r>
+              <a:rPr lang="en-US" dirty="0" smtClean="0"/>
+              <a:t>compilers</a:t>
             </a:r>
           </a:p>
           <a:p>
@@ -35529,7 +35554,7 @@
         <p:spPr/>
         <p:txBody>
           <a:bodyPr>
-            <a:normAutofit fontScale="92500" lnSpcReduction="10000"/>
+            <a:normAutofit fontScale="70000" lnSpcReduction="20000"/>
           </a:bodyPr>
           <a:lstStyle/>
           <a:p>
@@ -35541,7 +35566,11 @@
           <a:p>
             <a:r>
               <a:rPr lang="en-US" dirty="0" smtClean="0"/>
-              <a:t>Align global variables at cache boundaries, e.g.,</a:t>
+              <a:t>Align C </a:t>
+            </a:r>
+            <a:r>
+              <a:rPr lang="en-US" dirty="0" smtClean="0"/>
+              <a:t>global variables at cache boundaries, e.g.,</a:t>
             </a:r>
             <a:br>
               <a:rPr lang="en-US" dirty="0" smtClean="0"/>
@@ -35558,7 +35587,21 @@
                 <a:latin typeface="Courier New" panose="02070309020205020404" pitchFamily="49" charset="0"/>
                 <a:cs typeface="Courier New" panose="02070309020205020404" pitchFamily="49" charset="0"/>
               </a:rPr>
-              <a:t> counter_t0 __attribute((align(64)));</a:t>
+              <a:t> counter_t0 __</a:t>
+            </a:r>
+            <a:r>
+              <a:rPr lang="en-US" sz="2200" dirty="0" smtClean="0">
+                <a:latin typeface="Courier New" panose="02070309020205020404" pitchFamily="49" charset="0"/>
+                <a:cs typeface="Courier New" panose="02070309020205020404" pitchFamily="49" charset="0"/>
+              </a:rPr>
+              <a:t>attribute__((aligned(64</a:t>
+            </a:r>
+            <a:r>
+              <a:rPr lang="en-US" sz="2200" dirty="0" smtClean="0">
+                <a:latin typeface="Courier New" panose="02070309020205020404" pitchFamily="49" charset="0"/>
+                <a:cs typeface="Courier New" panose="02070309020205020404" pitchFamily="49" charset="0"/>
+              </a:rPr>
+              <a:t>)));</a:t>
             </a:r>
             <a:br>
               <a:rPr lang="en-US" sz="2200" dirty="0" smtClean="0">
@@ -35585,7 +35628,21 @@
                 <a:latin typeface="Courier New" panose="02070309020205020404" pitchFamily="49" charset="0"/>
                 <a:cs typeface="Courier New" panose="02070309020205020404" pitchFamily="49" charset="0"/>
               </a:rPr>
-              <a:t> __attribute((align(64)))</a:t>
+              <a:t> __</a:t>
+            </a:r>
+            <a:r>
+              <a:rPr lang="en-US" sz="2200" dirty="0" smtClean="0">
+                <a:latin typeface="Courier New" panose="02070309020205020404" pitchFamily="49" charset="0"/>
+                <a:cs typeface="Courier New" panose="02070309020205020404" pitchFamily="49" charset="0"/>
+              </a:rPr>
+              <a:t>attribute__((aligned(64</a:t>
+            </a:r>
+            <a:r>
+              <a:rPr lang="en-US" sz="2200" dirty="0">
+                <a:latin typeface="Courier New" panose="02070309020205020404" pitchFamily="49" charset="0"/>
+                <a:cs typeface="Courier New" panose="02070309020205020404" pitchFamily="49" charset="0"/>
+              </a:rPr>
+              <a:t>)))</a:t>
             </a:r>
             <a:r>
               <a:rPr lang="en-US" sz="2200" dirty="0" smtClean="0">
@@ -35602,7 +35659,65 @@
           <a:p>
             <a:r>
               <a:rPr lang="en-US" dirty="0" smtClean="0"/>
-              <a:t>Pad structures to multiples of cache line length, e.g.,</a:t>
+              <a:t>Align Fortran variables at cache boundaries (Intel only), e.g.,</a:t>
+            </a:r>
+            <a:br>
+              <a:rPr lang="en-US" dirty="0" smtClean="0"/>
+            </a:br>
+            <a:r>
+              <a:rPr lang="en-US" sz="2100" dirty="0" smtClean="0">
+                <a:latin typeface="Courier New" panose="02070309020205020404" pitchFamily="49" charset="0"/>
+                <a:cs typeface="Courier New" panose="02070309020205020404" pitchFamily="49" charset="0"/>
+              </a:rPr>
+              <a:t>integer :: counter_t0, counter_t1</a:t>
+            </a:r>
+            <a:br>
+              <a:rPr lang="en-US" sz="2100" dirty="0" smtClean="0">
+                <a:latin typeface="Courier New" panose="02070309020205020404" pitchFamily="49" charset="0"/>
+                <a:cs typeface="Courier New" panose="02070309020205020404" pitchFamily="49" charset="0"/>
+              </a:rPr>
+            </a:br>
+            <a:r>
+              <a:rPr lang="en-US" sz="2100" dirty="0" smtClean="0">
+                <a:latin typeface="Courier New" panose="02070309020205020404" pitchFamily="49" charset="0"/>
+                <a:cs typeface="Courier New" panose="02070309020205020404" pitchFamily="49" charset="0"/>
+              </a:rPr>
+              <a:t>!</a:t>
+            </a:r>
+            <a:r>
+              <a:rPr lang="en-US" sz="2100" dirty="0" err="1" smtClean="0">
+                <a:latin typeface="Courier New" panose="02070309020205020404" pitchFamily="49" charset="0"/>
+                <a:cs typeface="Courier New" panose="02070309020205020404" pitchFamily="49" charset="0"/>
+              </a:rPr>
+              <a:t>dir</a:t>
+            </a:r>
+            <a:r>
+              <a:rPr lang="en-US" sz="2100" dirty="0" smtClean="0">
+                <a:latin typeface="Courier New" panose="02070309020205020404" pitchFamily="49" charset="0"/>
+                <a:cs typeface="Courier New" panose="02070309020205020404" pitchFamily="49" charset="0"/>
+              </a:rPr>
+              <a:t>$ attributes align:16 :: counter_t0, counter_t1</a:t>
+            </a:r>
+          </a:p>
+          <a:p>
+            <a:r>
+              <a:rPr lang="en-US" dirty="0" smtClean="0"/>
+              <a:t>Pad C </a:t>
+            </a:r>
+            <a:r>
+              <a:rPr lang="en-US" dirty="0" err="1" smtClean="0">
+                <a:latin typeface="Courier New" panose="02070309020205020404" pitchFamily="49" charset="0"/>
+                <a:cs typeface="Courier New" panose="02070309020205020404" pitchFamily="49" charset="0"/>
+              </a:rPr>
+              <a:t>struct</a:t>
+            </a:r>
+            <a:r>
+              <a:rPr lang="en-US" dirty="0" smtClean="0"/>
+              <a:t> </a:t>
+            </a:r>
+            <a:r>
+              <a:rPr lang="en-US" dirty="0" smtClean="0"/>
+              <a:t>to multiples of cache line length, e.g.,</a:t>
             </a:r>
             <a:br>
               <a:rPr lang="en-US" dirty="0" smtClean="0"/>
@@ -35678,21 +35793,100 @@
                 <a:latin typeface="Courier New" panose="02070309020205020404" pitchFamily="49" charset="0"/>
                 <a:cs typeface="Courier New" panose="02070309020205020404" pitchFamily="49" charset="0"/>
               </a:rPr>
-              <a:t> data points[20]</a:t>
+              <a:t> data </a:t>
+            </a:r>
+            <a:r>
+              <a:rPr lang="en-US" sz="2200" dirty="0" err="1" smtClean="0">
+                <a:latin typeface="Courier New" panose="02070309020205020404" pitchFamily="49" charset="0"/>
+                <a:cs typeface="Courier New" panose="02070309020205020404" pitchFamily="49" charset="0"/>
+              </a:rPr>
+              <a:t>pnts</a:t>
+            </a:r>
+            <a:r>
+              <a:rPr lang="en-US" sz="2200" dirty="0" smtClean="0">
+                <a:latin typeface="Courier New" panose="02070309020205020404" pitchFamily="49" charset="0"/>
+                <a:cs typeface="Courier New" panose="02070309020205020404" pitchFamily="49" charset="0"/>
+              </a:rPr>
+              <a:t>[20</a:t>
+            </a:r>
+            <a:r>
+              <a:rPr lang="en-US" sz="2200" dirty="0" smtClean="0">
+                <a:latin typeface="Courier New" panose="02070309020205020404" pitchFamily="49" charset="0"/>
+                <a:cs typeface="Courier New" panose="02070309020205020404" pitchFamily="49" charset="0"/>
+              </a:rPr>
+              <a:t>]</a:t>
             </a:r>
             <a:r>
               <a:rPr lang="en-US" sz="2200" dirty="0">
                 <a:latin typeface="Courier New" panose="02070309020205020404" pitchFamily="49" charset="0"/>
                 <a:cs typeface="Courier New" panose="02070309020205020404" pitchFamily="49" charset="0"/>
               </a:rPr>
-              <a:t> __attribute((align(64)))</a:t>
+              <a:t> __</a:t>
             </a:r>
             <a:r>
               <a:rPr lang="en-US" sz="2200" dirty="0" smtClean="0">
                 <a:latin typeface="Courier New" panose="02070309020205020404" pitchFamily="49" charset="0"/>
                 <a:cs typeface="Courier New" panose="02070309020205020404" pitchFamily="49" charset="0"/>
               </a:rPr>
-              <a:t>;</a:t>
+              <a:t>attribute__((aligned(64)));</a:t>
+            </a:r>
+          </a:p>
+          <a:p>
+            <a:r>
+              <a:rPr lang="en-US" dirty="0" smtClean="0">
+                <a:cs typeface="Courier New" panose="02070309020205020404" pitchFamily="49" charset="0"/>
+              </a:rPr>
+              <a:t>For Fortran user defined types, use</a:t>
+            </a:r>
+          </a:p>
+          <a:p>
+            <a:pPr lvl="1"/>
+            <a:r>
+              <a:rPr lang="en-US" dirty="0" smtClean="0">
+                <a:latin typeface="Courier New" panose="02070309020205020404" pitchFamily="49" charset="0"/>
+                <a:cs typeface="Courier New" panose="02070309020205020404" pitchFamily="49" charset="0"/>
+              </a:rPr>
+              <a:t>SEQUENCE</a:t>
+            </a:r>
+            <a:r>
+              <a:rPr lang="en-US" dirty="0" smtClean="0">
+                <a:cs typeface="Courier New" panose="02070309020205020404" pitchFamily="49" charset="0"/>
+              </a:rPr>
+              <a:t> + carefully order members</a:t>
+            </a:r>
+          </a:p>
+          <a:p>
+            <a:pPr lvl="1"/>
+            <a:r>
+              <a:rPr lang="en-US" dirty="0" smtClean="0">
+                <a:cs typeface="Courier New" panose="02070309020205020404" pitchFamily="49" charset="0"/>
+              </a:rPr>
+              <a:t>avoid</a:t>
+            </a:r>
+            <a:r>
+              <a:rPr lang="en-US" dirty="0" smtClean="0">
+                <a:latin typeface="Courier New" panose="02070309020205020404" pitchFamily="49" charset="0"/>
+                <a:cs typeface="Courier New" panose="02070309020205020404" pitchFamily="49" charset="0"/>
+              </a:rPr>
+              <a:t> SEQUENCE</a:t>
+            </a:r>
+            <a:r>
+              <a:rPr lang="en-US" dirty="0" smtClean="0">
+                <a:cs typeface="Courier New" panose="02070309020205020404" pitchFamily="49" charset="0"/>
+              </a:rPr>
+              <a:t>, but use compiler flag</a:t>
+            </a:r>
+            <a:br>
+              <a:rPr lang="en-US" dirty="0" smtClean="0">
+                <a:cs typeface="Courier New" panose="02070309020205020404" pitchFamily="49" charset="0"/>
+              </a:rPr>
+            </a:br>
+            <a:r>
+              <a:rPr lang="en-US" dirty="0" smtClean="0">
+                <a:latin typeface="Courier New" panose="02070309020205020404" pitchFamily="49" charset="0"/>
+                <a:cs typeface="Courier New" panose="02070309020205020404" pitchFamily="49" charset="0"/>
+              </a:rPr>
+              <a:t>-align rec16byte</a:t>
             </a:r>
             <a:r>
               <a:rPr lang="en-US" dirty="0" smtClean="0"/>
@@ -35896,6 +36090,166 @@
                       </p:childTnLst>
                     </p:cTn>
                   </p:par>
+                  <p:par>
+                    <p:cTn id="15" fill="hold">
+                      <p:stCondLst>
+                        <p:cond delay="indefinite"/>
+                      </p:stCondLst>
+                      <p:childTnLst>
+                        <p:par>
+                          <p:cTn id="16" fill="hold">
+                            <p:stCondLst>
+                              <p:cond delay="0"/>
+                            </p:stCondLst>
+                            <p:childTnLst>
+                              <p:par>
+                                <p:cTn id="17" presetID="1" presetClass="entr" presetSubtype="0" fill="hold" grpId="0" nodeType="clickEffect">
+                                  <p:stCondLst>
+                                    <p:cond delay="0"/>
+                                  </p:stCondLst>
+                                  <p:childTnLst>
+                                    <p:set>
+                                      <p:cBhvr>
+                                        <p:cTn id="18" dur="1" fill="hold">
+                                          <p:stCondLst>
+                                            <p:cond delay="0"/>
+                                          </p:stCondLst>
+                                        </p:cTn>
+                                        <p:tgtEl>
+                                          <p:spTgt spid="3">
+                                            <p:txEl>
+                                              <p:pRg st="3" end="3"/>
+                                            </p:txEl>
+                                          </p:spTgt>
+                                        </p:tgtEl>
+                                        <p:attrNameLst>
+                                          <p:attrName>style.visibility</p:attrName>
+                                        </p:attrNameLst>
+                                      </p:cBhvr>
+                                      <p:to>
+                                        <p:strVal val="visible"/>
+                                      </p:to>
+                                    </p:set>
+                                  </p:childTnLst>
+                                </p:cTn>
+                              </p:par>
+                            </p:childTnLst>
+                          </p:cTn>
+                        </p:par>
+                      </p:childTnLst>
+                    </p:cTn>
+                  </p:par>
+                  <p:par>
+                    <p:cTn id="19" fill="hold">
+                      <p:stCondLst>
+                        <p:cond delay="indefinite"/>
+                      </p:stCondLst>
+                      <p:childTnLst>
+                        <p:par>
+                          <p:cTn id="20" fill="hold">
+                            <p:stCondLst>
+                              <p:cond delay="0"/>
+                            </p:stCondLst>
+                            <p:childTnLst>
+                              <p:par>
+                                <p:cTn id="21" presetID="1" presetClass="entr" presetSubtype="0" fill="hold" grpId="0" nodeType="clickEffect">
+                                  <p:stCondLst>
+                                    <p:cond delay="0"/>
+                                  </p:stCondLst>
+                                  <p:childTnLst>
+                                    <p:set>
+                                      <p:cBhvr>
+                                        <p:cTn id="22" dur="1" fill="hold">
+                                          <p:stCondLst>
+                                            <p:cond delay="0"/>
+                                          </p:stCondLst>
+                                        </p:cTn>
+                                        <p:tgtEl>
+                                          <p:spTgt spid="3">
+                                            <p:txEl>
+                                              <p:pRg st="4" end="4"/>
+                                            </p:txEl>
+                                          </p:spTgt>
+                                        </p:tgtEl>
+                                        <p:attrNameLst>
+                                          <p:attrName>style.visibility</p:attrName>
+                                        </p:attrNameLst>
+                                      </p:cBhvr>
+                                      <p:to>
+                                        <p:strVal val="visible"/>
+                                      </p:to>
+                                    </p:set>
+                                  </p:childTnLst>
+                                </p:cTn>
+                              </p:par>
+                              <p:par>
+                                <p:cTn id="23" presetID="1" presetClass="entr" presetSubtype="0" fill="hold" grpId="0" nodeType="withEffect">
+                                  <p:stCondLst>
+                                    <p:cond delay="0"/>
+                                  </p:stCondLst>
+                                  <p:childTnLst>
+                                    <p:set>
+                                      <p:cBhvr>
+                                        <p:cTn id="24" dur="1" fill="hold">
+                                          <p:stCondLst>
+                                            <p:cond delay="0"/>
+                                          </p:stCondLst>
+                                        </p:cTn>
+                                        <p:tgtEl>
+                                          <p:spTgt spid="3">
+                                            <p:txEl>
+                                              <p:pRg st="5" end="5"/>
+                                            </p:txEl>
+                                          </p:spTgt>
+                                        </p:tgtEl>
+                                        <p:attrNameLst>
+                                          <p:attrName>style.visibility</p:attrName>
+                                        </p:attrNameLst>
+                                      </p:cBhvr>
+                                      <p:to>
+                                        <p:strVal val="visible"/>
+                                      </p:to>
+                                    </p:set>
+                                  </p:childTnLst>
+                                </p:cTn>
+                              </p:par>
+                              <p:par>
+                                <p:cTn id="25" presetID="1" presetClass="entr" presetSubtype="0" fill="hold" grpId="0" nodeType="withEffect">
+                                  <p:stCondLst>
+                                    <p:cond delay="0"/>
+                                  </p:stCondLst>
+                                  <p:childTnLst>
+                                    <p:set>
+                                      <p:cBhvr>
+                                        <p:cTn id="26" dur="1" fill="hold">
+                                          <p:stCondLst>
+                                            <p:cond delay="0"/>
+                                          </p:stCondLst>
+                                        </p:cTn>
+                                        <p:tgtEl>
+                                          <p:spTgt spid="3">
+                                            <p:txEl>
+                                              <p:pRg st="6" end="6"/>
+                                            </p:txEl>
+                                          </p:spTgt>
+                                        </p:tgtEl>
+                                        <p:attrNameLst>
+                                          <p:attrName>style.visibility</p:attrName>
+                                        </p:attrNameLst>
+                                      </p:cBhvr>
+                                      <p:to>
+                                        <p:strVal val="visible"/>
+                                      </p:to>
+                                    </p:set>
+                                  </p:childTnLst>
+                                </p:cTn>
+                              </p:par>
+                            </p:childTnLst>
+                          </p:cTn>
+                        </p:par>
+                      </p:childTnLst>
+                    </p:cTn>
+                  </p:par>
                 </p:childTnLst>
               </p:cTn>
               <p:prevCondLst>
@@ -36079,7 +36433,7 @@
         <p:spPr/>
         <p:txBody>
           <a:bodyPr>
-            <a:normAutofit lnSpcReduction="10000"/>
+            <a:normAutofit fontScale="85000" lnSpcReduction="10000"/>
           </a:bodyPr>
           <a:lstStyle/>
           <a:p>
@@ -36093,17 +36447,23 @@
           </a:p>
           <a:p>
             <a:r>
-              <a:rPr lang="en-US" dirty="0" smtClean="0"/>
-              <a:t>Vectorization</a:t>
-            </a:r>
-          </a:p>
-          <a:p>
-            <a:pPr lvl="1"/>
+              <a:rPr lang="en-US" dirty="0">
+                <a:hlinkClick r:id="rId3"/>
+              </a:rPr>
+              <a:t>Avoiding and Identifying False Sharing Among </a:t>
+            </a:r>
             <a:r>
               <a:rPr lang="en-US" dirty="0" smtClean="0">
                 <a:hlinkClick r:id="rId3"/>
               </a:rPr>
-              <a:t>A guide to vectorization with Intel C++ compilers</a:t>
+              <a:t>Threads</a:t>
+            </a:r>
+            <a:endParaRPr lang="en-US" dirty="0" smtClean="0"/>
+          </a:p>
+          <a:p>
+            <a:r>
+              <a:rPr lang="en-US" dirty="0" smtClean="0"/>
+              <a:t>Vectorization</a:t>
             </a:r>
             <a:endParaRPr lang="en-US" dirty="0" smtClean="0"/>
           </a:p>
@@ -36113,17 +36473,27 @@
               <a:rPr lang="en-US" dirty="0" smtClean="0">
                 <a:hlinkClick r:id="rId4"/>
               </a:rPr>
+              <a:t>A guide to vectorization with Intel C++ compilers</a:t>
+            </a:r>
+            <a:endParaRPr lang="en-US" dirty="0" smtClean="0"/>
+          </a:p>
+          <a:p>
+            <a:pPr lvl="1"/>
+            <a:r>
+              <a:rPr lang="en-US" dirty="0" smtClean="0">
+                <a:hlinkClick r:id="rId5"/>
+              </a:rPr>
               <a:t>Auto-vectorization with </a:t>
             </a:r>
             <a:r>
               <a:rPr lang="en-US" dirty="0" err="1" smtClean="0">
-                <a:hlinkClick r:id="rId4"/>
+                <a:hlinkClick r:id="rId5"/>
               </a:rPr>
               <a:t>gcc</a:t>
             </a:r>
             <a:r>
               <a:rPr lang="en-US" dirty="0" smtClean="0">
-                <a:hlinkClick r:id="rId4"/>
+                <a:hlinkClick r:id="rId5"/>
               </a:rPr>
               <a:t> 4.7</a:t>
             </a:r>
@@ -36161,7 +36531,7 @@
           <a:p>
             <a:r>
               <a:rPr lang="en-US" dirty="0" smtClean="0">
-                <a:hlinkClick r:id="rId5"/>
+                <a:hlinkClick r:id="rId6"/>
               </a:rPr>
               <a:t>Why has CPU frequency ceased to grow?</a:t>
             </a:r>

</xml_diff>

<commit_message>
Add remark on alignment cost
</commit_message>
<xml_diff>
--- a/Optimization/hpc_efficiency_false_sharing.pptx
+++ b/Optimization/hpc_efficiency_false_sharing.pptx
@@ -8841,7 +8841,7 @@
           <a:graphicData uri="http://schemas.openxmlformats.org/presentationml/2006/ole">
             <mc:AlternateContent xmlns:mc="http://schemas.openxmlformats.org/markup-compatibility/2006">
               <mc:Choice xmlns:v="urn:schemas-microsoft-com:vml" Requires="v">
-                <p:oleObj spid="_x0000_s1206" name="Equation" r:id="rId3" imgW="812520" imgH="393480" progId="Equation.3">
+                <p:oleObj spid="_x0000_s1208" name="Equation" r:id="rId3" imgW="812520" imgH="393480" progId="Equation.3">
                   <p:embed/>
                 </p:oleObj>
               </mc:Choice>
@@ -8898,7 +8898,7 @@
           <a:graphicData uri="http://schemas.openxmlformats.org/presentationml/2006/ole">
             <mc:AlternateContent xmlns:mc="http://schemas.openxmlformats.org/markup-compatibility/2006">
               <mc:Choice xmlns:v="urn:schemas-microsoft-com:vml" Requires="v">
-                <p:oleObj spid="_x0000_s1207" name="Equation" r:id="rId5" imgW="2489040" imgH="431640" progId="Equation.3">
+                <p:oleObj spid="_x0000_s1209" name="Equation" r:id="rId5" imgW="2489040" imgH="431640" progId="Equation.3">
                   <p:embed/>
                 </p:oleObj>
               </mc:Choice>
@@ -19560,7 +19560,7 @@
           <a:graphicData uri="http://schemas.openxmlformats.org/presentationml/2006/ole">
             <mc:AlternateContent xmlns:mc="http://schemas.openxmlformats.org/markup-compatibility/2006">
               <mc:Choice xmlns:v="urn:schemas-microsoft-com:vml" Requires="v">
-                <p:oleObj spid="_x0000_s2197" name="Equation" r:id="rId3" imgW="1091880" imgH="1041120" progId="Equation.3">
+                <p:oleObj spid="_x0000_s2199" name="Equation" r:id="rId3" imgW="1091880" imgH="1041120" progId="Equation.3">
                   <p:embed/>
                 </p:oleObj>
               </mc:Choice>
@@ -20931,7 +20931,7 @@
           <a:graphicData uri="http://schemas.openxmlformats.org/presentationml/2006/ole">
             <mc:AlternateContent xmlns:mc="http://schemas.openxmlformats.org/markup-compatibility/2006">
               <mc:Choice xmlns:v="urn:schemas-microsoft-com:vml" Requires="v">
-                <p:oleObj spid="_x0000_s2198" name="Equation" r:id="rId5" imgW="1091880" imgH="1041120" progId="Equation.3">
+                <p:oleObj spid="_x0000_s2200" name="Equation" r:id="rId5" imgW="1091880" imgH="1041120" progId="Equation.3">
                   <p:embed/>
                 </p:oleObj>
               </mc:Choice>
@@ -27280,7 +27280,7 @@
           <a:graphicData uri="http://schemas.openxmlformats.org/presentationml/2006/ole">
             <mc:AlternateContent xmlns:mc="http://schemas.openxmlformats.org/markup-compatibility/2006">
               <mc:Choice xmlns:v="urn:schemas-microsoft-com:vml" Requires="v">
-                <p:oleObj spid="_x0000_s3111" name="Equation" r:id="rId3" imgW="965160" imgH="228600" progId="Equation.3">
+                <p:oleObj spid="_x0000_s3112" name="Equation" r:id="rId3" imgW="965160" imgH="228600" progId="Equation.3">
                   <p:embed/>
                 </p:oleObj>
               </mc:Choice>
@@ -35922,6 +35922,41 @@
           </a:p>
         </p:txBody>
       </p:sp>
+      <p:sp>
+        <p:nvSpPr>
+          <p:cNvPr id="5" name="TextBox 4"/>
+          <p:cNvSpPr txBox="1"/>
+          <p:nvPr/>
+        </p:nvSpPr>
+        <p:spPr>
+          <a:xfrm>
+            <a:off x="3637573" y="6077892"/>
+            <a:ext cx="4013727" cy="461665"/>
+          </a:xfrm>
+          <a:prstGeom prst="rect">
+            <a:avLst/>
+          </a:prstGeom>
+          <a:noFill/>
+          <a:ln>
+            <a:solidFill>
+              <a:schemeClr val="tx1"/>
+            </a:solidFill>
+          </a:ln>
+        </p:spPr>
+        <p:txBody>
+          <a:bodyPr wrap="none" rtlCol="0">
+            <a:spAutoFit/>
+          </a:bodyPr>
+          <a:lstStyle/>
+          <a:p>
+            <a:r>
+              <a:rPr lang="en-US" sz="2400" dirty="0" smtClean="0"/>
+              <a:t>Cost: larger memory footprint!</a:t>
+            </a:r>
+            <a:endParaRPr lang="en-US" sz="2400" dirty="0"/>
+          </a:p>
+        </p:txBody>
+      </p:sp>
     </p:spTree>
     <p:extLst>
       <p:ext uri="{BB962C8B-B14F-4D97-AF65-F5344CB8AC3E}">
@@ -36250,6 +36285,51 @@
                       </p:childTnLst>
                     </p:cTn>
                   </p:par>
+                  <p:par>
+                    <p:cTn id="27" fill="hold">
+                      <p:stCondLst>
+                        <p:cond delay="indefinite"/>
+                      </p:stCondLst>
+                      <p:childTnLst>
+                        <p:par>
+                          <p:cTn id="28" fill="hold">
+                            <p:stCondLst>
+                              <p:cond delay="0"/>
+                            </p:stCondLst>
+                            <p:childTnLst>
+                              <p:par>
+                                <p:cTn id="29" presetID="1" presetClass="entr" presetSubtype="0" fill="hold" grpId="0" nodeType="clickEffect">
+                                  <p:stCondLst>
+                                    <p:cond delay="0"/>
+                                  </p:stCondLst>
+                                  <p:childTnLst>
+                                    <p:set>
+                                      <p:cBhvr>
+                                        <p:cTn id="30" dur="1" fill="hold">
+                                          <p:stCondLst>
+                                            <p:cond delay="0"/>
+                                          </p:stCondLst>
+                                        </p:cTn>
+                                        <p:tgtEl>
+                                          <p:spTgt spid="5"/>
+                                        </p:tgtEl>
+                                        <p:attrNameLst>
+                                          <p:attrName>style.visibility</p:attrName>
+                                        </p:attrNameLst>
+                                      </p:cBhvr>
+                                      <p:to>
+                                        <p:strVal val="visible"/>
+                                      </p:to>
+                                    </p:set>
+                                  </p:childTnLst>
+                                </p:cTn>
+                              </p:par>
+                            </p:childTnLst>
+                          </p:cTn>
+                        </p:par>
+                      </p:childTnLst>
+                    </p:cTn>
+                  </p:par>
                 </p:childTnLst>
               </p:cTn>
               <p:prevCondLst>
@@ -36273,6 +36353,7 @@
     </p:tnLst>
     <p:bldLst>
       <p:bldP spid="3" grpId="0" uiExpand="1" build="p"/>
+      <p:bldP spid="5" grpId="0" animBg="1"/>
     </p:bldLst>
   </p:timing>
 </p:sld>

</xml_diff>